<commit_message>
Finished slides about CRUD
</commit_message>
<xml_diff>
--- a/Slides.pptx
+++ b/Slides.pptx
@@ -15,9 +15,19 @@
     <p:sldId id="265" r:id="rId9"/>
     <p:sldId id="267" r:id="rId10"/>
     <p:sldId id="268" r:id="rId11"/>
-    <p:sldId id="269" r:id="rId12"/>
-    <p:sldId id="259" r:id="rId13"/>
-    <p:sldId id="260" r:id="rId14"/>
+    <p:sldId id="270" r:id="rId12"/>
+    <p:sldId id="271" r:id="rId13"/>
+    <p:sldId id="273" r:id="rId14"/>
+    <p:sldId id="274" r:id="rId15"/>
+    <p:sldId id="275" r:id="rId16"/>
+    <p:sldId id="276" r:id="rId17"/>
+    <p:sldId id="278" r:id="rId18"/>
+    <p:sldId id="279" r:id="rId19"/>
+    <p:sldId id="281" r:id="rId20"/>
+    <p:sldId id="282" r:id="rId21"/>
+    <p:sldId id="283" r:id="rId22"/>
+    <p:sldId id="259" r:id="rId23"/>
+    <p:sldId id="260" r:id="rId24"/>
   </p:sldIdLst>
   <p:sldSz cx="12192000" cy="6858000"/>
   <p:notesSz cx="6858000" cy="9144000"/>
@@ -5775,6 +5785,13 @@
   <p:clrMapOvr>
     <a:masterClrMapping/>
   </p:clrMapOvr>
+  <p:timing>
+    <p:tnLst>
+      <p:par>
+        <p:cTn id="1" dur="indefinite" restart="never" nodeType="tmRoot"/>
+      </p:par>
+    </p:tnLst>
+  </p:timing>
 </p:sld>
 </file>
 
@@ -6664,36 +6681,105 @@
         </p:nvSpPr>
         <p:spPr/>
         <p:txBody>
-          <a:bodyPr/>
-          <a:lstStyle/>
-          <a:p>
-            <a:endParaRPr lang="pl-PL"/>
-          </a:p>
-        </p:txBody>
-      </p:sp>
-      <p:sp>
-        <p:nvSpPr>
-          <p:cNvPr id="3" name="Content Placeholder 2"/>
-          <p:cNvSpPr>
-            <a:spLocks noGrp="1"/>
-          </p:cNvSpPr>
-          <p:nvPr>
-            <p:ph idx="1"/>
-          </p:nvPr>
-        </p:nvSpPr>
-        <p:spPr/>
-        <p:txBody>
-          <a:bodyPr/>
-          <a:lstStyle/>
-          <a:p>
-            <a:endParaRPr lang="pl-PL"/>
-          </a:p>
-        </p:txBody>
-      </p:sp>
+          <a:bodyPr>
+            <a:normAutofit fontScale="90000"/>
+          </a:bodyPr>
+          <a:lstStyle/>
+          <a:p>
+            <a:r>
+              <a:rPr lang="pl-PL" dirty="0"/>
+              <a:t>CRUDY na pudy, </a:t>
+            </a:r>
+            <a:r>
+              <a:rPr lang="pl-PL" dirty="0" smtClean="0"/>
+              <a:t/>
+            </a:r>
+            <a:br>
+              <a:rPr lang="pl-PL" dirty="0" smtClean="0"/>
+            </a:br>
+            <a:r>
+              <a:rPr lang="pl-PL" dirty="0" smtClean="0"/>
+              <a:t>czyli </a:t>
+            </a:r>
+            <a:r>
+              <a:rPr lang="pl-PL" dirty="0"/>
+              <a:t>parę </a:t>
+            </a:r>
+            <a:r>
+              <a:rPr lang="pl-PL" dirty="0" smtClean="0"/>
+              <a:t>słów </a:t>
+            </a:r>
+            <a:r>
+              <a:rPr lang="pl-PL" dirty="0"/>
+              <a:t>o dyskomforcie w </a:t>
+            </a:r>
+            <a:r>
+              <a:rPr lang="pl-PL" dirty="0" smtClean="0"/>
+              <a:t>programowaniu</a:t>
+            </a:r>
+            <a:r>
+              <a:rPr lang="pl-PL" dirty="0"/>
+              <a:t/>
+            </a:r>
+            <a:br>
+              <a:rPr lang="pl-PL" dirty="0"/>
+            </a:br>
+            <a:endParaRPr lang="pl-PL" dirty="0"/>
+          </a:p>
+        </p:txBody>
+      </p:sp>
+      <p:pic>
+        <p:nvPicPr>
+          <p:cNvPr id="4" name="Picture 3"/>
+          <p:cNvPicPr>
+            <a:picLocks noChangeAspect="1"/>
+          </p:cNvPicPr>
+          <p:nvPr/>
+        </p:nvPicPr>
+        <p:blipFill>
+          <a:blip r:embed="rId2"/>
+          <a:stretch>
+            <a:fillRect/>
+          </a:stretch>
+        </p:blipFill>
+        <p:spPr>
+          <a:xfrm>
+            <a:off x="4914900" y="4021636"/>
+            <a:ext cx="6809348" cy="2455565"/>
+          </a:xfrm>
+          <a:prstGeom prst="rect">
+            <a:avLst/>
+          </a:prstGeom>
+        </p:spPr>
+      </p:pic>
+      <p:pic>
+        <p:nvPicPr>
+          <p:cNvPr id="24" name="Picture 23"/>
+          <p:cNvPicPr>
+            <a:picLocks noChangeAspect="1"/>
+          </p:cNvPicPr>
+          <p:nvPr/>
+        </p:nvPicPr>
+        <p:blipFill>
+          <a:blip r:embed="rId3"/>
+          <a:stretch>
+            <a:fillRect/>
+          </a:stretch>
+        </p:blipFill>
+        <p:spPr>
+          <a:xfrm>
+            <a:off x="736600" y="2057401"/>
+            <a:ext cx="7112000" cy="2454369"/>
+          </a:xfrm>
+          <a:prstGeom prst="rect">
+            <a:avLst/>
+          </a:prstGeom>
+        </p:spPr>
+      </p:pic>
     </p:spTree>
     <p:extLst>
       <p:ext uri="{BB962C8B-B14F-4D97-AF65-F5344CB8AC3E}">
-        <p14:creationId xmlns:p14="http://schemas.microsoft.com/office/powerpoint/2010/main" val="2710927411"/>
+        <p14:creationId xmlns:p14="http://schemas.microsoft.com/office/powerpoint/2010/main" val="1800809345"/>
       </p:ext>
     </p:extLst>
   </p:cSld>
@@ -6739,99 +6825,153 @@
         </p:nvSpPr>
         <p:spPr/>
         <p:txBody>
-          <a:bodyPr/>
+          <a:bodyPr>
+            <a:normAutofit fontScale="90000"/>
+          </a:bodyPr>
           <a:lstStyle/>
           <a:p>
             <a:r>
               <a:rPr lang="pl-PL" dirty="0"/>
-              <a:t>Czemu CQRS to krok wstecz i dwa do przodu</a:t>
-            </a:r>
-          </a:p>
-        </p:txBody>
-      </p:sp>
-      <p:sp>
-        <p:nvSpPr>
-          <p:cNvPr id="3" name="Content Placeholder 2"/>
-          <p:cNvSpPr>
-            <a:spLocks noGrp="1"/>
-          </p:cNvSpPr>
-          <p:nvPr>
-            <p:ph idx="1"/>
-          </p:nvPr>
-        </p:nvSpPr>
-        <p:spPr/>
-        <p:txBody>
-          <a:bodyPr>
-            <a:normAutofit/>
-          </a:bodyPr>
-          <a:lstStyle/>
-          <a:p>
-            <a:pPr marL="0" indent="0">
-              <a:buNone/>
-            </a:pPr>
-            <a:endParaRPr lang="pl-PL" sz="4000" b="1" dirty="0" smtClean="0"/>
-          </a:p>
-          <a:p>
-            <a:pPr marL="0" indent="0">
-              <a:buNone/>
-            </a:pPr>
-            <a:r>
-              <a:rPr lang="pl-PL" sz="4000" b="1" dirty="0" err="1" smtClean="0"/>
-              <a:t>C</a:t>
-            </a:r>
-            <a:r>
-              <a:rPr lang="pl-PL" sz="4000" dirty="0" err="1" smtClean="0"/>
-              <a:t>ommand</a:t>
-            </a:r>
-            <a:endParaRPr lang="pl-PL" sz="4000" dirty="0" smtClean="0"/>
-          </a:p>
-          <a:p>
-            <a:pPr marL="0" indent="0">
-              <a:buNone/>
-            </a:pPr>
-            <a:r>
-              <a:rPr lang="pl-PL" sz="4000" b="1" dirty="0" smtClean="0"/>
-              <a:t>Q</a:t>
-            </a:r>
-            <a:r>
-              <a:rPr lang="pl-PL" sz="4000" dirty="0" smtClean="0"/>
-              <a:t>uery</a:t>
-            </a:r>
-          </a:p>
-          <a:p>
-            <a:pPr marL="0" indent="0">
-              <a:buNone/>
-            </a:pPr>
-            <a:r>
-              <a:rPr lang="pl-PL" sz="4000" b="1" dirty="0" err="1" smtClean="0"/>
-              <a:t>R</a:t>
-            </a:r>
-            <a:r>
-              <a:rPr lang="pl-PL" sz="4000" dirty="0" err="1" smtClean="0"/>
-              <a:t>esponsibility</a:t>
-            </a:r>
-            <a:endParaRPr lang="pl-PL" sz="4000" dirty="0" smtClean="0"/>
-          </a:p>
-          <a:p>
-            <a:pPr marL="0" indent="0">
-              <a:buNone/>
-            </a:pPr>
-            <a:r>
-              <a:rPr lang="pl-PL" sz="4000" b="1" dirty="0" err="1" smtClean="0"/>
-              <a:t>S</a:t>
-            </a:r>
-            <a:r>
-              <a:rPr lang="pl-PL" sz="4000" dirty="0" err="1" smtClean="0"/>
-              <a:t>egregation</a:t>
-            </a:r>
-            <a:endParaRPr lang="pl-PL" sz="4000" dirty="0" smtClean="0"/>
-          </a:p>
-        </p:txBody>
-      </p:sp>
+              <a:t>CRUDY na pudy, </a:t>
+            </a:r>
+            <a:r>
+              <a:rPr lang="pl-PL" dirty="0" smtClean="0"/>
+              <a:t/>
+            </a:r>
+            <a:br>
+              <a:rPr lang="pl-PL" dirty="0" smtClean="0"/>
+            </a:br>
+            <a:r>
+              <a:rPr lang="pl-PL" dirty="0" smtClean="0"/>
+              <a:t>czyli </a:t>
+            </a:r>
+            <a:r>
+              <a:rPr lang="pl-PL" dirty="0"/>
+              <a:t>parę </a:t>
+            </a:r>
+            <a:r>
+              <a:rPr lang="pl-PL" dirty="0" smtClean="0"/>
+              <a:t>słów </a:t>
+            </a:r>
+            <a:r>
+              <a:rPr lang="pl-PL" dirty="0"/>
+              <a:t>o dyskomforcie w </a:t>
+            </a:r>
+            <a:r>
+              <a:rPr lang="pl-PL" dirty="0" smtClean="0"/>
+              <a:t>programowaniu</a:t>
+            </a:r>
+            <a:r>
+              <a:rPr lang="pl-PL" dirty="0"/>
+              <a:t/>
+            </a:r>
+            <a:br>
+              <a:rPr lang="pl-PL" dirty="0"/>
+            </a:br>
+            <a:endParaRPr lang="pl-PL" dirty="0"/>
+          </a:p>
+        </p:txBody>
+      </p:sp>
+      <p:pic>
+        <p:nvPicPr>
+          <p:cNvPr id="4" name="Picture 3"/>
+          <p:cNvPicPr>
+            <a:picLocks noChangeAspect="1"/>
+          </p:cNvPicPr>
+          <p:nvPr/>
+        </p:nvPicPr>
+        <p:blipFill>
+          <a:blip r:embed="rId2"/>
+          <a:stretch>
+            <a:fillRect/>
+          </a:stretch>
+        </p:blipFill>
+        <p:spPr>
+          <a:xfrm>
+            <a:off x="4914900" y="4021636"/>
+            <a:ext cx="6809348" cy="2455565"/>
+          </a:xfrm>
+          <a:prstGeom prst="rect">
+            <a:avLst/>
+          </a:prstGeom>
+        </p:spPr>
+      </p:pic>
+      <p:pic>
+        <p:nvPicPr>
+          <p:cNvPr id="24" name="Picture 23"/>
+          <p:cNvPicPr>
+            <a:picLocks noChangeAspect="1"/>
+          </p:cNvPicPr>
+          <p:nvPr/>
+        </p:nvPicPr>
+        <p:blipFill>
+          <a:blip r:embed="rId3"/>
+          <a:stretch>
+            <a:fillRect/>
+          </a:stretch>
+        </p:blipFill>
+        <p:spPr>
+          <a:xfrm>
+            <a:off x="736600" y="2057401"/>
+            <a:ext cx="7112000" cy="2454369"/>
+          </a:xfrm>
+          <a:prstGeom prst="rect">
+            <a:avLst/>
+          </a:prstGeom>
+        </p:spPr>
+      </p:pic>
+      <p:pic>
+        <p:nvPicPr>
+          <p:cNvPr id="6" name="Picture 5"/>
+          <p:cNvPicPr>
+            <a:picLocks noChangeAspect="1"/>
+          </p:cNvPicPr>
+          <p:nvPr/>
+        </p:nvPicPr>
+        <p:blipFill>
+          <a:blip r:embed="rId4"/>
+          <a:stretch>
+            <a:fillRect/>
+          </a:stretch>
+        </p:blipFill>
+        <p:spPr>
+          <a:xfrm>
+            <a:off x="4710041" y="4329041"/>
+            <a:ext cx="1019317" cy="1019317"/>
+          </a:xfrm>
+          <a:prstGeom prst="rect">
+            <a:avLst/>
+          </a:prstGeom>
+        </p:spPr>
+      </p:pic>
+      <p:pic>
+        <p:nvPicPr>
+          <p:cNvPr id="8" name="Picture 7"/>
+          <p:cNvPicPr>
+            <a:picLocks noChangeAspect="1"/>
+          </p:cNvPicPr>
+          <p:nvPr/>
+        </p:nvPicPr>
+        <p:blipFill>
+          <a:blip r:embed="rId4"/>
+          <a:stretch>
+            <a:fillRect/>
+          </a:stretch>
+        </p:blipFill>
+        <p:spPr>
+          <a:xfrm>
+            <a:off x="646041" y="2360541"/>
+            <a:ext cx="1019317" cy="1019317"/>
+          </a:xfrm>
+          <a:prstGeom prst="rect">
+            <a:avLst/>
+          </a:prstGeom>
+        </p:spPr>
+      </p:pic>
     </p:spTree>
     <p:extLst>
       <p:ext uri="{BB962C8B-B14F-4D97-AF65-F5344CB8AC3E}">
-        <p14:creationId xmlns:p14="http://schemas.microsoft.com/office/powerpoint/2010/main" val="1770954372"/>
+        <p14:creationId xmlns:p14="http://schemas.microsoft.com/office/powerpoint/2010/main" val="517977164"/>
       </p:ext>
     </p:extLst>
   </p:cSld>
@@ -6877,48 +7017,3049 @@
         </p:nvSpPr>
         <p:spPr/>
         <p:txBody>
-          <a:bodyPr/>
+          <a:bodyPr>
+            <a:normAutofit fontScale="90000"/>
+          </a:bodyPr>
           <a:lstStyle/>
           <a:p>
             <a:r>
               <a:rPr lang="pl-PL" dirty="0"/>
-              <a:t>Czemu CQRS to krok wstecz i dwa do przodu</a:t>
-            </a:r>
-          </a:p>
-        </p:txBody>
-      </p:sp>
-      <p:sp>
-        <p:nvSpPr>
-          <p:cNvPr id="3" name="Content Placeholder 2"/>
-          <p:cNvSpPr>
-            <a:spLocks noGrp="1"/>
-          </p:cNvSpPr>
-          <p:nvPr>
-            <p:ph idx="1"/>
-          </p:nvPr>
-        </p:nvSpPr>
-        <p:spPr/>
-        <p:txBody>
-          <a:bodyPr/>
-          <a:lstStyle/>
-          <a:p>
-            <a:pPr marL="0" indent="0">
-              <a:buNone/>
-            </a:pPr>
+              <a:t>CRUDY na pudy, </a:t>
+            </a:r>
+            <a:r>
+              <a:rPr lang="pl-PL" dirty="0" smtClean="0"/>
+              <a:t/>
+            </a:r>
+            <a:br>
+              <a:rPr lang="pl-PL" dirty="0" smtClean="0"/>
+            </a:br>
+            <a:r>
+              <a:rPr lang="pl-PL" dirty="0" smtClean="0"/>
+              <a:t>czyli </a:t>
+            </a:r>
+            <a:r>
+              <a:rPr lang="pl-PL" dirty="0"/>
+              <a:t>parę </a:t>
+            </a:r>
+            <a:r>
+              <a:rPr lang="pl-PL" dirty="0" smtClean="0"/>
+              <a:t>słów </a:t>
+            </a:r>
+            <a:r>
+              <a:rPr lang="pl-PL" dirty="0"/>
+              <a:t>o dyskomforcie w </a:t>
+            </a:r>
+            <a:r>
+              <a:rPr lang="pl-PL" dirty="0" smtClean="0"/>
+              <a:t>programowaniu</a:t>
+            </a:r>
+            <a:r>
+              <a:rPr lang="pl-PL" dirty="0"/>
+              <a:t/>
+            </a:r>
+            <a:br>
+              <a:rPr lang="pl-PL" dirty="0"/>
+            </a:br>
             <a:endParaRPr lang="pl-PL" dirty="0"/>
+          </a:p>
+        </p:txBody>
+      </p:sp>
+      <p:sp>
+        <p:nvSpPr>
+          <p:cNvPr id="6" name="Rectangle 5"/>
+          <p:cNvSpPr/>
+          <p:nvPr/>
+        </p:nvSpPr>
+        <p:spPr>
+          <a:xfrm>
+            <a:off x="1778000" y="2057401"/>
+            <a:ext cx="7670800" cy="4616648"/>
+          </a:xfrm>
+          <a:prstGeom prst="rect">
+            <a:avLst/>
+          </a:prstGeom>
+        </p:spPr>
+        <p:txBody>
+          <a:bodyPr wrap="square">
+            <a:spAutoFit/>
+          </a:bodyPr>
+          <a:lstStyle/>
+          <a:p>
+            <a:r>
+              <a:rPr lang="pl-PL" sz="1400" b="1" dirty="0">
+                <a:solidFill>
+                  <a:srgbClr val="0000FF"/>
+                </a:solidFill>
+                <a:highlight>
+                  <a:srgbClr val="FFFFFF"/>
+                </a:highlight>
+              </a:rPr>
+              <a:t>public</a:t>
+            </a:r>
+            <a:r>
+              <a:rPr lang="pl-PL" sz="1400" dirty="0">
+                <a:solidFill>
+                  <a:srgbClr val="000000"/>
+                </a:solidFill>
+                <a:highlight>
+                  <a:srgbClr val="FFFFFF"/>
+                </a:highlight>
+              </a:rPr>
+              <a:t> </a:t>
+            </a:r>
+            <a:r>
+              <a:rPr lang="pl-PL" sz="1400" b="1" dirty="0" err="1">
+                <a:solidFill>
+                  <a:srgbClr val="0000FF"/>
+                </a:solidFill>
+                <a:highlight>
+                  <a:srgbClr val="FFFFFF"/>
+                </a:highlight>
+              </a:rPr>
+              <a:t>abstract</a:t>
+            </a:r>
+            <a:r>
+              <a:rPr lang="pl-PL" sz="1400" dirty="0">
+                <a:solidFill>
+                  <a:srgbClr val="000000"/>
+                </a:solidFill>
+                <a:highlight>
+                  <a:srgbClr val="FFFFFF"/>
+                </a:highlight>
+              </a:rPr>
+              <a:t> </a:t>
+            </a:r>
+            <a:r>
+              <a:rPr lang="pl-PL" sz="1400" dirty="0" err="1">
+                <a:solidFill>
+                  <a:srgbClr val="8000FF"/>
+                </a:solidFill>
+                <a:highlight>
+                  <a:srgbClr val="FFFFFF"/>
+                </a:highlight>
+              </a:rPr>
+              <a:t>class</a:t>
+            </a:r>
+            <a:r>
+              <a:rPr lang="pl-PL" sz="1400" dirty="0">
+                <a:solidFill>
+                  <a:srgbClr val="000000"/>
+                </a:solidFill>
+                <a:highlight>
+                  <a:srgbClr val="FFFFFF"/>
+                </a:highlight>
+              </a:rPr>
+              <a:t> </a:t>
+            </a:r>
+            <a:r>
+              <a:rPr lang="pl-PL" sz="1400" dirty="0" err="1">
+                <a:solidFill>
+                  <a:srgbClr val="000000"/>
+                </a:solidFill>
+                <a:highlight>
+                  <a:srgbClr val="FFFFFF"/>
+                </a:highlight>
+              </a:rPr>
+              <a:t>RepositoryBase</a:t>
+            </a:r>
+            <a:r>
+              <a:rPr lang="pl-PL" sz="1400" b="1" dirty="0">
+                <a:solidFill>
+                  <a:srgbClr val="000080"/>
+                </a:solidFill>
+                <a:highlight>
+                  <a:srgbClr val="FFFFFF"/>
+                </a:highlight>
+              </a:rPr>
+              <a:t>&lt;</a:t>
+            </a:r>
+            <a:r>
+              <a:rPr lang="pl-PL" sz="1400" dirty="0" err="1">
+                <a:solidFill>
+                  <a:srgbClr val="000000"/>
+                </a:solidFill>
+                <a:highlight>
+                  <a:srgbClr val="FFFFFF"/>
+                </a:highlight>
+              </a:rPr>
+              <a:t>TEntity</a:t>
+            </a:r>
+            <a:r>
+              <a:rPr lang="pl-PL" sz="1400" b="1" dirty="0">
+                <a:solidFill>
+                  <a:srgbClr val="000080"/>
+                </a:solidFill>
+                <a:highlight>
+                  <a:srgbClr val="FFFFFF"/>
+                </a:highlight>
+              </a:rPr>
+              <a:t>&gt;</a:t>
+            </a:r>
+            <a:r>
+              <a:rPr lang="pl-PL" sz="1400" dirty="0">
+                <a:solidFill>
+                  <a:srgbClr val="000000"/>
+                </a:solidFill>
+                <a:highlight>
+                  <a:srgbClr val="FFFFFF"/>
+                </a:highlight>
+              </a:rPr>
+              <a:t> </a:t>
+            </a:r>
+          </a:p>
+          <a:p>
+            <a:r>
+              <a:rPr lang="pl-PL" sz="1400" b="1" dirty="0">
+                <a:solidFill>
+                  <a:srgbClr val="000080"/>
+                </a:solidFill>
+                <a:highlight>
+                  <a:srgbClr val="FFFFFF"/>
+                </a:highlight>
+              </a:rPr>
+              <a:t>{</a:t>
+            </a:r>
+            <a:endParaRPr lang="pl-PL" sz="1400" dirty="0">
+              <a:solidFill>
+                <a:srgbClr val="000000"/>
+              </a:solidFill>
+              <a:highlight>
+                <a:srgbClr val="FFFFFF"/>
+              </a:highlight>
+            </a:endParaRPr>
+          </a:p>
+          <a:p>
+            <a:r>
+              <a:rPr lang="pl-PL" sz="1400" dirty="0">
+                <a:solidFill>
+                  <a:srgbClr val="000000"/>
+                </a:solidFill>
+                <a:highlight>
+                  <a:srgbClr val="FFFFFF"/>
+                </a:highlight>
+              </a:rPr>
+              <a:t>    </a:t>
+            </a:r>
+            <a:r>
+              <a:rPr lang="pl-PL" sz="1400" b="1" dirty="0" err="1">
+                <a:solidFill>
+                  <a:srgbClr val="0000FF"/>
+                </a:solidFill>
+                <a:highlight>
+                  <a:srgbClr val="FFFFFF"/>
+                </a:highlight>
+              </a:rPr>
+              <a:t>protected</a:t>
+            </a:r>
+            <a:r>
+              <a:rPr lang="pl-PL" sz="1400" dirty="0">
+                <a:solidFill>
+                  <a:srgbClr val="000000"/>
+                </a:solidFill>
+                <a:highlight>
+                  <a:srgbClr val="FFFFFF"/>
+                </a:highlight>
+              </a:rPr>
+              <a:t> </a:t>
+            </a:r>
+            <a:r>
+              <a:rPr lang="pl-PL" sz="1400" b="1" dirty="0" err="1">
+                <a:solidFill>
+                  <a:srgbClr val="0000FF"/>
+                </a:solidFill>
+                <a:highlight>
+                  <a:srgbClr val="FFFFFF"/>
+                </a:highlight>
+              </a:rPr>
+              <a:t>readonly</a:t>
+            </a:r>
+            <a:r>
+              <a:rPr lang="pl-PL" sz="1400" dirty="0">
+                <a:solidFill>
+                  <a:srgbClr val="000000"/>
+                </a:solidFill>
+                <a:highlight>
+                  <a:srgbClr val="FFFFFF"/>
+                </a:highlight>
+              </a:rPr>
+              <a:t> </a:t>
+            </a:r>
+            <a:r>
+              <a:rPr lang="pl-PL" sz="1400" dirty="0" err="1">
+                <a:solidFill>
+                  <a:srgbClr val="000000"/>
+                </a:solidFill>
+                <a:highlight>
+                  <a:srgbClr val="FFFFFF"/>
+                </a:highlight>
+              </a:rPr>
+              <a:t>IDbSet</a:t>
+            </a:r>
+            <a:r>
+              <a:rPr lang="pl-PL" sz="1400" b="1" dirty="0">
+                <a:solidFill>
+                  <a:srgbClr val="000080"/>
+                </a:solidFill>
+                <a:highlight>
+                  <a:srgbClr val="FFFFFF"/>
+                </a:highlight>
+              </a:rPr>
+              <a:t>&lt;</a:t>
+            </a:r>
+            <a:r>
+              <a:rPr lang="pl-PL" sz="1400" dirty="0" err="1">
+                <a:solidFill>
+                  <a:srgbClr val="000000"/>
+                </a:solidFill>
+                <a:highlight>
+                  <a:srgbClr val="FFFFFF"/>
+                </a:highlight>
+              </a:rPr>
+              <a:t>TEntity</a:t>
+            </a:r>
+            <a:r>
+              <a:rPr lang="pl-PL" sz="1400" b="1" dirty="0">
+                <a:solidFill>
+                  <a:srgbClr val="000080"/>
+                </a:solidFill>
+                <a:highlight>
+                  <a:srgbClr val="FFFFFF"/>
+                </a:highlight>
+              </a:rPr>
+              <a:t>&gt;</a:t>
+            </a:r>
+            <a:r>
+              <a:rPr lang="pl-PL" sz="1400" dirty="0">
+                <a:solidFill>
+                  <a:srgbClr val="000000"/>
+                </a:solidFill>
+                <a:highlight>
+                  <a:srgbClr val="FFFFFF"/>
+                </a:highlight>
+              </a:rPr>
+              <a:t> </a:t>
+            </a:r>
+            <a:r>
+              <a:rPr lang="pl-PL" sz="1400" dirty="0" err="1">
+                <a:solidFill>
+                  <a:srgbClr val="000000"/>
+                </a:solidFill>
+                <a:highlight>
+                  <a:srgbClr val="FFFFFF"/>
+                </a:highlight>
+              </a:rPr>
+              <a:t>DbSet</a:t>
+            </a:r>
+            <a:r>
+              <a:rPr lang="pl-PL" sz="1400" b="1" dirty="0">
+                <a:solidFill>
+                  <a:srgbClr val="000080"/>
+                </a:solidFill>
+                <a:highlight>
+                  <a:srgbClr val="FFFFFF"/>
+                </a:highlight>
+              </a:rPr>
+              <a:t>;</a:t>
+            </a:r>
+            <a:endParaRPr lang="pl-PL" sz="1400" dirty="0">
+              <a:solidFill>
+                <a:srgbClr val="000000"/>
+              </a:solidFill>
+              <a:highlight>
+                <a:srgbClr val="FFFFFF"/>
+              </a:highlight>
+            </a:endParaRPr>
+          </a:p>
+          <a:p>
+            <a:r>
+              <a:rPr lang="pl-PL" sz="1400" dirty="0">
+                <a:solidFill>
+                  <a:srgbClr val="000000"/>
+                </a:solidFill>
+                <a:highlight>
+                  <a:srgbClr val="FFFFFF"/>
+                </a:highlight>
+              </a:rPr>
+              <a:t>        </a:t>
+            </a:r>
+          </a:p>
+          <a:p>
+            <a:r>
+              <a:rPr lang="pl-PL" sz="1400" dirty="0">
+                <a:solidFill>
+                  <a:srgbClr val="000000"/>
+                </a:solidFill>
+                <a:highlight>
+                  <a:srgbClr val="FFFFFF"/>
+                </a:highlight>
+              </a:rPr>
+              <a:t>    </a:t>
+            </a:r>
+            <a:r>
+              <a:rPr lang="pl-PL" sz="1400" b="1" dirty="0">
+                <a:solidFill>
+                  <a:srgbClr val="0000FF"/>
+                </a:solidFill>
+                <a:highlight>
+                  <a:srgbClr val="FFFFFF"/>
+                </a:highlight>
+              </a:rPr>
+              <a:t>public</a:t>
+            </a:r>
+            <a:r>
+              <a:rPr lang="pl-PL" sz="1400" dirty="0">
+                <a:solidFill>
+                  <a:srgbClr val="000000"/>
+                </a:solidFill>
+                <a:highlight>
+                  <a:srgbClr val="FFFFFF"/>
+                </a:highlight>
+              </a:rPr>
+              <a:t> </a:t>
+            </a:r>
+            <a:r>
+              <a:rPr lang="pl-PL" sz="1400" b="1" dirty="0" err="1">
+                <a:solidFill>
+                  <a:srgbClr val="0000FF"/>
+                </a:solidFill>
+                <a:highlight>
+                  <a:srgbClr val="FFFFFF"/>
+                </a:highlight>
+              </a:rPr>
+              <a:t>virtual</a:t>
+            </a:r>
+            <a:r>
+              <a:rPr lang="pl-PL" sz="1400" dirty="0">
+                <a:solidFill>
+                  <a:srgbClr val="000000"/>
+                </a:solidFill>
+                <a:highlight>
+                  <a:srgbClr val="FFFFFF"/>
+                </a:highlight>
+              </a:rPr>
+              <a:t> </a:t>
+            </a:r>
+            <a:r>
+              <a:rPr lang="pl-PL" sz="1400" dirty="0" err="1">
+                <a:solidFill>
+                  <a:srgbClr val="000000"/>
+                </a:solidFill>
+                <a:highlight>
+                  <a:srgbClr val="FFFFFF"/>
+                </a:highlight>
+              </a:rPr>
+              <a:t>TEntity</a:t>
+            </a:r>
+            <a:r>
+              <a:rPr lang="pl-PL" sz="1400" dirty="0">
+                <a:solidFill>
+                  <a:srgbClr val="000000"/>
+                </a:solidFill>
+                <a:highlight>
+                  <a:srgbClr val="FFFFFF"/>
+                </a:highlight>
+              </a:rPr>
+              <a:t> </a:t>
+            </a:r>
+            <a:r>
+              <a:rPr lang="pl-PL" sz="1400" dirty="0" err="1">
+                <a:solidFill>
+                  <a:srgbClr val="000000"/>
+                </a:solidFill>
+                <a:highlight>
+                  <a:srgbClr val="FFFFFF"/>
+                </a:highlight>
+              </a:rPr>
+              <a:t>Add</a:t>
+            </a:r>
+            <a:r>
+              <a:rPr lang="pl-PL" sz="1400" b="1" dirty="0">
+                <a:solidFill>
+                  <a:srgbClr val="000080"/>
+                </a:solidFill>
+                <a:highlight>
+                  <a:srgbClr val="FFFFFF"/>
+                </a:highlight>
+              </a:rPr>
+              <a:t>(</a:t>
+            </a:r>
+            <a:r>
+              <a:rPr lang="pl-PL" sz="1400" dirty="0" err="1">
+                <a:solidFill>
+                  <a:srgbClr val="000000"/>
+                </a:solidFill>
+                <a:highlight>
+                  <a:srgbClr val="FFFFFF"/>
+                </a:highlight>
+              </a:rPr>
+              <a:t>TEntity</a:t>
+            </a:r>
+            <a:r>
+              <a:rPr lang="pl-PL" sz="1400" dirty="0">
+                <a:solidFill>
+                  <a:srgbClr val="000000"/>
+                </a:solidFill>
+                <a:highlight>
+                  <a:srgbClr val="FFFFFF"/>
+                </a:highlight>
+              </a:rPr>
+              <a:t> </a:t>
+            </a:r>
+            <a:r>
+              <a:rPr lang="pl-PL" sz="1400" dirty="0" err="1">
+                <a:solidFill>
+                  <a:srgbClr val="000000"/>
+                </a:solidFill>
+                <a:highlight>
+                  <a:srgbClr val="FFFFFF"/>
+                </a:highlight>
+              </a:rPr>
+              <a:t>entity</a:t>
+            </a:r>
+            <a:r>
+              <a:rPr lang="pl-PL" sz="1400" b="1" dirty="0">
+                <a:solidFill>
+                  <a:srgbClr val="000080"/>
+                </a:solidFill>
+                <a:highlight>
+                  <a:srgbClr val="FFFFFF"/>
+                </a:highlight>
+              </a:rPr>
+              <a:t>)</a:t>
+            </a:r>
+            <a:endParaRPr lang="pl-PL" sz="1400" dirty="0">
+              <a:solidFill>
+                <a:srgbClr val="000000"/>
+              </a:solidFill>
+              <a:highlight>
+                <a:srgbClr val="FFFFFF"/>
+              </a:highlight>
+            </a:endParaRPr>
+          </a:p>
+          <a:p>
+            <a:r>
+              <a:rPr lang="pl-PL" sz="1400" dirty="0">
+                <a:solidFill>
+                  <a:srgbClr val="000000"/>
+                </a:solidFill>
+                <a:highlight>
+                  <a:srgbClr val="FFFFFF"/>
+                </a:highlight>
+              </a:rPr>
+              <a:t>    </a:t>
+            </a:r>
+            <a:r>
+              <a:rPr lang="pl-PL" sz="1400" b="1" dirty="0">
+                <a:solidFill>
+                  <a:srgbClr val="000080"/>
+                </a:solidFill>
+                <a:highlight>
+                  <a:srgbClr val="FFFFFF"/>
+                </a:highlight>
+              </a:rPr>
+              <a:t>{</a:t>
+            </a:r>
+            <a:endParaRPr lang="pl-PL" sz="1400" dirty="0">
+              <a:solidFill>
+                <a:srgbClr val="000000"/>
+              </a:solidFill>
+              <a:highlight>
+                <a:srgbClr val="FFFFFF"/>
+              </a:highlight>
+            </a:endParaRPr>
+          </a:p>
+          <a:p>
+            <a:r>
+              <a:rPr lang="pl-PL" sz="1400" dirty="0">
+                <a:solidFill>
+                  <a:srgbClr val="000000"/>
+                </a:solidFill>
+                <a:highlight>
+                  <a:srgbClr val="FFFFFF"/>
+                </a:highlight>
+              </a:rPr>
+              <a:t>	</a:t>
+            </a:r>
+            <a:r>
+              <a:rPr lang="pl-PL" sz="1400" dirty="0" err="1" smtClean="0">
+                <a:solidFill>
+                  <a:srgbClr val="000000"/>
+                </a:solidFill>
+                <a:highlight>
+                  <a:srgbClr val="FFFFFF"/>
+                </a:highlight>
+              </a:rPr>
+              <a:t>var</a:t>
+            </a:r>
+            <a:r>
+              <a:rPr lang="pl-PL" sz="1400" dirty="0" smtClean="0">
+                <a:solidFill>
+                  <a:srgbClr val="000000"/>
+                </a:solidFill>
+                <a:highlight>
+                  <a:srgbClr val="FFFFFF"/>
+                </a:highlight>
+              </a:rPr>
+              <a:t> </a:t>
+            </a:r>
+            <a:r>
+              <a:rPr lang="pl-PL" sz="1400" dirty="0" err="1">
+                <a:solidFill>
+                  <a:srgbClr val="000000"/>
+                </a:solidFill>
+                <a:highlight>
+                  <a:srgbClr val="FFFFFF"/>
+                </a:highlight>
+              </a:rPr>
+              <a:t>result</a:t>
+            </a:r>
+            <a:r>
+              <a:rPr lang="pl-PL" sz="1400" dirty="0">
+                <a:solidFill>
+                  <a:srgbClr val="000000"/>
+                </a:solidFill>
+                <a:highlight>
+                  <a:srgbClr val="FFFFFF"/>
+                </a:highlight>
+              </a:rPr>
+              <a:t> </a:t>
+            </a:r>
+            <a:r>
+              <a:rPr lang="pl-PL" sz="1400" b="1" dirty="0">
+                <a:solidFill>
+                  <a:srgbClr val="000080"/>
+                </a:solidFill>
+                <a:highlight>
+                  <a:srgbClr val="FFFFFF"/>
+                </a:highlight>
+              </a:rPr>
+              <a:t>=</a:t>
+            </a:r>
+            <a:r>
+              <a:rPr lang="pl-PL" sz="1400" dirty="0">
+                <a:solidFill>
+                  <a:srgbClr val="000000"/>
+                </a:solidFill>
+                <a:highlight>
+                  <a:srgbClr val="FFFFFF"/>
+                </a:highlight>
+              </a:rPr>
+              <a:t> </a:t>
+            </a:r>
+            <a:r>
+              <a:rPr lang="pl-PL" sz="1400" dirty="0" err="1">
+                <a:solidFill>
+                  <a:srgbClr val="000000"/>
+                </a:solidFill>
+                <a:highlight>
+                  <a:srgbClr val="FFFFFF"/>
+                </a:highlight>
+              </a:rPr>
+              <a:t>DbSet</a:t>
+            </a:r>
+            <a:r>
+              <a:rPr lang="pl-PL" sz="1400" b="1" dirty="0" err="1">
+                <a:solidFill>
+                  <a:srgbClr val="000080"/>
+                </a:solidFill>
+                <a:highlight>
+                  <a:srgbClr val="FFFFFF"/>
+                </a:highlight>
+              </a:rPr>
+              <a:t>.</a:t>
+            </a:r>
+            <a:r>
+              <a:rPr lang="pl-PL" sz="1400" dirty="0" err="1">
+                <a:solidFill>
+                  <a:srgbClr val="000000"/>
+                </a:solidFill>
+                <a:highlight>
+                  <a:srgbClr val="FFFFFF"/>
+                </a:highlight>
+              </a:rPr>
+              <a:t>Add</a:t>
+            </a:r>
+            <a:r>
+              <a:rPr lang="pl-PL" sz="1400" b="1" dirty="0">
+                <a:solidFill>
+                  <a:srgbClr val="000080"/>
+                </a:solidFill>
+                <a:highlight>
+                  <a:srgbClr val="FFFFFF"/>
+                </a:highlight>
+              </a:rPr>
+              <a:t>(</a:t>
+            </a:r>
+            <a:r>
+              <a:rPr lang="pl-PL" sz="1400" dirty="0" err="1">
+                <a:solidFill>
+                  <a:srgbClr val="000000"/>
+                </a:solidFill>
+                <a:highlight>
+                  <a:srgbClr val="FFFFFF"/>
+                </a:highlight>
+              </a:rPr>
+              <a:t>entity</a:t>
+            </a:r>
+            <a:r>
+              <a:rPr lang="pl-PL" sz="1400" b="1" dirty="0">
+                <a:solidFill>
+                  <a:srgbClr val="000080"/>
+                </a:solidFill>
+                <a:highlight>
+                  <a:srgbClr val="FFFFFF"/>
+                </a:highlight>
+              </a:rPr>
+              <a:t>);</a:t>
+            </a:r>
+            <a:endParaRPr lang="pl-PL" sz="1400" dirty="0">
+              <a:solidFill>
+                <a:srgbClr val="000000"/>
+              </a:solidFill>
+              <a:highlight>
+                <a:srgbClr val="FFFFFF"/>
+              </a:highlight>
+            </a:endParaRPr>
+          </a:p>
+          <a:p>
+            <a:r>
+              <a:rPr lang="pl-PL" sz="1400" dirty="0">
+                <a:solidFill>
+                  <a:srgbClr val="000000"/>
+                </a:solidFill>
+                <a:highlight>
+                  <a:srgbClr val="FFFFFF"/>
+                </a:highlight>
+              </a:rPr>
+              <a:t>	</a:t>
+            </a:r>
+            <a:r>
+              <a:rPr lang="pl-PL" sz="1400" dirty="0" err="1" smtClean="0">
+                <a:solidFill>
+                  <a:srgbClr val="000000"/>
+                </a:solidFill>
+                <a:highlight>
+                  <a:srgbClr val="FFFFFF"/>
+                </a:highlight>
+              </a:rPr>
+              <a:t>SaveChanges</a:t>
+            </a:r>
+            <a:r>
+              <a:rPr lang="pl-PL" sz="1400" b="1" dirty="0">
+                <a:solidFill>
+                  <a:srgbClr val="000080"/>
+                </a:solidFill>
+                <a:highlight>
+                  <a:srgbClr val="FFFFFF"/>
+                </a:highlight>
+              </a:rPr>
+              <a:t>();</a:t>
+            </a:r>
+            <a:endParaRPr lang="pl-PL" sz="1400" dirty="0">
+              <a:solidFill>
+                <a:srgbClr val="000000"/>
+              </a:solidFill>
+              <a:highlight>
+                <a:srgbClr val="FFFFFF"/>
+              </a:highlight>
+            </a:endParaRPr>
+          </a:p>
+          <a:p>
+            <a:r>
+              <a:rPr lang="pl-PL" sz="1400" dirty="0">
+                <a:solidFill>
+                  <a:srgbClr val="000000"/>
+                </a:solidFill>
+                <a:highlight>
+                  <a:srgbClr val="FFFFFF"/>
+                </a:highlight>
+              </a:rPr>
+              <a:t>	</a:t>
+            </a:r>
+            <a:r>
+              <a:rPr lang="pl-PL" sz="1400" b="1" dirty="0" smtClean="0">
+                <a:solidFill>
+                  <a:srgbClr val="0000FF"/>
+                </a:solidFill>
+                <a:highlight>
+                  <a:srgbClr val="FFFFFF"/>
+                </a:highlight>
+              </a:rPr>
+              <a:t>return</a:t>
+            </a:r>
+            <a:r>
+              <a:rPr lang="pl-PL" sz="1400" dirty="0" smtClean="0">
+                <a:solidFill>
+                  <a:srgbClr val="000000"/>
+                </a:solidFill>
+                <a:highlight>
+                  <a:srgbClr val="FFFFFF"/>
+                </a:highlight>
+              </a:rPr>
+              <a:t> </a:t>
+            </a:r>
+            <a:r>
+              <a:rPr lang="pl-PL" sz="1400" dirty="0" err="1">
+                <a:solidFill>
+                  <a:srgbClr val="000000"/>
+                </a:solidFill>
+                <a:highlight>
+                  <a:srgbClr val="FFFFFF"/>
+                </a:highlight>
+              </a:rPr>
+              <a:t>result</a:t>
+            </a:r>
+            <a:r>
+              <a:rPr lang="pl-PL" sz="1400" b="1" dirty="0">
+                <a:solidFill>
+                  <a:srgbClr val="000080"/>
+                </a:solidFill>
+                <a:highlight>
+                  <a:srgbClr val="FFFFFF"/>
+                </a:highlight>
+              </a:rPr>
+              <a:t>;</a:t>
+            </a:r>
+            <a:endParaRPr lang="pl-PL" sz="1400" dirty="0">
+              <a:solidFill>
+                <a:srgbClr val="000000"/>
+              </a:solidFill>
+              <a:highlight>
+                <a:srgbClr val="FFFFFF"/>
+              </a:highlight>
+            </a:endParaRPr>
+          </a:p>
+          <a:p>
+            <a:r>
+              <a:rPr lang="pl-PL" sz="1400" dirty="0" smtClean="0">
+                <a:solidFill>
+                  <a:srgbClr val="000000"/>
+                </a:solidFill>
+                <a:highlight>
+                  <a:srgbClr val="FFFFFF"/>
+                </a:highlight>
+              </a:rPr>
+              <a:t>    </a:t>
+            </a:r>
+            <a:r>
+              <a:rPr lang="pl-PL" sz="1400" b="1" dirty="0" smtClean="0">
+                <a:solidFill>
+                  <a:srgbClr val="000080"/>
+                </a:solidFill>
+                <a:highlight>
+                  <a:srgbClr val="FFFFFF"/>
+                </a:highlight>
+              </a:rPr>
+              <a:t>}</a:t>
+            </a:r>
+            <a:endParaRPr lang="pl-PL" sz="1400" dirty="0">
+              <a:solidFill>
+                <a:srgbClr val="000000"/>
+              </a:solidFill>
+              <a:highlight>
+                <a:srgbClr val="FFFFFF"/>
+              </a:highlight>
+            </a:endParaRPr>
+          </a:p>
+          <a:p>
+            <a:r>
+              <a:rPr lang="pl-PL" sz="1400" b="1" dirty="0" smtClean="0">
+                <a:solidFill>
+                  <a:srgbClr val="0000FF"/>
+                </a:solidFill>
+                <a:highlight>
+                  <a:srgbClr val="FFFFFF"/>
+                </a:highlight>
+              </a:rPr>
+              <a:t>    public</a:t>
+            </a:r>
+            <a:r>
+              <a:rPr lang="pl-PL" sz="1400" dirty="0" smtClean="0">
+                <a:solidFill>
+                  <a:srgbClr val="000000"/>
+                </a:solidFill>
+                <a:highlight>
+                  <a:srgbClr val="FFFFFF"/>
+                </a:highlight>
+              </a:rPr>
+              <a:t> </a:t>
+            </a:r>
+            <a:r>
+              <a:rPr lang="pl-PL" sz="1400" b="1" dirty="0" err="1">
+                <a:solidFill>
+                  <a:srgbClr val="0000FF"/>
+                </a:solidFill>
+                <a:highlight>
+                  <a:srgbClr val="FFFFFF"/>
+                </a:highlight>
+              </a:rPr>
+              <a:t>virtual</a:t>
+            </a:r>
+            <a:r>
+              <a:rPr lang="pl-PL" sz="1400" dirty="0">
+                <a:solidFill>
+                  <a:srgbClr val="000000"/>
+                </a:solidFill>
+                <a:highlight>
+                  <a:srgbClr val="FFFFFF"/>
+                </a:highlight>
+              </a:rPr>
+              <a:t> </a:t>
+            </a:r>
+            <a:r>
+              <a:rPr lang="pl-PL" sz="1400" dirty="0" err="1">
+                <a:solidFill>
+                  <a:srgbClr val="000000"/>
+                </a:solidFill>
+                <a:highlight>
+                  <a:srgbClr val="FFFFFF"/>
+                </a:highlight>
+              </a:rPr>
+              <a:t>TEntity</a:t>
+            </a:r>
+            <a:r>
+              <a:rPr lang="pl-PL" sz="1400" dirty="0">
+                <a:solidFill>
+                  <a:srgbClr val="000000"/>
+                </a:solidFill>
+                <a:highlight>
+                  <a:srgbClr val="FFFFFF"/>
+                </a:highlight>
+              </a:rPr>
+              <a:t> Update</a:t>
+            </a:r>
+            <a:r>
+              <a:rPr lang="pl-PL" sz="1400" b="1" dirty="0">
+                <a:solidFill>
+                  <a:srgbClr val="000080"/>
+                </a:solidFill>
+                <a:highlight>
+                  <a:srgbClr val="FFFFFF"/>
+                </a:highlight>
+              </a:rPr>
+              <a:t>(</a:t>
+            </a:r>
+            <a:r>
+              <a:rPr lang="pl-PL" sz="1400" dirty="0" err="1">
+                <a:solidFill>
+                  <a:srgbClr val="000000"/>
+                </a:solidFill>
+                <a:highlight>
+                  <a:srgbClr val="FFFFFF"/>
+                </a:highlight>
+              </a:rPr>
+              <a:t>TEntity</a:t>
+            </a:r>
+            <a:r>
+              <a:rPr lang="pl-PL" sz="1400" dirty="0">
+                <a:solidFill>
+                  <a:srgbClr val="000000"/>
+                </a:solidFill>
+                <a:highlight>
+                  <a:srgbClr val="FFFFFF"/>
+                </a:highlight>
+              </a:rPr>
+              <a:t> </a:t>
+            </a:r>
+            <a:r>
+              <a:rPr lang="pl-PL" sz="1400" dirty="0" err="1">
+                <a:solidFill>
+                  <a:srgbClr val="000000"/>
+                </a:solidFill>
+                <a:highlight>
+                  <a:srgbClr val="FFFFFF"/>
+                </a:highlight>
+              </a:rPr>
+              <a:t>entity</a:t>
+            </a:r>
+            <a:r>
+              <a:rPr lang="pl-PL" sz="1400" b="1" dirty="0">
+                <a:solidFill>
+                  <a:srgbClr val="000080"/>
+                </a:solidFill>
+                <a:highlight>
+                  <a:srgbClr val="FFFFFF"/>
+                </a:highlight>
+              </a:rPr>
+              <a:t>)</a:t>
+            </a:r>
+            <a:endParaRPr lang="pl-PL" sz="1400" dirty="0">
+              <a:solidFill>
+                <a:srgbClr val="000000"/>
+              </a:solidFill>
+              <a:highlight>
+                <a:srgbClr val="FFFFFF"/>
+              </a:highlight>
+            </a:endParaRPr>
+          </a:p>
+          <a:p>
+            <a:r>
+              <a:rPr lang="pl-PL" sz="1400" dirty="0">
+                <a:solidFill>
+                  <a:srgbClr val="000000"/>
+                </a:solidFill>
+                <a:highlight>
+                  <a:srgbClr val="FFFFFF"/>
+                </a:highlight>
+              </a:rPr>
+              <a:t>    </a:t>
+            </a:r>
+            <a:r>
+              <a:rPr lang="pl-PL" sz="1400" b="1" dirty="0">
+                <a:solidFill>
+                  <a:srgbClr val="000080"/>
+                </a:solidFill>
+                <a:highlight>
+                  <a:srgbClr val="FFFFFF"/>
+                </a:highlight>
+              </a:rPr>
+              <a:t>{</a:t>
+            </a:r>
+            <a:endParaRPr lang="pl-PL" sz="1400" dirty="0">
+              <a:solidFill>
+                <a:srgbClr val="000000"/>
+              </a:solidFill>
+              <a:highlight>
+                <a:srgbClr val="FFFFFF"/>
+              </a:highlight>
+            </a:endParaRPr>
+          </a:p>
+          <a:p>
+            <a:r>
+              <a:rPr lang="pl-PL" sz="1400" dirty="0">
+                <a:solidFill>
+                  <a:srgbClr val="000000"/>
+                </a:solidFill>
+                <a:highlight>
+                  <a:srgbClr val="FFFFFF"/>
+                </a:highlight>
+              </a:rPr>
+              <a:t>        </a:t>
+            </a:r>
+            <a:r>
+              <a:rPr lang="pl-PL" sz="1400" dirty="0" smtClean="0">
+                <a:solidFill>
+                  <a:srgbClr val="000000"/>
+                </a:solidFill>
+                <a:highlight>
+                  <a:srgbClr val="FFFFFF"/>
+                </a:highlight>
+              </a:rPr>
+              <a:t>  </a:t>
+            </a:r>
+            <a:r>
+              <a:rPr lang="pl-PL" sz="1400" dirty="0" err="1" smtClean="0">
+                <a:solidFill>
+                  <a:srgbClr val="000000"/>
+                </a:solidFill>
+                <a:highlight>
+                  <a:srgbClr val="FFFFFF"/>
+                </a:highlight>
+              </a:rPr>
+              <a:t>var</a:t>
+            </a:r>
+            <a:r>
+              <a:rPr lang="pl-PL" sz="1400" dirty="0" smtClean="0">
+                <a:solidFill>
+                  <a:srgbClr val="000000"/>
+                </a:solidFill>
+                <a:highlight>
+                  <a:srgbClr val="FFFFFF"/>
+                </a:highlight>
+              </a:rPr>
+              <a:t> </a:t>
+            </a:r>
+            <a:r>
+              <a:rPr lang="pl-PL" sz="1400" dirty="0" err="1">
+                <a:solidFill>
+                  <a:srgbClr val="000000"/>
+                </a:solidFill>
+                <a:highlight>
+                  <a:srgbClr val="FFFFFF"/>
+                </a:highlight>
+              </a:rPr>
+              <a:t>oldEntity</a:t>
+            </a:r>
+            <a:r>
+              <a:rPr lang="pl-PL" sz="1400" dirty="0">
+                <a:solidFill>
+                  <a:srgbClr val="000000"/>
+                </a:solidFill>
+                <a:highlight>
+                  <a:srgbClr val="FFFFFF"/>
+                </a:highlight>
+              </a:rPr>
+              <a:t> </a:t>
+            </a:r>
+            <a:r>
+              <a:rPr lang="pl-PL" sz="1400" b="1" dirty="0">
+                <a:solidFill>
+                  <a:srgbClr val="000080"/>
+                </a:solidFill>
+                <a:highlight>
+                  <a:srgbClr val="FFFFFF"/>
+                </a:highlight>
+              </a:rPr>
+              <a:t>=</a:t>
+            </a:r>
+            <a:r>
+              <a:rPr lang="pl-PL" sz="1400" dirty="0">
+                <a:solidFill>
+                  <a:srgbClr val="000000"/>
+                </a:solidFill>
+                <a:highlight>
+                  <a:srgbClr val="FFFFFF"/>
+                </a:highlight>
+              </a:rPr>
+              <a:t> </a:t>
+            </a:r>
+            <a:r>
+              <a:rPr lang="pl-PL" sz="1400" dirty="0" err="1">
+                <a:solidFill>
+                  <a:srgbClr val="000000"/>
+                </a:solidFill>
+                <a:highlight>
+                  <a:srgbClr val="FFFFFF"/>
+                </a:highlight>
+              </a:rPr>
+              <a:t>Context</a:t>
+            </a:r>
+            <a:r>
+              <a:rPr lang="pl-PL" sz="1400" b="1" dirty="0" err="1">
+                <a:solidFill>
+                  <a:srgbClr val="000080"/>
+                </a:solidFill>
+                <a:highlight>
+                  <a:srgbClr val="FFFFFF"/>
+                </a:highlight>
+              </a:rPr>
+              <a:t>.</a:t>
+            </a:r>
+            <a:r>
+              <a:rPr lang="pl-PL" sz="1400" dirty="0" err="1">
+                <a:solidFill>
+                  <a:srgbClr val="000000"/>
+                </a:solidFill>
+                <a:highlight>
+                  <a:srgbClr val="FFFFFF"/>
+                </a:highlight>
+              </a:rPr>
+              <a:t>Entry</a:t>
+            </a:r>
+            <a:r>
+              <a:rPr lang="pl-PL" sz="1400" b="1" dirty="0">
+                <a:solidFill>
+                  <a:srgbClr val="000080"/>
+                </a:solidFill>
+                <a:highlight>
+                  <a:srgbClr val="FFFFFF"/>
+                </a:highlight>
+              </a:rPr>
+              <a:t>(</a:t>
+            </a:r>
+            <a:r>
+              <a:rPr lang="pl-PL" sz="1400" dirty="0" err="1">
+                <a:solidFill>
+                  <a:srgbClr val="000000"/>
+                </a:solidFill>
+                <a:highlight>
+                  <a:srgbClr val="FFFFFF"/>
+                </a:highlight>
+              </a:rPr>
+              <a:t>entity</a:t>
+            </a:r>
+            <a:r>
+              <a:rPr lang="pl-PL" sz="1400" b="1" dirty="0">
+                <a:solidFill>
+                  <a:srgbClr val="000080"/>
+                </a:solidFill>
+                <a:highlight>
+                  <a:srgbClr val="FFFFFF"/>
+                </a:highlight>
+              </a:rPr>
+              <a:t>);</a:t>
+            </a:r>
+            <a:endParaRPr lang="pl-PL" sz="1400" dirty="0">
+              <a:solidFill>
+                <a:srgbClr val="000000"/>
+              </a:solidFill>
+              <a:highlight>
+                <a:srgbClr val="FFFFFF"/>
+              </a:highlight>
+            </a:endParaRPr>
+          </a:p>
+          <a:p>
+            <a:r>
+              <a:rPr lang="pl-PL" sz="1400" dirty="0">
+                <a:solidFill>
+                  <a:srgbClr val="000000"/>
+                </a:solidFill>
+                <a:highlight>
+                  <a:srgbClr val="FFFFFF"/>
+                </a:highlight>
+              </a:rPr>
+              <a:t>        </a:t>
+            </a:r>
+            <a:r>
+              <a:rPr lang="pl-PL" sz="1400" dirty="0" smtClean="0">
+                <a:solidFill>
+                  <a:srgbClr val="000000"/>
+                </a:solidFill>
+                <a:highlight>
+                  <a:srgbClr val="FFFFFF"/>
+                </a:highlight>
+              </a:rPr>
+              <a:t>  </a:t>
+            </a:r>
+            <a:r>
+              <a:rPr lang="pl-PL" sz="1400" b="1" dirty="0" err="1" smtClean="0">
+                <a:solidFill>
+                  <a:srgbClr val="0000FF"/>
+                </a:solidFill>
+                <a:highlight>
+                  <a:srgbClr val="FFFFFF"/>
+                </a:highlight>
+              </a:rPr>
+              <a:t>if</a:t>
+            </a:r>
+            <a:r>
+              <a:rPr lang="pl-PL" sz="1400" dirty="0" smtClean="0">
+                <a:solidFill>
+                  <a:srgbClr val="000000"/>
+                </a:solidFill>
+                <a:highlight>
+                  <a:srgbClr val="FFFFFF"/>
+                </a:highlight>
+              </a:rPr>
+              <a:t> </a:t>
+            </a:r>
+            <a:r>
+              <a:rPr lang="pl-PL" sz="1400" b="1" dirty="0">
+                <a:solidFill>
+                  <a:srgbClr val="000080"/>
+                </a:solidFill>
+                <a:highlight>
+                  <a:srgbClr val="FFFFFF"/>
+                </a:highlight>
+              </a:rPr>
+              <a:t>(</a:t>
+            </a:r>
+            <a:r>
+              <a:rPr lang="pl-PL" sz="1400" dirty="0" err="1">
+                <a:solidFill>
+                  <a:srgbClr val="000000"/>
+                </a:solidFill>
+                <a:highlight>
+                  <a:srgbClr val="FFFFFF"/>
+                </a:highlight>
+              </a:rPr>
+              <a:t>oldEntity</a:t>
+            </a:r>
+            <a:r>
+              <a:rPr lang="pl-PL" sz="1400" b="1" dirty="0" err="1">
+                <a:solidFill>
+                  <a:srgbClr val="000080"/>
+                </a:solidFill>
+                <a:highlight>
+                  <a:srgbClr val="FFFFFF"/>
+                </a:highlight>
+              </a:rPr>
+              <a:t>.</a:t>
+            </a:r>
+            <a:r>
+              <a:rPr lang="pl-PL" sz="1400" dirty="0" err="1">
+                <a:solidFill>
+                  <a:srgbClr val="000000"/>
+                </a:solidFill>
+                <a:highlight>
+                  <a:srgbClr val="FFFFFF"/>
+                </a:highlight>
+              </a:rPr>
+              <a:t>State</a:t>
+            </a:r>
+            <a:r>
+              <a:rPr lang="pl-PL" sz="1400" dirty="0">
+                <a:solidFill>
+                  <a:srgbClr val="000000"/>
+                </a:solidFill>
+                <a:highlight>
+                  <a:srgbClr val="FFFFFF"/>
+                </a:highlight>
+              </a:rPr>
+              <a:t> </a:t>
+            </a:r>
+            <a:r>
+              <a:rPr lang="pl-PL" sz="1400" b="1" dirty="0">
+                <a:solidFill>
+                  <a:srgbClr val="000080"/>
+                </a:solidFill>
+                <a:highlight>
+                  <a:srgbClr val="FFFFFF"/>
+                </a:highlight>
+              </a:rPr>
+              <a:t>!=</a:t>
+            </a:r>
+            <a:r>
+              <a:rPr lang="pl-PL" sz="1400" dirty="0">
+                <a:solidFill>
+                  <a:srgbClr val="000000"/>
+                </a:solidFill>
+                <a:highlight>
+                  <a:srgbClr val="FFFFFF"/>
+                </a:highlight>
+              </a:rPr>
+              <a:t> </a:t>
+            </a:r>
+            <a:r>
+              <a:rPr lang="pl-PL" sz="1400" dirty="0" err="1">
+                <a:solidFill>
+                  <a:srgbClr val="000000"/>
+                </a:solidFill>
+                <a:highlight>
+                  <a:srgbClr val="FFFFFF"/>
+                </a:highlight>
+              </a:rPr>
+              <a:t>EntityState</a:t>
+            </a:r>
+            <a:r>
+              <a:rPr lang="pl-PL" sz="1400" b="1" dirty="0" err="1">
+                <a:solidFill>
+                  <a:srgbClr val="000080"/>
+                </a:solidFill>
+                <a:highlight>
+                  <a:srgbClr val="FFFFFF"/>
+                </a:highlight>
+              </a:rPr>
+              <a:t>.</a:t>
+            </a:r>
+            <a:r>
+              <a:rPr lang="pl-PL" sz="1400" dirty="0" err="1">
+                <a:solidFill>
+                  <a:srgbClr val="000000"/>
+                </a:solidFill>
+                <a:highlight>
+                  <a:srgbClr val="FFFFFF"/>
+                </a:highlight>
+              </a:rPr>
+              <a:t>Detached</a:t>
+            </a:r>
+            <a:r>
+              <a:rPr lang="pl-PL" sz="1400" b="1" dirty="0">
+                <a:solidFill>
+                  <a:srgbClr val="000080"/>
+                </a:solidFill>
+                <a:highlight>
+                  <a:srgbClr val="FFFFFF"/>
+                </a:highlight>
+              </a:rPr>
+              <a:t>)</a:t>
+            </a:r>
+            <a:endParaRPr lang="pl-PL" sz="1400" dirty="0">
+              <a:solidFill>
+                <a:srgbClr val="000000"/>
+              </a:solidFill>
+              <a:highlight>
+                <a:srgbClr val="FFFFFF"/>
+              </a:highlight>
+            </a:endParaRPr>
+          </a:p>
+          <a:p>
+            <a:r>
+              <a:rPr lang="pl-PL" sz="1400" dirty="0">
+                <a:solidFill>
+                  <a:srgbClr val="000000"/>
+                </a:solidFill>
+                <a:highlight>
+                  <a:srgbClr val="FFFFFF"/>
+                </a:highlight>
+              </a:rPr>
+              <a:t>          </a:t>
+            </a:r>
+            <a:r>
+              <a:rPr lang="pl-PL" sz="1400" dirty="0" smtClean="0">
+                <a:solidFill>
+                  <a:srgbClr val="000000"/>
+                </a:solidFill>
+                <a:highlight>
+                  <a:srgbClr val="FFFFFF"/>
+                </a:highlight>
+              </a:rPr>
+              <a:t>    </a:t>
+            </a:r>
+            <a:r>
+              <a:rPr lang="pl-PL" sz="1400" b="1" dirty="0">
+                <a:solidFill>
+                  <a:srgbClr val="0000FF"/>
+                </a:solidFill>
+                <a:highlight>
+                  <a:srgbClr val="FFFFFF"/>
+                </a:highlight>
+              </a:rPr>
+              <a:t>return</a:t>
+            </a:r>
+            <a:r>
+              <a:rPr lang="pl-PL" sz="1400" dirty="0">
+                <a:solidFill>
+                  <a:srgbClr val="000000"/>
+                </a:solidFill>
+                <a:highlight>
+                  <a:srgbClr val="FFFFFF"/>
+                </a:highlight>
+              </a:rPr>
+              <a:t> </a:t>
+            </a:r>
+            <a:r>
+              <a:rPr lang="pl-PL" sz="1400" dirty="0" err="1">
+                <a:solidFill>
+                  <a:srgbClr val="000000"/>
+                </a:solidFill>
+                <a:highlight>
+                  <a:srgbClr val="FFFFFF"/>
+                </a:highlight>
+              </a:rPr>
+              <a:t>oldEntity</a:t>
+            </a:r>
+            <a:r>
+              <a:rPr lang="pl-PL" sz="1400" b="1" dirty="0" err="1">
+                <a:solidFill>
+                  <a:srgbClr val="000080"/>
+                </a:solidFill>
+                <a:highlight>
+                  <a:srgbClr val="FFFFFF"/>
+                </a:highlight>
+              </a:rPr>
+              <a:t>.</a:t>
+            </a:r>
+            <a:r>
+              <a:rPr lang="pl-PL" sz="1400" dirty="0" err="1">
+                <a:solidFill>
+                  <a:srgbClr val="000000"/>
+                </a:solidFill>
+                <a:highlight>
+                  <a:srgbClr val="FFFFFF"/>
+                </a:highlight>
+              </a:rPr>
+              <a:t>Entity</a:t>
+            </a:r>
+            <a:r>
+              <a:rPr lang="pl-PL" sz="1400" b="1" dirty="0">
+                <a:solidFill>
+                  <a:srgbClr val="000080"/>
+                </a:solidFill>
+                <a:highlight>
+                  <a:srgbClr val="FFFFFF"/>
+                </a:highlight>
+              </a:rPr>
+              <a:t>;</a:t>
+            </a:r>
+            <a:endParaRPr lang="pl-PL" sz="1400" dirty="0">
+              <a:solidFill>
+                <a:srgbClr val="000000"/>
+              </a:solidFill>
+              <a:highlight>
+                <a:srgbClr val="FFFFFF"/>
+              </a:highlight>
+            </a:endParaRPr>
+          </a:p>
+          <a:p>
+            <a:r>
+              <a:rPr lang="pl-PL" sz="1400" dirty="0">
+                <a:solidFill>
+                  <a:srgbClr val="000000"/>
+                </a:solidFill>
+                <a:highlight>
+                  <a:srgbClr val="FFFFFF"/>
+                </a:highlight>
+              </a:rPr>
+              <a:t>        </a:t>
+            </a:r>
+            <a:r>
+              <a:rPr lang="pl-PL" sz="1400" dirty="0" smtClean="0">
+                <a:solidFill>
+                  <a:srgbClr val="000000"/>
+                </a:solidFill>
+                <a:highlight>
+                  <a:srgbClr val="FFFFFF"/>
+                </a:highlight>
+              </a:rPr>
+              <a:t>  </a:t>
+            </a:r>
+            <a:r>
+              <a:rPr lang="pl-PL" sz="1400" dirty="0" err="1" smtClean="0">
+                <a:solidFill>
+                  <a:srgbClr val="000000"/>
+                </a:solidFill>
+                <a:highlight>
+                  <a:srgbClr val="FFFFFF"/>
+                </a:highlight>
+              </a:rPr>
+              <a:t>oldEntity</a:t>
+            </a:r>
+            <a:r>
+              <a:rPr lang="pl-PL" sz="1400" b="1" dirty="0" err="1" smtClean="0">
+                <a:solidFill>
+                  <a:srgbClr val="000080"/>
+                </a:solidFill>
+                <a:highlight>
+                  <a:srgbClr val="FFFFFF"/>
+                </a:highlight>
+              </a:rPr>
+              <a:t>.</a:t>
+            </a:r>
+            <a:r>
+              <a:rPr lang="pl-PL" sz="1400" dirty="0" err="1" smtClean="0">
+                <a:solidFill>
+                  <a:srgbClr val="000000"/>
+                </a:solidFill>
+                <a:highlight>
+                  <a:srgbClr val="FFFFFF"/>
+                </a:highlight>
+              </a:rPr>
+              <a:t>State</a:t>
+            </a:r>
+            <a:r>
+              <a:rPr lang="pl-PL" sz="1400" dirty="0" smtClean="0">
+                <a:solidFill>
+                  <a:srgbClr val="000000"/>
+                </a:solidFill>
+                <a:highlight>
+                  <a:srgbClr val="FFFFFF"/>
+                </a:highlight>
+              </a:rPr>
+              <a:t> </a:t>
+            </a:r>
+            <a:r>
+              <a:rPr lang="pl-PL" sz="1400" b="1" dirty="0">
+                <a:solidFill>
+                  <a:srgbClr val="000080"/>
+                </a:solidFill>
+                <a:highlight>
+                  <a:srgbClr val="FFFFFF"/>
+                </a:highlight>
+              </a:rPr>
+              <a:t>=</a:t>
+            </a:r>
+            <a:r>
+              <a:rPr lang="pl-PL" sz="1400" dirty="0">
+                <a:solidFill>
+                  <a:srgbClr val="000000"/>
+                </a:solidFill>
+                <a:highlight>
+                  <a:srgbClr val="FFFFFF"/>
+                </a:highlight>
+              </a:rPr>
+              <a:t> </a:t>
+            </a:r>
+            <a:r>
+              <a:rPr lang="pl-PL" sz="1400" dirty="0" err="1">
+                <a:solidFill>
+                  <a:srgbClr val="000000"/>
+                </a:solidFill>
+                <a:highlight>
+                  <a:srgbClr val="FFFFFF"/>
+                </a:highlight>
+              </a:rPr>
+              <a:t>EntityState</a:t>
+            </a:r>
+            <a:r>
+              <a:rPr lang="pl-PL" sz="1400" b="1" dirty="0" err="1">
+                <a:solidFill>
+                  <a:srgbClr val="000080"/>
+                </a:solidFill>
+                <a:highlight>
+                  <a:srgbClr val="FFFFFF"/>
+                </a:highlight>
+              </a:rPr>
+              <a:t>.</a:t>
+            </a:r>
+            <a:r>
+              <a:rPr lang="pl-PL" sz="1400" dirty="0" err="1">
+                <a:solidFill>
+                  <a:srgbClr val="000000"/>
+                </a:solidFill>
+                <a:highlight>
+                  <a:srgbClr val="FFFFFF"/>
+                </a:highlight>
+              </a:rPr>
+              <a:t>Modified</a:t>
+            </a:r>
+            <a:r>
+              <a:rPr lang="pl-PL" sz="1400" b="1" dirty="0">
+                <a:solidFill>
+                  <a:srgbClr val="000080"/>
+                </a:solidFill>
+                <a:highlight>
+                  <a:srgbClr val="FFFFFF"/>
+                </a:highlight>
+              </a:rPr>
+              <a:t>;</a:t>
+            </a:r>
+            <a:endParaRPr lang="pl-PL" sz="1400" dirty="0">
+              <a:solidFill>
+                <a:srgbClr val="000000"/>
+              </a:solidFill>
+              <a:highlight>
+                <a:srgbClr val="FFFFFF"/>
+              </a:highlight>
+            </a:endParaRPr>
+          </a:p>
+          <a:p>
+            <a:r>
+              <a:rPr lang="pl-PL" sz="1400" dirty="0">
+                <a:solidFill>
+                  <a:srgbClr val="000000"/>
+                </a:solidFill>
+                <a:highlight>
+                  <a:srgbClr val="FFFFFF"/>
+                </a:highlight>
+              </a:rPr>
+              <a:t>        </a:t>
+            </a:r>
+            <a:r>
+              <a:rPr lang="pl-PL" sz="1400" dirty="0" smtClean="0">
+                <a:solidFill>
+                  <a:srgbClr val="000000"/>
+                </a:solidFill>
+                <a:highlight>
+                  <a:srgbClr val="FFFFFF"/>
+                </a:highlight>
+              </a:rPr>
+              <a:t>  </a:t>
+            </a:r>
+            <a:r>
+              <a:rPr lang="pl-PL" sz="1400" dirty="0" err="1" smtClean="0">
+                <a:solidFill>
+                  <a:srgbClr val="000000"/>
+                </a:solidFill>
+                <a:highlight>
+                  <a:srgbClr val="FFFFFF"/>
+                </a:highlight>
+              </a:rPr>
+              <a:t>SaveChanges</a:t>
+            </a:r>
+            <a:r>
+              <a:rPr lang="pl-PL" sz="1400" b="1" dirty="0">
+                <a:solidFill>
+                  <a:srgbClr val="000080"/>
+                </a:solidFill>
+                <a:highlight>
+                  <a:srgbClr val="FFFFFF"/>
+                </a:highlight>
+              </a:rPr>
+              <a:t>();</a:t>
+            </a:r>
+            <a:endParaRPr lang="pl-PL" sz="1400" dirty="0">
+              <a:solidFill>
+                <a:srgbClr val="000000"/>
+              </a:solidFill>
+              <a:highlight>
+                <a:srgbClr val="FFFFFF"/>
+              </a:highlight>
+            </a:endParaRPr>
+          </a:p>
+          <a:p>
+            <a:r>
+              <a:rPr lang="pl-PL" sz="1400" dirty="0">
+                <a:solidFill>
+                  <a:srgbClr val="000000"/>
+                </a:solidFill>
+                <a:highlight>
+                  <a:srgbClr val="FFFFFF"/>
+                </a:highlight>
+              </a:rPr>
+              <a:t>        </a:t>
+            </a:r>
+            <a:r>
+              <a:rPr lang="pl-PL" sz="1400" dirty="0" smtClean="0">
+                <a:solidFill>
+                  <a:srgbClr val="000000"/>
+                </a:solidFill>
+                <a:highlight>
+                  <a:srgbClr val="FFFFFF"/>
+                </a:highlight>
+              </a:rPr>
+              <a:t>  </a:t>
+            </a:r>
+            <a:r>
+              <a:rPr lang="pl-PL" sz="1400" b="1" dirty="0" smtClean="0">
+                <a:solidFill>
+                  <a:srgbClr val="0000FF"/>
+                </a:solidFill>
+                <a:highlight>
+                  <a:srgbClr val="FFFFFF"/>
+                </a:highlight>
+              </a:rPr>
+              <a:t>return</a:t>
+            </a:r>
+            <a:r>
+              <a:rPr lang="pl-PL" sz="1400" dirty="0" smtClean="0">
+                <a:solidFill>
+                  <a:srgbClr val="000000"/>
+                </a:solidFill>
+                <a:highlight>
+                  <a:srgbClr val="FFFFFF"/>
+                </a:highlight>
+              </a:rPr>
+              <a:t> </a:t>
+            </a:r>
+            <a:r>
+              <a:rPr lang="pl-PL" sz="1400" dirty="0" err="1">
+                <a:solidFill>
+                  <a:srgbClr val="000000"/>
+                </a:solidFill>
+                <a:highlight>
+                  <a:srgbClr val="FFFFFF"/>
+                </a:highlight>
+              </a:rPr>
+              <a:t>DbSet</a:t>
+            </a:r>
+            <a:r>
+              <a:rPr lang="pl-PL" sz="1400" b="1" dirty="0" err="1">
+                <a:solidFill>
+                  <a:srgbClr val="000080"/>
+                </a:solidFill>
+                <a:highlight>
+                  <a:srgbClr val="FFFFFF"/>
+                </a:highlight>
+              </a:rPr>
+              <a:t>.</a:t>
+            </a:r>
+            <a:r>
+              <a:rPr lang="pl-PL" sz="1400" dirty="0" err="1">
+                <a:solidFill>
+                  <a:srgbClr val="000000"/>
+                </a:solidFill>
+                <a:highlight>
+                  <a:srgbClr val="FFFFFF"/>
+                </a:highlight>
+              </a:rPr>
+              <a:t>Attach</a:t>
+            </a:r>
+            <a:r>
+              <a:rPr lang="pl-PL" sz="1400" b="1" dirty="0">
+                <a:solidFill>
+                  <a:srgbClr val="000080"/>
+                </a:solidFill>
+                <a:highlight>
+                  <a:srgbClr val="FFFFFF"/>
+                </a:highlight>
+              </a:rPr>
+              <a:t>(</a:t>
+            </a:r>
+            <a:r>
+              <a:rPr lang="pl-PL" sz="1400" dirty="0" err="1">
+                <a:solidFill>
+                  <a:srgbClr val="000000"/>
+                </a:solidFill>
+                <a:highlight>
+                  <a:srgbClr val="FFFFFF"/>
+                </a:highlight>
+              </a:rPr>
+              <a:t>entity</a:t>
+            </a:r>
+            <a:r>
+              <a:rPr lang="pl-PL" sz="1400" b="1" dirty="0">
+                <a:solidFill>
+                  <a:srgbClr val="000080"/>
+                </a:solidFill>
+                <a:highlight>
+                  <a:srgbClr val="FFFFFF"/>
+                </a:highlight>
+              </a:rPr>
+              <a:t>);</a:t>
+            </a:r>
+            <a:endParaRPr lang="pl-PL" sz="1400" dirty="0">
+              <a:solidFill>
+                <a:srgbClr val="000000"/>
+              </a:solidFill>
+              <a:highlight>
+                <a:srgbClr val="FFFFFF"/>
+              </a:highlight>
+            </a:endParaRPr>
+          </a:p>
+          <a:p>
+            <a:r>
+              <a:rPr lang="pl-PL" sz="1400" b="1" dirty="0" smtClean="0">
+                <a:solidFill>
+                  <a:srgbClr val="000080"/>
+                </a:solidFill>
+                <a:highlight>
+                  <a:srgbClr val="FFFFFF"/>
+                </a:highlight>
+              </a:rPr>
+              <a:t>    }</a:t>
+            </a:r>
+            <a:endParaRPr lang="pl-PL" sz="1400" dirty="0">
+              <a:solidFill>
+                <a:srgbClr val="000000"/>
+              </a:solidFill>
+              <a:highlight>
+                <a:srgbClr val="FFFFFF"/>
+              </a:highlight>
+            </a:endParaRPr>
+          </a:p>
+          <a:p>
+            <a:r>
+              <a:rPr lang="pl-PL" sz="1400" dirty="0" smtClean="0">
+                <a:solidFill>
+                  <a:srgbClr val="000000"/>
+                </a:solidFill>
+                <a:highlight>
+                  <a:srgbClr val="FFFFFF"/>
+                </a:highlight>
+              </a:rPr>
+              <a:t>   </a:t>
+            </a:r>
+            <a:r>
+              <a:rPr lang="pl-PL" sz="1400" b="1" dirty="0" smtClean="0">
+                <a:solidFill>
+                  <a:srgbClr val="000080"/>
+                </a:solidFill>
+                <a:highlight>
+                  <a:srgbClr val="FFFFFF"/>
+                </a:highlight>
+              </a:rPr>
+              <a:t>(...)</a:t>
+            </a:r>
+            <a:endParaRPr lang="pl-PL" sz="1400" dirty="0">
+              <a:solidFill>
+                <a:srgbClr val="000000"/>
+              </a:solidFill>
+              <a:highlight>
+                <a:srgbClr val="FFFFFF"/>
+              </a:highlight>
+            </a:endParaRPr>
+          </a:p>
+          <a:p>
+            <a:r>
+              <a:rPr lang="pl-PL" sz="1400" b="1" dirty="0">
+                <a:solidFill>
+                  <a:srgbClr val="000080"/>
+                </a:solidFill>
+                <a:highlight>
+                  <a:srgbClr val="FFFFFF"/>
+                </a:highlight>
+              </a:rPr>
+              <a:t>}</a:t>
+            </a:r>
+            <a:endParaRPr lang="pl-PL" sz="1400" dirty="0"/>
           </a:p>
         </p:txBody>
       </p:sp>
     </p:spTree>
     <p:extLst>
       <p:ext uri="{BB962C8B-B14F-4D97-AF65-F5344CB8AC3E}">
-        <p14:creationId xmlns:p14="http://schemas.microsoft.com/office/powerpoint/2010/main" val="3408585360"/>
+        <p14:creationId xmlns:p14="http://schemas.microsoft.com/office/powerpoint/2010/main" val="1820194051"/>
       </p:ext>
     </p:extLst>
   </p:cSld>
   <p:clrMapOvr>
     <a:masterClrMapping/>
   </p:clrMapOvr>
+  <p:timing>
+    <p:tnLst>
+      <p:par>
+        <p:cTn id="1" dur="indefinite" restart="never" nodeType="tmRoot"/>
+      </p:par>
+    </p:tnLst>
+  </p:timing>
+</p:sld>
+</file>
+
+<file path=ppt/slides/slide14.xml><?xml version="1.0" encoding="utf-8"?>
+<p:sld xmlns:a="http://schemas.openxmlformats.org/drawingml/2006/main" xmlns:r="http://schemas.openxmlformats.org/officeDocument/2006/relationships" xmlns:p="http://schemas.openxmlformats.org/presentationml/2006/main">
+  <p:cSld>
+    <p:spTree>
+      <p:nvGrpSpPr>
+        <p:cNvPr id="1" name=""/>
+        <p:cNvGrpSpPr/>
+        <p:nvPr/>
+      </p:nvGrpSpPr>
+      <p:grpSpPr>
+        <a:xfrm>
+          <a:off x="0" y="0"/>
+          <a:ext cx="0" cy="0"/>
+          <a:chOff x="0" y="0"/>
+          <a:chExt cx="0" cy="0"/>
+        </a:xfrm>
+      </p:grpSpPr>
+      <p:sp>
+        <p:nvSpPr>
+          <p:cNvPr id="2" name="Title 1"/>
+          <p:cNvSpPr>
+            <a:spLocks noGrp="1"/>
+          </p:cNvSpPr>
+          <p:nvPr>
+            <p:ph type="title"/>
+          </p:nvPr>
+        </p:nvSpPr>
+        <p:spPr/>
+        <p:txBody>
+          <a:bodyPr>
+            <a:normAutofit fontScale="90000"/>
+          </a:bodyPr>
+          <a:lstStyle/>
+          <a:p>
+            <a:r>
+              <a:rPr lang="pl-PL" dirty="0"/>
+              <a:t>CRUDY na pudy, </a:t>
+            </a:r>
+            <a:r>
+              <a:rPr lang="pl-PL" dirty="0" smtClean="0"/>
+              <a:t/>
+            </a:r>
+            <a:br>
+              <a:rPr lang="pl-PL" dirty="0" smtClean="0"/>
+            </a:br>
+            <a:r>
+              <a:rPr lang="pl-PL" dirty="0" smtClean="0"/>
+              <a:t>czyli </a:t>
+            </a:r>
+            <a:r>
+              <a:rPr lang="pl-PL" dirty="0"/>
+              <a:t>parę </a:t>
+            </a:r>
+            <a:r>
+              <a:rPr lang="pl-PL" dirty="0" smtClean="0"/>
+              <a:t>słów </a:t>
+            </a:r>
+            <a:r>
+              <a:rPr lang="pl-PL" dirty="0"/>
+              <a:t>o dyskomforcie w </a:t>
+            </a:r>
+            <a:r>
+              <a:rPr lang="pl-PL" dirty="0" smtClean="0"/>
+              <a:t>programowaniu</a:t>
+            </a:r>
+            <a:r>
+              <a:rPr lang="pl-PL" dirty="0"/>
+              <a:t/>
+            </a:r>
+            <a:br>
+              <a:rPr lang="pl-PL" dirty="0"/>
+            </a:br>
+            <a:endParaRPr lang="pl-PL" dirty="0"/>
+          </a:p>
+        </p:txBody>
+      </p:sp>
+      <p:sp>
+        <p:nvSpPr>
+          <p:cNvPr id="3" name="TextBox 2"/>
+          <p:cNvSpPr txBox="1"/>
+          <p:nvPr/>
+        </p:nvSpPr>
+        <p:spPr>
+          <a:xfrm>
+            <a:off x="326605" y="2921000"/>
+            <a:ext cx="11679800" cy="1938992"/>
+          </a:xfrm>
+          <a:prstGeom prst="rect">
+            <a:avLst/>
+          </a:prstGeom>
+          <a:noFill/>
+        </p:spPr>
+        <p:txBody>
+          <a:bodyPr wrap="none" rtlCol="0">
+            <a:spAutoFit/>
+          </a:bodyPr>
+          <a:lstStyle/>
+          <a:p>
+            <a:pPr algn="ctr"/>
+            <a:r>
+              <a:rPr lang="pl-PL" sz="2400" dirty="0" smtClean="0"/>
+              <a:t>A co gdy przy dodaniu ma się dodać od razu jego konto?</a:t>
+            </a:r>
+          </a:p>
+          <a:p>
+            <a:pPr algn="ctr"/>
+            <a:endParaRPr lang="pl-PL" sz="2400" dirty="0"/>
+          </a:p>
+          <a:p>
+            <a:pPr algn="ctr"/>
+            <a:r>
+              <a:rPr lang="pl-PL" sz="2400" dirty="0" smtClean="0"/>
+              <a:t>A co gdy w ramach promocji ma pójść od razu 50zł przelewu na jego konto?</a:t>
+            </a:r>
+          </a:p>
+          <a:p>
+            <a:pPr algn="ctr"/>
+            <a:endParaRPr lang="pl-PL" sz="2400" dirty="0"/>
+          </a:p>
+          <a:p>
+            <a:pPr algn="ctr"/>
+            <a:r>
+              <a:rPr lang="pl-PL" sz="2400" dirty="0" smtClean="0"/>
+              <a:t>A co gdy jeszcze ma pójść mail do niego z informacją aktywującą?</a:t>
+            </a:r>
+            <a:endParaRPr lang="pl-PL" sz="2400" dirty="0"/>
+          </a:p>
+        </p:txBody>
+      </p:sp>
+    </p:spTree>
+    <p:extLst>
+      <p:ext uri="{BB962C8B-B14F-4D97-AF65-F5344CB8AC3E}">
+        <p14:creationId xmlns:p14="http://schemas.microsoft.com/office/powerpoint/2010/main" val="2894836247"/>
+      </p:ext>
+    </p:extLst>
+  </p:cSld>
+  <p:clrMapOvr>
+    <a:masterClrMapping/>
+  </p:clrMapOvr>
+  <p:timing>
+    <p:tnLst>
+      <p:par>
+        <p:cTn id="1" dur="indefinite" restart="never" nodeType="tmRoot"/>
+      </p:par>
+    </p:tnLst>
+  </p:timing>
+</p:sld>
+</file>
+
+<file path=ppt/slides/slide15.xml><?xml version="1.0" encoding="utf-8"?>
+<p:sld xmlns:a="http://schemas.openxmlformats.org/drawingml/2006/main" xmlns:r="http://schemas.openxmlformats.org/officeDocument/2006/relationships" xmlns:p="http://schemas.openxmlformats.org/presentationml/2006/main">
+  <p:cSld>
+    <p:spTree>
+      <p:nvGrpSpPr>
+        <p:cNvPr id="1" name=""/>
+        <p:cNvGrpSpPr/>
+        <p:nvPr/>
+      </p:nvGrpSpPr>
+      <p:grpSpPr>
+        <a:xfrm>
+          <a:off x="0" y="0"/>
+          <a:ext cx="0" cy="0"/>
+          <a:chOff x="0" y="0"/>
+          <a:chExt cx="0" cy="0"/>
+        </a:xfrm>
+      </p:grpSpPr>
+      <p:sp>
+        <p:nvSpPr>
+          <p:cNvPr id="2" name="Title 1"/>
+          <p:cNvSpPr>
+            <a:spLocks noGrp="1"/>
+          </p:cNvSpPr>
+          <p:nvPr>
+            <p:ph type="title"/>
+          </p:nvPr>
+        </p:nvSpPr>
+        <p:spPr/>
+        <p:txBody>
+          <a:bodyPr>
+            <a:normAutofit fontScale="90000"/>
+          </a:bodyPr>
+          <a:lstStyle/>
+          <a:p>
+            <a:r>
+              <a:rPr lang="pl-PL" dirty="0"/>
+              <a:t>CRUDY na pudy, </a:t>
+            </a:r>
+            <a:r>
+              <a:rPr lang="pl-PL" dirty="0" smtClean="0"/>
+              <a:t/>
+            </a:r>
+            <a:br>
+              <a:rPr lang="pl-PL" dirty="0" smtClean="0"/>
+            </a:br>
+            <a:r>
+              <a:rPr lang="pl-PL" dirty="0" smtClean="0"/>
+              <a:t>czyli </a:t>
+            </a:r>
+            <a:r>
+              <a:rPr lang="pl-PL" dirty="0"/>
+              <a:t>parę </a:t>
+            </a:r>
+            <a:r>
+              <a:rPr lang="pl-PL" dirty="0" smtClean="0"/>
+              <a:t>słów </a:t>
+            </a:r>
+            <a:r>
+              <a:rPr lang="pl-PL" dirty="0"/>
+              <a:t>o dyskomforcie w </a:t>
+            </a:r>
+            <a:r>
+              <a:rPr lang="pl-PL" dirty="0" smtClean="0"/>
+              <a:t>programowaniu</a:t>
+            </a:r>
+            <a:r>
+              <a:rPr lang="pl-PL" dirty="0"/>
+              <a:t/>
+            </a:r>
+            <a:br>
+              <a:rPr lang="pl-PL" dirty="0"/>
+            </a:br>
+            <a:endParaRPr lang="pl-PL" dirty="0"/>
+          </a:p>
+        </p:txBody>
+      </p:sp>
+      <p:sp>
+        <p:nvSpPr>
+          <p:cNvPr id="3" name="TextBox 2"/>
+          <p:cNvSpPr txBox="1"/>
+          <p:nvPr/>
+        </p:nvSpPr>
+        <p:spPr>
+          <a:xfrm>
+            <a:off x="1800637" y="2413000"/>
+            <a:ext cx="8884162" cy="3477875"/>
+          </a:xfrm>
+          <a:prstGeom prst="rect">
+            <a:avLst/>
+          </a:prstGeom>
+          <a:noFill/>
+        </p:spPr>
+        <p:txBody>
+          <a:bodyPr wrap="none" rtlCol="0">
+            <a:spAutoFit/>
+          </a:bodyPr>
+          <a:lstStyle/>
+          <a:p>
+            <a:pPr algn="ctr"/>
+            <a:r>
+              <a:rPr lang="pl-PL" sz="2800" b="1" dirty="0" smtClean="0"/>
+              <a:t>Typowe reakcje:</a:t>
+            </a:r>
+          </a:p>
+          <a:p>
+            <a:pPr algn="ctr"/>
+            <a:endParaRPr lang="pl-PL" sz="2400" dirty="0"/>
+          </a:p>
+          <a:p>
+            <a:pPr algn="ctr"/>
+            <a:r>
+              <a:rPr lang="pl-PL" sz="2400" dirty="0" smtClean="0"/>
+              <a:t>Co ten klient znowu wymyślił?</a:t>
+            </a:r>
+            <a:endParaRPr lang="pl-PL" sz="2400" dirty="0"/>
+          </a:p>
+          <a:p>
+            <a:pPr algn="ctr"/>
+            <a:endParaRPr lang="pl-PL" sz="2400" dirty="0" smtClean="0"/>
+          </a:p>
+          <a:p>
+            <a:pPr algn="ctr"/>
+            <a:r>
+              <a:rPr lang="pl-PL" sz="2400" dirty="0" smtClean="0"/>
+              <a:t>Gdzie ja to upchnę?</a:t>
+            </a:r>
+          </a:p>
+          <a:p>
+            <a:pPr algn="ctr"/>
+            <a:endParaRPr lang="pl-PL" sz="2400" dirty="0" smtClean="0"/>
+          </a:p>
+          <a:p>
+            <a:pPr algn="ctr"/>
+            <a:r>
+              <a:rPr lang="pl-PL" sz="2400" dirty="0" smtClean="0"/>
+              <a:t>Czemu on nie rozumie, że w tej architekturze się to nie da?</a:t>
+            </a:r>
+          </a:p>
+          <a:p>
+            <a:pPr algn="ctr"/>
+            <a:endParaRPr lang="pl-PL" sz="2400" dirty="0"/>
+          </a:p>
+          <a:p>
+            <a:pPr algn="ctr"/>
+            <a:r>
+              <a:rPr lang="pl-PL" sz="2400" dirty="0" smtClean="0"/>
+              <a:t>Przecież kod będzie brzydko wyglądał…</a:t>
+            </a:r>
+          </a:p>
+        </p:txBody>
+      </p:sp>
+    </p:spTree>
+    <p:extLst>
+      <p:ext uri="{BB962C8B-B14F-4D97-AF65-F5344CB8AC3E}">
+        <p14:creationId xmlns:p14="http://schemas.microsoft.com/office/powerpoint/2010/main" val="11206237"/>
+      </p:ext>
+    </p:extLst>
+  </p:cSld>
+  <p:clrMapOvr>
+    <a:masterClrMapping/>
+  </p:clrMapOvr>
+  <p:timing>
+    <p:tnLst>
+      <p:par>
+        <p:cTn id="1" dur="indefinite" restart="never" nodeType="tmRoot"/>
+      </p:par>
+    </p:tnLst>
+  </p:timing>
+</p:sld>
+</file>
+
+<file path=ppt/slides/slide16.xml><?xml version="1.0" encoding="utf-8"?>
+<p:sld xmlns:a="http://schemas.openxmlformats.org/drawingml/2006/main" xmlns:r="http://schemas.openxmlformats.org/officeDocument/2006/relationships" xmlns:p="http://schemas.openxmlformats.org/presentationml/2006/main">
+  <p:cSld>
+    <p:spTree>
+      <p:nvGrpSpPr>
+        <p:cNvPr id="1" name=""/>
+        <p:cNvGrpSpPr/>
+        <p:nvPr/>
+      </p:nvGrpSpPr>
+      <p:grpSpPr>
+        <a:xfrm>
+          <a:off x="0" y="0"/>
+          <a:ext cx="0" cy="0"/>
+          <a:chOff x="0" y="0"/>
+          <a:chExt cx="0" cy="0"/>
+        </a:xfrm>
+      </p:grpSpPr>
+      <p:sp>
+        <p:nvSpPr>
+          <p:cNvPr id="2" name="Title 1"/>
+          <p:cNvSpPr>
+            <a:spLocks noGrp="1"/>
+          </p:cNvSpPr>
+          <p:nvPr>
+            <p:ph type="title"/>
+          </p:nvPr>
+        </p:nvSpPr>
+        <p:spPr/>
+        <p:txBody>
+          <a:bodyPr>
+            <a:normAutofit fontScale="90000"/>
+          </a:bodyPr>
+          <a:lstStyle/>
+          <a:p>
+            <a:r>
+              <a:rPr lang="pl-PL" dirty="0"/>
+              <a:t>CRUDY na pudy, </a:t>
+            </a:r>
+            <a:r>
+              <a:rPr lang="pl-PL" dirty="0" smtClean="0"/>
+              <a:t/>
+            </a:r>
+            <a:br>
+              <a:rPr lang="pl-PL" dirty="0" smtClean="0"/>
+            </a:br>
+            <a:r>
+              <a:rPr lang="pl-PL" dirty="0" smtClean="0"/>
+              <a:t>czyli </a:t>
+            </a:r>
+            <a:r>
+              <a:rPr lang="pl-PL" dirty="0"/>
+              <a:t>parę </a:t>
+            </a:r>
+            <a:r>
+              <a:rPr lang="pl-PL" dirty="0" smtClean="0"/>
+              <a:t>słów </a:t>
+            </a:r>
+            <a:r>
+              <a:rPr lang="pl-PL" dirty="0"/>
+              <a:t>o dyskomforcie w </a:t>
+            </a:r>
+            <a:r>
+              <a:rPr lang="pl-PL" dirty="0" smtClean="0"/>
+              <a:t>programowaniu</a:t>
+            </a:r>
+            <a:r>
+              <a:rPr lang="pl-PL" dirty="0"/>
+              <a:t/>
+            </a:r>
+            <a:br>
+              <a:rPr lang="pl-PL" dirty="0"/>
+            </a:br>
+            <a:endParaRPr lang="pl-PL" dirty="0"/>
+          </a:p>
+        </p:txBody>
+      </p:sp>
+      <p:pic>
+        <p:nvPicPr>
+          <p:cNvPr id="4" name="Picture 3"/>
+          <p:cNvPicPr>
+            <a:picLocks noChangeAspect="1"/>
+          </p:cNvPicPr>
+          <p:nvPr/>
+        </p:nvPicPr>
+        <p:blipFill>
+          <a:blip r:embed="rId2"/>
+          <a:stretch>
+            <a:fillRect/>
+          </a:stretch>
+        </p:blipFill>
+        <p:spPr>
+          <a:xfrm>
+            <a:off x="3167276" y="3519558"/>
+            <a:ext cx="6809348" cy="2455565"/>
+          </a:xfrm>
+          <a:prstGeom prst="rect">
+            <a:avLst/>
+          </a:prstGeom>
+        </p:spPr>
+      </p:pic>
+      <p:pic>
+        <p:nvPicPr>
+          <p:cNvPr id="24" name="Picture 23"/>
+          <p:cNvPicPr>
+            <a:picLocks noChangeAspect="1"/>
+          </p:cNvPicPr>
+          <p:nvPr/>
+        </p:nvPicPr>
+        <p:blipFill>
+          <a:blip r:embed="rId3"/>
+          <a:stretch>
+            <a:fillRect/>
+          </a:stretch>
+        </p:blipFill>
+        <p:spPr>
+          <a:xfrm>
+            <a:off x="1943100" y="2460078"/>
+            <a:ext cx="7112000" cy="2454369"/>
+          </a:xfrm>
+          <a:prstGeom prst="rect">
+            <a:avLst/>
+          </a:prstGeom>
+        </p:spPr>
+      </p:pic>
+      <p:pic>
+        <p:nvPicPr>
+          <p:cNvPr id="6" name="Picture 5"/>
+          <p:cNvPicPr>
+            <a:picLocks noChangeAspect="1"/>
+          </p:cNvPicPr>
+          <p:nvPr/>
+        </p:nvPicPr>
+        <p:blipFill>
+          <a:blip r:embed="rId4"/>
+          <a:stretch>
+            <a:fillRect/>
+          </a:stretch>
+        </p:blipFill>
+        <p:spPr>
+          <a:xfrm>
+            <a:off x="2962417" y="3826963"/>
+            <a:ext cx="1019317" cy="1019317"/>
+          </a:xfrm>
+          <a:prstGeom prst="rect">
+            <a:avLst/>
+          </a:prstGeom>
+        </p:spPr>
+      </p:pic>
+      <p:pic>
+        <p:nvPicPr>
+          <p:cNvPr id="8" name="Picture 7"/>
+          <p:cNvPicPr>
+            <a:picLocks noChangeAspect="1"/>
+          </p:cNvPicPr>
+          <p:nvPr/>
+        </p:nvPicPr>
+        <p:blipFill>
+          <a:blip r:embed="rId4"/>
+          <a:stretch>
+            <a:fillRect/>
+          </a:stretch>
+        </p:blipFill>
+        <p:spPr>
+          <a:xfrm>
+            <a:off x="1852541" y="2763218"/>
+            <a:ext cx="1019317" cy="1019317"/>
+          </a:xfrm>
+          <a:prstGeom prst="rect">
+            <a:avLst/>
+          </a:prstGeom>
+        </p:spPr>
+      </p:pic>
+    </p:spTree>
+    <p:extLst>
+      <p:ext uri="{BB962C8B-B14F-4D97-AF65-F5344CB8AC3E}">
+        <p14:creationId xmlns:p14="http://schemas.microsoft.com/office/powerpoint/2010/main" val="1852537060"/>
+      </p:ext>
+    </p:extLst>
+  </p:cSld>
+  <p:clrMapOvr>
+    <a:masterClrMapping/>
+  </p:clrMapOvr>
+  <p:timing>
+    <p:tnLst>
+      <p:par>
+        <p:cTn id="1" dur="indefinite" restart="never" nodeType="tmRoot"/>
+      </p:par>
+    </p:tnLst>
+  </p:timing>
+</p:sld>
+</file>
+
+<file path=ppt/slides/slide17.xml><?xml version="1.0" encoding="utf-8"?>
+<p:sld xmlns:a="http://schemas.openxmlformats.org/drawingml/2006/main" xmlns:r="http://schemas.openxmlformats.org/officeDocument/2006/relationships" xmlns:p="http://schemas.openxmlformats.org/presentationml/2006/main">
+  <p:cSld>
+    <p:spTree>
+      <p:nvGrpSpPr>
+        <p:cNvPr id="1" name=""/>
+        <p:cNvGrpSpPr/>
+        <p:nvPr/>
+      </p:nvGrpSpPr>
+      <p:grpSpPr>
+        <a:xfrm>
+          <a:off x="0" y="0"/>
+          <a:ext cx="0" cy="0"/>
+          <a:chOff x="0" y="0"/>
+          <a:chExt cx="0" cy="0"/>
+        </a:xfrm>
+      </p:grpSpPr>
+      <p:sp>
+        <p:nvSpPr>
+          <p:cNvPr id="2" name="Title 1"/>
+          <p:cNvSpPr>
+            <a:spLocks noGrp="1"/>
+          </p:cNvSpPr>
+          <p:nvPr>
+            <p:ph type="title"/>
+          </p:nvPr>
+        </p:nvSpPr>
+        <p:spPr/>
+        <p:txBody>
+          <a:bodyPr>
+            <a:normAutofit fontScale="90000"/>
+          </a:bodyPr>
+          <a:lstStyle/>
+          <a:p>
+            <a:r>
+              <a:rPr lang="pl-PL" dirty="0"/>
+              <a:t>CRUDY na pudy, </a:t>
+            </a:r>
+            <a:r>
+              <a:rPr lang="pl-PL" dirty="0" smtClean="0"/>
+              <a:t/>
+            </a:r>
+            <a:br>
+              <a:rPr lang="pl-PL" dirty="0" smtClean="0"/>
+            </a:br>
+            <a:r>
+              <a:rPr lang="pl-PL" dirty="0" smtClean="0"/>
+              <a:t>czyli </a:t>
+            </a:r>
+            <a:r>
+              <a:rPr lang="pl-PL" dirty="0"/>
+              <a:t>parę </a:t>
+            </a:r>
+            <a:r>
+              <a:rPr lang="pl-PL" dirty="0" smtClean="0"/>
+              <a:t>słów </a:t>
+            </a:r>
+            <a:r>
+              <a:rPr lang="pl-PL" dirty="0"/>
+              <a:t>o dyskomforcie w </a:t>
+            </a:r>
+            <a:r>
+              <a:rPr lang="pl-PL" dirty="0" smtClean="0"/>
+              <a:t>programowaniu</a:t>
+            </a:r>
+            <a:r>
+              <a:rPr lang="pl-PL" dirty="0"/>
+              <a:t/>
+            </a:r>
+            <a:br>
+              <a:rPr lang="pl-PL" dirty="0"/>
+            </a:br>
+            <a:endParaRPr lang="pl-PL" dirty="0"/>
+          </a:p>
+        </p:txBody>
+      </p:sp>
+      <p:pic>
+        <p:nvPicPr>
+          <p:cNvPr id="4" name="Picture 3"/>
+          <p:cNvPicPr>
+            <a:picLocks noChangeAspect="1"/>
+          </p:cNvPicPr>
+          <p:nvPr/>
+        </p:nvPicPr>
+        <p:blipFill>
+          <a:blip r:embed="rId2"/>
+          <a:stretch>
+            <a:fillRect/>
+          </a:stretch>
+        </p:blipFill>
+        <p:spPr>
+          <a:xfrm>
+            <a:off x="3167276" y="3519558"/>
+            <a:ext cx="6809348" cy="2455565"/>
+          </a:xfrm>
+          <a:prstGeom prst="rect">
+            <a:avLst/>
+          </a:prstGeom>
+        </p:spPr>
+      </p:pic>
+      <p:pic>
+        <p:nvPicPr>
+          <p:cNvPr id="24" name="Picture 23"/>
+          <p:cNvPicPr>
+            <a:picLocks noChangeAspect="1"/>
+          </p:cNvPicPr>
+          <p:nvPr/>
+        </p:nvPicPr>
+        <p:blipFill>
+          <a:blip r:embed="rId3"/>
+          <a:stretch>
+            <a:fillRect/>
+          </a:stretch>
+        </p:blipFill>
+        <p:spPr>
+          <a:xfrm>
+            <a:off x="1943100" y="2460078"/>
+            <a:ext cx="7112000" cy="2454369"/>
+          </a:xfrm>
+          <a:prstGeom prst="rect">
+            <a:avLst/>
+          </a:prstGeom>
+        </p:spPr>
+      </p:pic>
+      <p:pic>
+        <p:nvPicPr>
+          <p:cNvPr id="6" name="Picture 5"/>
+          <p:cNvPicPr>
+            <a:picLocks noChangeAspect="1"/>
+          </p:cNvPicPr>
+          <p:nvPr/>
+        </p:nvPicPr>
+        <p:blipFill>
+          <a:blip r:embed="rId4"/>
+          <a:stretch>
+            <a:fillRect/>
+          </a:stretch>
+        </p:blipFill>
+        <p:spPr>
+          <a:xfrm>
+            <a:off x="2962417" y="3826963"/>
+            <a:ext cx="1019317" cy="1019317"/>
+          </a:xfrm>
+          <a:prstGeom prst="rect">
+            <a:avLst/>
+          </a:prstGeom>
+        </p:spPr>
+      </p:pic>
+      <p:pic>
+        <p:nvPicPr>
+          <p:cNvPr id="8" name="Picture 7"/>
+          <p:cNvPicPr>
+            <a:picLocks noChangeAspect="1"/>
+          </p:cNvPicPr>
+          <p:nvPr/>
+        </p:nvPicPr>
+        <p:blipFill>
+          <a:blip r:embed="rId4"/>
+          <a:stretch>
+            <a:fillRect/>
+          </a:stretch>
+        </p:blipFill>
+        <p:spPr>
+          <a:xfrm>
+            <a:off x="1852541" y="2763218"/>
+            <a:ext cx="1019317" cy="1019317"/>
+          </a:xfrm>
+          <a:prstGeom prst="rect">
+            <a:avLst/>
+          </a:prstGeom>
+        </p:spPr>
+      </p:pic>
+      <p:pic>
+        <p:nvPicPr>
+          <p:cNvPr id="7" name="Picture 6"/>
+          <p:cNvPicPr>
+            <a:picLocks noChangeAspect="1"/>
+          </p:cNvPicPr>
+          <p:nvPr/>
+        </p:nvPicPr>
+        <p:blipFill>
+          <a:blip r:embed="rId3"/>
+          <a:stretch>
+            <a:fillRect/>
+          </a:stretch>
+        </p:blipFill>
+        <p:spPr>
+          <a:xfrm>
+            <a:off x="1943100" y="4217601"/>
+            <a:ext cx="7112000" cy="2454369"/>
+          </a:xfrm>
+          <a:prstGeom prst="rect">
+            <a:avLst/>
+          </a:prstGeom>
+        </p:spPr>
+      </p:pic>
+      <p:pic>
+        <p:nvPicPr>
+          <p:cNvPr id="9" name="Picture 8"/>
+          <p:cNvPicPr>
+            <a:picLocks noChangeAspect="1"/>
+          </p:cNvPicPr>
+          <p:nvPr/>
+        </p:nvPicPr>
+        <p:blipFill>
+          <a:blip r:embed="rId4"/>
+          <a:stretch>
+            <a:fillRect/>
+          </a:stretch>
+        </p:blipFill>
+        <p:spPr>
+          <a:xfrm>
+            <a:off x="1852541" y="4520741"/>
+            <a:ext cx="1019317" cy="1019317"/>
+          </a:xfrm>
+          <a:prstGeom prst="rect">
+            <a:avLst/>
+          </a:prstGeom>
+        </p:spPr>
+      </p:pic>
+      <p:pic>
+        <p:nvPicPr>
+          <p:cNvPr id="10" name="Picture 9"/>
+          <p:cNvPicPr>
+            <a:picLocks noChangeAspect="1"/>
+          </p:cNvPicPr>
+          <p:nvPr/>
+        </p:nvPicPr>
+        <p:blipFill>
+          <a:blip r:embed="rId3"/>
+          <a:stretch>
+            <a:fillRect/>
+          </a:stretch>
+        </p:blipFill>
+        <p:spPr>
+          <a:xfrm>
+            <a:off x="5321300" y="2424297"/>
+            <a:ext cx="7112000" cy="2454369"/>
+          </a:xfrm>
+          <a:prstGeom prst="rect">
+            <a:avLst/>
+          </a:prstGeom>
+        </p:spPr>
+      </p:pic>
+      <p:pic>
+        <p:nvPicPr>
+          <p:cNvPr id="11" name="Picture 10"/>
+          <p:cNvPicPr>
+            <a:picLocks noChangeAspect="1"/>
+          </p:cNvPicPr>
+          <p:nvPr/>
+        </p:nvPicPr>
+        <p:blipFill>
+          <a:blip r:embed="rId4"/>
+          <a:stretch>
+            <a:fillRect/>
+          </a:stretch>
+        </p:blipFill>
+        <p:spPr>
+          <a:xfrm>
+            <a:off x="5230741" y="2727437"/>
+            <a:ext cx="1019317" cy="1019317"/>
+          </a:xfrm>
+          <a:prstGeom prst="rect">
+            <a:avLst/>
+          </a:prstGeom>
+        </p:spPr>
+      </p:pic>
+      <p:pic>
+        <p:nvPicPr>
+          <p:cNvPr id="12" name="Picture 11"/>
+          <p:cNvPicPr>
+            <a:picLocks noChangeAspect="1"/>
+          </p:cNvPicPr>
+          <p:nvPr/>
+        </p:nvPicPr>
+        <p:blipFill>
+          <a:blip r:embed="rId3"/>
+          <a:stretch>
+            <a:fillRect/>
+          </a:stretch>
+        </p:blipFill>
+        <p:spPr>
+          <a:xfrm>
+            <a:off x="5794518" y="4312875"/>
+            <a:ext cx="7112000" cy="2454369"/>
+          </a:xfrm>
+          <a:prstGeom prst="rect">
+            <a:avLst/>
+          </a:prstGeom>
+        </p:spPr>
+      </p:pic>
+      <p:pic>
+        <p:nvPicPr>
+          <p:cNvPr id="13" name="Picture 12"/>
+          <p:cNvPicPr>
+            <a:picLocks noChangeAspect="1"/>
+          </p:cNvPicPr>
+          <p:nvPr/>
+        </p:nvPicPr>
+        <p:blipFill>
+          <a:blip r:embed="rId4"/>
+          <a:stretch>
+            <a:fillRect/>
+          </a:stretch>
+        </p:blipFill>
+        <p:spPr>
+          <a:xfrm>
+            <a:off x="5703959" y="4616015"/>
+            <a:ext cx="1019317" cy="1019317"/>
+          </a:xfrm>
+          <a:prstGeom prst="rect">
+            <a:avLst/>
+          </a:prstGeom>
+        </p:spPr>
+      </p:pic>
+      <p:pic>
+        <p:nvPicPr>
+          <p:cNvPr id="14" name="Picture 13"/>
+          <p:cNvPicPr>
+            <a:picLocks noChangeAspect="1"/>
+          </p:cNvPicPr>
+          <p:nvPr/>
+        </p:nvPicPr>
+        <p:blipFill>
+          <a:blip r:embed="rId3"/>
+          <a:stretch>
+            <a:fillRect/>
+          </a:stretch>
+        </p:blipFill>
+        <p:spPr>
+          <a:xfrm>
+            <a:off x="358089" y="1938385"/>
+            <a:ext cx="7112000" cy="2454369"/>
+          </a:xfrm>
+          <a:prstGeom prst="rect">
+            <a:avLst/>
+          </a:prstGeom>
+        </p:spPr>
+      </p:pic>
+      <p:pic>
+        <p:nvPicPr>
+          <p:cNvPr id="15" name="Picture 14"/>
+          <p:cNvPicPr>
+            <a:picLocks noChangeAspect="1"/>
+          </p:cNvPicPr>
+          <p:nvPr/>
+        </p:nvPicPr>
+        <p:blipFill>
+          <a:blip r:embed="rId4"/>
+          <a:stretch>
+            <a:fillRect/>
+          </a:stretch>
+        </p:blipFill>
+        <p:spPr>
+          <a:xfrm>
+            <a:off x="267530" y="2241525"/>
+            <a:ext cx="1019317" cy="1019317"/>
+          </a:xfrm>
+          <a:prstGeom prst="rect">
+            <a:avLst/>
+          </a:prstGeom>
+        </p:spPr>
+      </p:pic>
+      <p:pic>
+        <p:nvPicPr>
+          <p:cNvPr id="16" name="Picture 15"/>
+          <p:cNvPicPr>
+            <a:picLocks noChangeAspect="1"/>
+          </p:cNvPicPr>
+          <p:nvPr/>
+        </p:nvPicPr>
+        <p:blipFill>
+          <a:blip r:embed="rId3"/>
+          <a:stretch>
+            <a:fillRect/>
+          </a:stretch>
+        </p:blipFill>
+        <p:spPr>
+          <a:xfrm>
+            <a:off x="495831" y="4457705"/>
+            <a:ext cx="7112000" cy="2454369"/>
+          </a:xfrm>
+          <a:prstGeom prst="rect">
+            <a:avLst/>
+          </a:prstGeom>
+        </p:spPr>
+      </p:pic>
+      <p:pic>
+        <p:nvPicPr>
+          <p:cNvPr id="17" name="Picture 16"/>
+          <p:cNvPicPr>
+            <a:picLocks noChangeAspect="1"/>
+          </p:cNvPicPr>
+          <p:nvPr/>
+        </p:nvPicPr>
+        <p:blipFill>
+          <a:blip r:embed="rId4"/>
+          <a:stretch>
+            <a:fillRect/>
+          </a:stretch>
+        </p:blipFill>
+        <p:spPr>
+          <a:xfrm>
+            <a:off x="405272" y="4760845"/>
+            <a:ext cx="1019317" cy="1019317"/>
+          </a:xfrm>
+          <a:prstGeom prst="rect">
+            <a:avLst/>
+          </a:prstGeom>
+        </p:spPr>
+      </p:pic>
+    </p:spTree>
+    <p:extLst>
+      <p:ext uri="{BB962C8B-B14F-4D97-AF65-F5344CB8AC3E}">
+        <p14:creationId xmlns:p14="http://schemas.microsoft.com/office/powerpoint/2010/main" val="1417693449"/>
+      </p:ext>
+    </p:extLst>
+  </p:cSld>
+  <p:clrMapOvr>
+    <a:masterClrMapping/>
+  </p:clrMapOvr>
+  <p:timing>
+    <p:tnLst>
+      <p:par>
+        <p:cTn id="1" dur="indefinite" restart="never" nodeType="tmRoot"/>
+      </p:par>
+    </p:tnLst>
+  </p:timing>
+</p:sld>
+</file>
+
+<file path=ppt/slides/slide18.xml><?xml version="1.0" encoding="utf-8"?>
+<p:sld xmlns:a="http://schemas.openxmlformats.org/drawingml/2006/main" xmlns:r="http://schemas.openxmlformats.org/officeDocument/2006/relationships" xmlns:p="http://schemas.openxmlformats.org/presentationml/2006/main">
+  <p:cSld>
+    <p:spTree>
+      <p:nvGrpSpPr>
+        <p:cNvPr id="1" name=""/>
+        <p:cNvGrpSpPr/>
+        <p:nvPr/>
+      </p:nvGrpSpPr>
+      <p:grpSpPr>
+        <a:xfrm>
+          <a:off x="0" y="0"/>
+          <a:ext cx="0" cy="0"/>
+          <a:chOff x="0" y="0"/>
+          <a:chExt cx="0" cy="0"/>
+        </a:xfrm>
+      </p:grpSpPr>
+      <p:sp>
+        <p:nvSpPr>
+          <p:cNvPr id="2" name="Title 1"/>
+          <p:cNvSpPr>
+            <a:spLocks noGrp="1"/>
+          </p:cNvSpPr>
+          <p:nvPr>
+            <p:ph type="title"/>
+          </p:nvPr>
+        </p:nvSpPr>
+        <p:spPr/>
+        <p:txBody>
+          <a:bodyPr>
+            <a:normAutofit fontScale="90000"/>
+          </a:bodyPr>
+          <a:lstStyle/>
+          <a:p>
+            <a:r>
+              <a:rPr lang="pl-PL" dirty="0"/>
+              <a:t>CRUDY na pudy, </a:t>
+            </a:r>
+            <a:br>
+              <a:rPr lang="pl-PL" dirty="0"/>
+            </a:br>
+            <a:r>
+              <a:rPr lang="pl-PL" dirty="0"/>
+              <a:t>czyli parę słów o dyskomforcie w programowaniu</a:t>
+            </a:r>
+            <a:br>
+              <a:rPr lang="pl-PL" dirty="0"/>
+            </a:br>
+            <a:endParaRPr lang="pl-PL" dirty="0"/>
+          </a:p>
+        </p:txBody>
+      </p:sp>
+      <p:sp>
+        <p:nvSpPr>
+          <p:cNvPr id="3" name="Content Placeholder 2"/>
+          <p:cNvSpPr>
+            <a:spLocks noGrp="1"/>
+          </p:cNvSpPr>
+          <p:nvPr>
+            <p:ph idx="1"/>
+          </p:nvPr>
+        </p:nvSpPr>
+        <p:spPr>
+          <a:xfrm>
+            <a:off x="685800" y="3136900"/>
+            <a:ext cx="10820400" cy="3081785"/>
+          </a:xfrm>
+        </p:spPr>
+        <p:txBody>
+          <a:bodyPr>
+            <a:normAutofit/>
+          </a:bodyPr>
+          <a:lstStyle/>
+          <a:p>
+            <a:pPr marL="0" indent="0" algn="ctr">
+              <a:buNone/>
+            </a:pPr>
+            <a:r>
+              <a:rPr lang="pl-PL" sz="4000" dirty="0" smtClean="0"/>
+              <a:t>Jak inni sobie układaniem</a:t>
+            </a:r>
+          </a:p>
+          <a:p>
+            <a:pPr marL="0" indent="0" algn="ctr">
+              <a:buNone/>
+            </a:pPr>
+            <a:r>
+              <a:rPr lang="pl-PL" sz="4000" dirty="0" smtClean="0"/>
+              <a:t>tych klocków?</a:t>
+            </a:r>
+            <a:endParaRPr lang="pl-PL" sz="4000" dirty="0"/>
+          </a:p>
+        </p:txBody>
+      </p:sp>
+    </p:spTree>
+    <p:extLst>
+      <p:ext uri="{BB962C8B-B14F-4D97-AF65-F5344CB8AC3E}">
+        <p14:creationId xmlns:p14="http://schemas.microsoft.com/office/powerpoint/2010/main" val="3383935590"/>
+      </p:ext>
+    </p:extLst>
+  </p:cSld>
+  <p:clrMapOvr>
+    <a:masterClrMapping/>
+  </p:clrMapOvr>
+  <p:timing>
+    <p:tnLst>
+      <p:par>
+        <p:cTn id="1" dur="indefinite" restart="never" nodeType="tmRoot"/>
+      </p:par>
+    </p:tnLst>
+  </p:timing>
+</p:sld>
+</file>
+
+<file path=ppt/slides/slide19.xml><?xml version="1.0" encoding="utf-8"?>
+<p:sld xmlns:a="http://schemas.openxmlformats.org/drawingml/2006/main" xmlns:r="http://schemas.openxmlformats.org/officeDocument/2006/relationships" xmlns:p="http://schemas.openxmlformats.org/presentationml/2006/main">
+  <p:cSld>
+    <p:spTree>
+      <p:nvGrpSpPr>
+        <p:cNvPr id="1" name=""/>
+        <p:cNvGrpSpPr/>
+        <p:nvPr/>
+      </p:nvGrpSpPr>
+      <p:grpSpPr>
+        <a:xfrm>
+          <a:off x="0" y="0"/>
+          <a:ext cx="0" cy="0"/>
+          <a:chOff x="0" y="0"/>
+          <a:chExt cx="0" cy="0"/>
+        </a:xfrm>
+      </p:grpSpPr>
+      <p:sp>
+        <p:nvSpPr>
+          <p:cNvPr id="2" name="Title 1"/>
+          <p:cNvSpPr>
+            <a:spLocks noGrp="1"/>
+          </p:cNvSpPr>
+          <p:nvPr>
+            <p:ph type="title"/>
+          </p:nvPr>
+        </p:nvSpPr>
+        <p:spPr/>
+        <p:txBody>
+          <a:bodyPr>
+            <a:normAutofit fontScale="90000"/>
+          </a:bodyPr>
+          <a:lstStyle/>
+          <a:p>
+            <a:r>
+              <a:rPr lang="pl-PL" dirty="0"/>
+              <a:t>CRUDY na pudy, </a:t>
+            </a:r>
+            <a:br>
+              <a:rPr lang="pl-PL" dirty="0"/>
+            </a:br>
+            <a:r>
+              <a:rPr lang="pl-PL" dirty="0"/>
+              <a:t>czyli parę słów o dyskomforcie w programowaniu</a:t>
+            </a:r>
+            <a:br>
+              <a:rPr lang="pl-PL" dirty="0"/>
+            </a:br>
+            <a:endParaRPr lang="pl-PL" dirty="0"/>
+          </a:p>
+        </p:txBody>
+      </p:sp>
+      <p:sp>
+        <p:nvSpPr>
+          <p:cNvPr id="4" name="Content Placeholder 3"/>
+          <p:cNvSpPr>
+            <a:spLocks noGrp="1"/>
+          </p:cNvSpPr>
+          <p:nvPr>
+            <p:ph idx="1"/>
+          </p:nvPr>
+        </p:nvSpPr>
+        <p:spPr/>
+        <p:txBody>
+          <a:bodyPr/>
+          <a:lstStyle/>
+          <a:p>
+            <a:pPr marL="0" indent="0">
+              <a:buNone/>
+            </a:pPr>
+            <a:r>
+              <a:rPr lang="pl-PL" dirty="0" smtClean="0"/>
+              <a:t>Amazon ma drony</a:t>
+            </a:r>
+            <a:endParaRPr lang="pl-PL" dirty="0"/>
+          </a:p>
+        </p:txBody>
+      </p:sp>
+      <p:pic>
+        <p:nvPicPr>
+          <p:cNvPr id="2050" name="Picture 2" descr="http://www.supplychain247.com/images/article/walmart_testing_warehouses_drones_wide_image.jpg"/>
+          <p:cNvPicPr>
+            <a:picLocks noChangeAspect="1" noChangeArrowheads="1"/>
+          </p:cNvPicPr>
+          <p:nvPr/>
+        </p:nvPicPr>
+        <p:blipFill>
+          <a:blip r:embed="rId2">
+            <a:extLst>
+              <a:ext uri="{28A0092B-C50C-407E-A947-70E740481C1C}">
+                <a14:useLocalDpi xmlns:a14="http://schemas.microsoft.com/office/drawing/2010/main" val="0"/>
+              </a:ext>
+            </a:extLst>
+          </a:blip>
+          <a:srcRect/>
+          <a:stretch>
+            <a:fillRect/>
+          </a:stretch>
+        </p:blipFill>
+        <p:spPr bwMode="auto">
+          <a:xfrm>
+            <a:off x="3265487" y="3059851"/>
+            <a:ext cx="5661025" cy="3538141"/>
+          </a:xfrm>
+          <a:prstGeom prst="rect">
+            <a:avLst/>
+          </a:prstGeom>
+          <a:noFill/>
+          <a:extLst>
+            <a:ext uri="{909E8E84-426E-40DD-AFC4-6F175D3DCCD1}">
+              <a14:hiddenFill xmlns:a14="http://schemas.microsoft.com/office/drawing/2010/main">
+                <a:solidFill>
+                  <a:srgbClr val="FFFFFF"/>
+                </a:solidFill>
+              </a14:hiddenFill>
+            </a:ext>
+          </a:extLst>
+        </p:spPr>
+      </p:pic>
+    </p:spTree>
+    <p:extLst>
+      <p:ext uri="{BB962C8B-B14F-4D97-AF65-F5344CB8AC3E}">
+        <p14:creationId xmlns:p14="http://schemas.microsoft.com/office/powerpoint/2010/main" val="3392035936"/>
+      </p:ext>
+    </p:extLst>
+  </p:cSld>
+  <p:clrMapOvr>
+    <a:masterClrMapping/>
+  </p:clrMapOvr>
+  <p:timing>
+    <p:tnLst>
+      <p:par>
+        <p:cTn id="1" dur="indefinite" restart="never" nodeType="tmRoot"/>
+      </p:par>
+    </p:tnLst>
+  </p:timing>
 </p:sld>
 </file>
 
@@ -7227,6 +10368,519 @@
     <p:extLst>
       <p:ext uri="{BB962C8B-B14F-4D97-AF65-F5344CB8AC3E}">
         <p14:creationId xmlns:p14="http://schemas.microsoft.com/office/powerpoint/2010/main" val="1243031107"/>
+      </p:ext>
+    </p:extLst>
+  </p:cSld>
+  <p:clrMapOvr>
+    <a:masterClrMapping/>
+  </p:clrMapOvr>
+  <p:timing>
+    <p:tnLst>
+      <p:par>
+        <p:cTn id="1" dur="indefinite" restart="never" nodeType="tmRoot"/>
+      </p:par>
+    </p:tnLst>
+  </p:timing>
+</p:sld>
+</file>
+
+<file path=ppt/slides/slide20.xml><?xml version="1.0" encoding="utf-8"?>
+<p:sld xmlns:a="http://schemas.openxmlformats.org/drawingml/2006/main" xmlns:r="http://schemas.openxmlformats.org/officeDocument/2006/relationships" xmlns:p="http://schemas.openxmlformats.org/presentationml/2006/main">
+  <p:cSld>
+    <p:spTree>
+      <p:nvGrpSpPr>
+        <p:cNvPr id="1" name=""/>
+        <p:cNvGrpSpPr/>
+        <p:nvPr/>
+      </p:nvGrpSpPr>
+      <p:grpSpPr>
+        <a:xfrm>
+          <a:off x="0" y="0"/>
+          <a:ext cx="0" cy="0"/>
+          <a:chOff x="0" y="0"/>
+          <a:chExt cx="0" cy="0"/>
+        </a:xfrm>
+      </p:grpSpPr>
+      <p:sp>
+        <p:nvSpPr>
+          <p:cNvPr id="2" name="Title 1"/>
+          <p:cNvSpPr>
+            <a:spLocks noGrp="1"/>
+          </p:cNvSpPr>
+          <p:nvPr>
+            <p:ph type="title"/>
+          </p:nvPr>
+        </p:nvSpPr>
+        <p:spPr/>
+        <p:txBody>
+          <a:bodyPr>
+            <a:normAutofit fontScale="90000"/>
+          </a:bodyPr>
+          <a:lstStyle/>
+          <a:p>
+            <a:r>
+              <a:rPr lang="pl-PL" dirty="0"/>
+              <a:t>CRUDY na pudy, </a:t>
+            </a:r>
+            <a:br>
+              <a:rPr lang="pl-PL" dirty="0"/>
+            </a:br>
+            <a:r>
+              <a:rPr lang="pl-PL" dirty="0"/>
+              <a:t>czyli parę słów o dyskomforcie w programowaniu</a:t>
+            </a:r>
+            <a:br>
+              <a:rPr lang="pl-PL" dirty="0"/>
+            </a:br>
+            <a:endParaRPr lang="pl-PL" dirty="0"/>
+          </a:p>
+        </p:txBody>
+      </p:sp>
+      <p:sp>
+        <p:nvSpPr>
+          <p:cNvPr id="4" name="Content Placeholder 3"/>
+          <p:cNvSpPr>
+            <a:spLocks noGrp="1"/>
+          </p:cNvSpPr>
+          <p:nvPr>
+            <p:ph idx="1"/>
+          </p:nvPr>
+        </p:nvSpPr>
+        <p:spPr/>
+        <p:txBody>
+          <a:bodyPr/>
+          <a:lstStyle/>
+          <a:p>
+            <a:pPr marL="0" indent="0">
+              <a:buNone/>
+            </a:pPr>
+            <a:r>
+              <a:rPr lang="pl-PL" dirty="0" smtClean="0"/>
+              <a:t>Inni mają gorzej</a:t>
+            </a:r>
+            <a:endParaRPr lang="pl-PL" dirty="0"/>
+          </a:p>
+        </p:txBody>
+      </p:sp>
+      <p:pic>
+        <p:nvPicPr>
+          <p:cNvPr id="3" name="Picture 2"/>
+          <p:cNvPicPr>
+            <a:picLocks noChangeAspect="1"/>
+          </p:cNvPicPr>
+          <p:nvPr/>
+        </p:nvPicPr>
+        <p:blipFill>
+          <a:blip r:embed="rId2">
+            <a:extLst>
+              <a:ext uri="{28A0092B-C50C-407E-A947-70E740481C1C}">
+                <a14:useLocalDpi xmlns:a14="http://schemas.microsoft.com/office/drawing/2010/main" val="0"/>
+              </a:ext>
+            </a:extLst>
+          </a:blip>
+          <a:stretch>
+            <a:fillRect/>
+          </a:stretch>
+        </p:blipFill>
+        <p:spPr>
+          <a:xfrm>
+            <a:off x="4294187" y="2783335"/>
+            <a:ext cx="3825731" cy="3435350"/>
+          </a:xfrm>
+          <a:prstGeom prst="rect">
+            <a:avLst/>
+          </a:prstGeom>
+        </p:spPr>
+      </p:pic>
+    </p:spTree>
+    <p:extLst>
+      <p:ext uri="{BB962C8B-B14F-4D97-AF65-F5344CB8AC3E}">
+        <p14:creationId xmlns:p14="http://schemas.microsoft.com/office/powerpoint/2010/main" val="870037392"/>
+      </p:ext>
+    </p:extLst>
+  </p:cSld>
+  <p:clrMapOvr>
+    <a:masterClrMapping/>
+  </p:clrMapOvr>
+  <p:timing>
+    <p:tnLst>
+      <p:par>
+        <p:cTn id="1" dur="indefinite" restart="never" nodeType="tmRoot"/>
+      </p:par>
+    </p:tnLst>
+  </p:timing>
+</p:sld>
+</file>
+
+<file path=ppt/slides/slide21.xml><?xml version="1.0" encoding="utf-8"?>
+<p:sld xmlns:a="http://schemas.openxmlformats.org/drawingml/2006/main" xmlns:r="http://schemas.openxmlformats.org/officeDocument/2006/relationships" xmlns:p="http://schemas.openxmlformats.org/presentationml/2006/main">
+  <p:cSld>
+    <p:spTree>
+      <p:nvGrpSpPr>
+        <p:cNvPr id="1" name=""/>
+        <p:cNvGrpSpPr/>
+        <p:nvPr/>
+      </p:nvGrpSpPr>
+      <p:grpSpPr>
+        <a:xfrm>
+          <a:off x="0" y="0"/>
+          <a:ext cx="0" cy="0"/>
+          <a:chOff x="0" y="0"/>
+          <a:chExt cx="0" cy="0"/>
+        </a:xfrm>
+      </p:grpSpPr>
+      <p:sp>
+        <p:nvSpPr>
+          <p:cNvPr id="2" name="Title 1"/>
+          <p:cNvSpPr>
+            <a:spLocks noGrp="1"/>
+          </p:cNvSpPr>
+          <p:nvPr>
+            <p:ph type="title"/>
+          </p:nvPr>
+        </p:nvSpPr>
+        <p:spPr/>
+        <p:txBody>
+          <a:bodyPr>
+            <a:normAutofit fontScale="90000"/>
+          </a:bodyPr>
+          <a:lstStyle/>
+          <a:p>
+            <a:r>
+              <a:rPr lang="pl-PL" dirty="0"/>
+              <a:t>CRUDY na pudy, </a:t>
+            </a:r>
+            <a:br>
+              <a:rPr lang="pl-PL" dirty="0"/>
+            </a:br>
+            <a:r>
+              <a:rPr lang="pl-PL" dirty="0"/>
+              <a:t>czyli parę słów o dyskomforcie w programowaniu</a:t>
+            </a:r>
+            <a:br>
+              <a:rPr lang="pl-PL" dirty="0"/>
+            </a:br>
+            <a:endParaRPr lang="pl-PL" dirty="0"/>
+          </a:p>
+        </p:txBody>
+      </p:sp>
+      <p:sp>
+        <p:nvSpPr>
+          <p:cNvPr id="3" name="Content Placeholder 2"/>
+          <p:cNvSpPr>
+            <a:spLocks noGrp="1"/>
+          </p:cNvSpPr>
+          <p:nvPr>
+            <p:ph idx="1"/>
+          </p:nvPr>
+        </p:nvSpPr>
+        <p:spPr/>
+        <p:txBody>
+          <a:bodyPr/>
+          <a:lstStyle/>
+          <a:p>
+            <a:pPr marL="0" indent="0" algn="ctr">
+              <a:buNone/>
+            </a:pPr>
+            <a:r>
+              <a:rPr lang="pl-PL" sz="4000" b="1" dirty="0" smtClean="0"/>
+              <a:t>Przesadzam?</a:t>
+            </a:r>
+          </a:p>
+          <a:p>
+            <a:pPr marL="0" indent="0">
+              <a:buNone/>
+            </a:pPr>
+            <a:endParaRPr lang="pl-PL" dirty="0"/>
+          </a:p>
+          <a:p>
+            <a:pPr marL="0" indent="0">
+              <a:buNone/>
+            </a:pPr>
+            <a:r>
+              <a:rPr lang="pl-PL" dirty="0" smtClean="0"/>
+              <a:t>Dodajmy do tego:</a:t>
+            </a:r>
+          </a:p>
+          <a:p>
+            <a:pPr>
+              <a:buFontTx/>
+              <a:buChar char="-"/>
+            </a:pPr>
+            <a:r>
+              <a:rPr lang="pl-PL" dirty="0" smtClean="0"/>
+              <a:t>Skomplikowaną zależności relacji (relacje wiele do wielu)</a:t>
+            </a:r>
+          </a:p>
+          <a:p>
+            <a:pPr>
+              <a:buFontTx/>
+              <a:buChar char="-"/>
+            </a:pPr>
+            <a:r>
+              <a:rPr lang="pl-PL" dirty="0" smtClean="0"/>
+              <a:t>Współgranie modelu odczytu z zapisem</a:t>
+            </a:r>
+          </a:p>
+          <a:p>
+            <a:pPr>
+              <a:buFontTx/>
+              <a:buChar char="-"/>
+            </a:pPr>
+            <a:r>
+              <a:rPr lang="pl-PL" dirty="0" smtClean="0"/>
+              <a:t>Migracje schematu bazy oraz samych danych</a:t>
+            </a:r>
+          </a:p>
+          <a:p>
+            <a:pPr>
+              <a:buFontTx/>
+              <a:buChar char="-"/>
+            </a:pPr>
+            <a:r>
+              <a:rPr lang="pl-PL" dirty="0" smtClean="0"/>
+              <a:t>Problemy z wydajnością gdy używamy tego samego wielkiego modelu danych</a:t>
+            </a:r>
+          </a:p>
+          <a:p>
+            <a:pPr>
+              <a:buFontTx/>
+              <a:buChar char="-"/>
+            </a:pPr>
+            <a:endParaRPr lang="pl-PL" dirty="0"/>
+          </a:p>
+          <a:p>
+            <a:pPr>
+              <a:buFontTx/>
+              <a:buChar char="-"/>
+            </a:pPr>
+            <a:endParaRPr lang="pl-PL" dirty="0" smtClean="0"/>
+          </a:p>
+        </p:txBody>
+      </p:sp>
+    </p:spTree>
+    <p:extLst>
+      <p:ext uri="{BB962C8B-B14F-4D97-AF65-F5344CB8AC3E}">
+        <p14:creationId xmlns:p14="http://schemas.microsoft.com/office/powerpoint/2010/main" val="2767397238"/>
+      </p:ext>
+    </p:extLst>
+  </p:cSld>
+  <p:clrMapOvr>
+    <a:masterClrMapping/>
+  </p:clrMapOvr>
+  <p:timing>
+    <p:tnLst>
+      <p:par>
+        <p:cTn id="1" dur="indefinite" restart="never" nodeType="tmRoot"/>
+      </p:par>
+    </p:tnLst>
+  </p:timing>
+</p:sld>
+</file>
+
+<file path=ppt/slides/slide22.xml><?xml version="1.0" encoding="utf-8"?>
+<p:sld xmlns:a="http://schemas.openxmlformats.org/drawingml/2006/main" xmlns:r="http://schemas.openxmlformats.org/officeDocument/2006/relationships" xmlns:p="http://schemas.openxmlformats.org/presentationml/2006/main">
+  <p:cSld>
+    <p:spTree>
+      <p:nvGrpSpPr>
+        <p:cNvPr id="1" name=""/>
+        <p:cNvGrpSpPr/>
+        <p:nvPr/>
+      </p:nvGrpSpPr>
+      <p:grpSpPr>
+        <a:xfrm>
+          <a:off x="0" y="0"/>
+          <a:ext cx="0" cy="0"/>
+          <a:chOff x="0" y="0"/>
+          <a:chExt cx="0" cy="0"/>
+        </a:xfrm>
+      </p:grpSpPr>
+      <p:sp>
+        <p:nvSpPr>
+          <p:cNvPr id="2" name="Title 1"/>
+          <p:cNvSpPr>
+            <a:spLocks noGrp="1"/>
+          </p:cNvSpPr>
+          <p:nvPr>
+            <p:ph type="title"/>
+          </p:nvPr>
+        </p:nvSpPr>
+        <p:spPr/>
+        <p:txBody>
+          <a:bodyPr/>
+          <a:lstStyle/>
+          <a:p>
+            <a:r>
+              <a:rPr lang="pl-PL" dirty="0"/>
+              <a:t>Czemu CQRS to krok wstecz i dwa do przodu</a:t>
+            </a:r>
+          </a:p>
+        </p:txBody>
+      </p:sp>
+      <p:sp>
+        <p:nvSpPr>
+          <p:cNvPr id="3" name="Content Placeholder 2"/>
+          <p:cNvSpPr>
+            <a:spLocks noGrp="1"/>
+          </p:cNvSpPr>
+          <p:nvPr>
+            <p:ph idx="1"/>
+          </p:nvPr>
+        </p:nvSpPr>
+        <p:spPr/>
+        <p:txBody>
+          <a:bodyPr>
+            <a:normAutofit/>
+          </a:bodyPr>
+          <a:lstStyle/>
+          <a:p>
+            <a:pPr marL="0" indent="0">
+              <a:buNone/>
+            </a:pPr>
+            <a:endParaRPr lang="pl-PL" sz="4000" b="1" dirty="0" smtClean="0"/>
+          </a:p>
+          <a:p>
+            <a:pPr marL="0" indent="0">
+              <a:buNone/>
+            </a:pPr>
+            <a:r>
+              <a:rPr lang="pl-PL" sz="4000" b="1" dirty="0" err="1" smtClean="0"/>
+              <a:t>C</a:t>
+            </a:r>
+            <a:r>
+              <a:rPr lang="pl-PL" sz="4000" dirty="0" err="1" smtClean="0"/>
+              <a:t>ommand</a:t>
+            </a:r>
+            <a:endParaRPr lang="pl-PL" sz="4000" dirty="0" smtClean="0"/>
+          </a:p>
+          <a:p>
+            <a:pPr marL="0" indent="0">
+              <a:buNone/>
+            </a:pPr>
+            <a:r>
+              <a:rPr lang="pl-PL" sz="4000" b="1" dirty="0" smtClean="0"/>
+              <a:t>Q</a:t>
+            </a:r>
+            <a:r>
+              <a:rPr lang="pl-PL" sz="4000" dirty="0" smtClean="0"/>
+              <a:t>uery</a:t>
+            </a:r>
+          </a:p>
+          <a:p>
+            <a:pPr marL="0" indent="0">
+              <a:buNone/>
+            </a:pPr>
+            <a:r>
+              <a:rPr lang="pl-PL" sz="4000" b="1" dirty="0" err="1" smtClean="0"/>
+              <a:t>R</a:t>
+            </a:r>
+            <a:r>
+              <a:rPr lang="pl-PL" sz="4000" dirty="0" err="1" smtClean="0"/>
+              <a:t>esponsibility</a:t>
+            </a:r>
+            <a:endParaRPr lang="pl-PL" sz="4000" dirty="0" smtClean="0"/>
+          </a:p>
+          <a:p>
+            <a:pPr marL="0" indent="0">
+              <a:buNone/>
+            </a:pPr>
+            <a:r>
+              <a:rPr lang="pl-PL" sz="4000" b="1" dirty="0" err="1" smtClean="0"/>
+              <a:t>S</a:t>
+            </a:r>
+            <a:r>
+              <a:rPr lang="pl-PL" sz="4000" dirty="0" err="1" smtClean="0"/>
+              <a:t>egregation</a:t>
+            </a:r>
+            <a:endParaRPr lang="pl-PL" sz="4000" dirty="0" smtClean="0"/>
+          </a:p>
+        </p:txBody>
+      </p:sp>
+    </p:spTree>
+    <p:extLst>
+      <p:ext uri="{BB962C8B-B14F-4D97-AF65-F5344CB8AC3E}">
+        <p14:creationId xmlns:p14="http://schemas.microsoft.com/office/powerpoint/2010/main" val="1770954372"/>
+      </p:ext>
+    </p:extLst>
+  </p:cSld>
+  <p:clrMapOvr>
+    <a:masterClrMapping/>
+  </p:clrMapOvr>
+  <p:timing>
+    <p:tnLst>
+      <p:par>
+        <p:cTn id="1" dur="indefinite" restart="never" nodeType="tmRoot"/>
+      </p:par>
+    </p:tnLst>
+  </p:timing>
+</p:sld>
+</file>
+
+<file path=ppt/slides/slide23.xml><?xml version="1.0" encoding="utf-8"?>
+<p:sld xmlns:a="http://schemas.openxmlformats.org/drawingml/2006/main" xmlns:r="http://schemas.openxmlformats.org/officeDocument/2006/relationships" xmlns:p="http://schemas.openxmlformats.org/presentationml/2006/main">
+  <p:cSld>
+    <p:spTree>
+      <p:nvGrpSpPr>
+        <p:cNvPr id="1" name=""/>
+        <p:cNvGrpSpPr/>
+        <p:nvPr/>
+      </p:nvGrpSpPr>
+      <p:grpSpPr>
+        <a:xfrm>
+          <a:off x="0" y="0"/>
+          <a:ext cx="0" cy="0"/>
+          <a:chOff x="0" y="0"/>
+          <a:chExt cx="0" cy="0"/>
+        </a:xfrm>
+      </p:grpSpPr>
+      <p:sp>
+        <p:nvSpPr>
+          <p:cNvPr id="2" name="Title 1"/>
+          <p:cNvSpPr>
+            <a:spLocks noGrp="1"/>
+          </p:cNvSpPr>
+          <p:nvPr>
+            <p:ph type="title"/>
+          </p:nvPr>
+        </p:nvSpPr>
+        <p:spPr/>
+        <p:txBody>
+          <a:bodyPr/>
+          <a:lstStyle/>
+          <a:p>
+            <a:r>
+              <a:rPr lang="pl-PL" dirty="0"/>
+              <a:t>Czemu CQRS to krok wstecz i dwa do przodu</a:t>
+            </a:r>
+          </a:p>
+        </p:txBody>
+      </p:sp>
+      <p:sp>
+        <p:nvSpPr>
+          <p:cNvPr id="3" name="Content Placeholder 2"/>
+          <p:cNvSpPr>
+            <a:spLocks noGrp="1"/>
+          </p:cNvSpPr>
+          <p:nvPr>
+            <p:ph idx="1"/>
+          </p:nvPr>
+        </p:nvSpPr>
+        <p:spPr/>
+        <p:txBody>
+          <a:bodyPr/>
+          <a:lstStyle/>
+          <a:p>
+            <a:pPr marL="0" indent="0">
+              <a:buNone/>
+            </a:pPr>
+            <a:endParaRPr lang="pl-PL" dirty="0"/>
+          </a:p>
+        </p:txBody>
+      </p:sp>
+    </p:spTree>
+    <p:extLst>
+      <p:ext uri="{BB962C8B-B14F-4D97-AF65-F5344CB8AC3E}">
+        <p14:creationId xmlns:p14="http://schemas.microsoft.com/office/powerpoint/2010/main" val="3408585360"/>
       </p:ext>
     </p:extLst>
   </p:cSld>
@@ -7411,6 +11065,13 @@
   <p:clrMapOvr>
     <a:masterClrMapping/>
   </p:clrMapOvr>
+  <p:timing>
+    <p:tnLst>
+      <p:par>
+        <p:cTn id="1" dur="indefinite" restart="never" nodeType="tmRoot"/>
+      </p:par>
+    </p:tnLst>
+  </p:timing>
 </p:sld>
 </file>
 
@@ -7821,6 +11482,13 @@
   <p:clrMapOvr>
     <a:masterClrMapping/>
   </p:clrMapOvr>
+  <p:timing>
+    <p:tnLst>
+      <p:par>
+        <p:cTn id="1" dur="indefinite" restart="never" nodeType="tmRoot"/>
+      </p:par>
+    </p:tnLst>
+  </p:timing>
 </p:sld>
 </file>
 
@@ -8326,6 +11994,13 @@
   <p:clrMapOvr>
     <a:masterClrMapping/>
   </p:clrMapOvr>
+  <p:timing>
+    <p:tnLst>
+      <p:par>
+        <p:cTn id="1" dur="indefinite" restart="never" nodeType="tmRoot"/>
+      </p:par>
+    </p:tnLst>
+  </p:timing>
 </p:sld>
 </file>
 
@@ -9046,6 +12721,13 @@
   <p:clrMapOvr>
     <a:masterClrMapping/>
   </p:clrMapOvr>
+  <p:timing>
+    <p:tnLst>
+      <p:par>
+        <p:cTn id="1" dur="indefinite" restart="never" nodeType="tmRoot"/>
+      </p:par>
+    </p:tnLst>
+  </p:timing>
 </p:sld>
 </file>
 

</xml_diff>

<commit_message>
Updated slide with code
</commit_message>
<xml_diff>
--- a/Slides.pptx
+++ b/Slides.pptx
@@ -7093,1788 +7093,30 @@
           </a:p>
         </p:txBody>
       </p:sp>
-      <p:sp>
-        <p:nvSpPr>
-          <p:cNvPr id="6" name="Rectangle 5"/>
-          <p:cNvSpPr/>
-          <p:nvPr/>
-        </p:nvSpPr>
-        <p:spPr>
-          <a:xfrm>
-            <a:off x="1778000" y="2057401"/>
-            <a:ext cx="7670800" cy="4616648"/>
+      <p:pic>
+        <p:nvPicPr>
+          <p:cNvPr id="8" name="Picture 7"/>
+          <p:cNvPicPr>
+            <a:picLocks noChangeAspect="1"/>
+          </p:cNvPicPr>
+          <p:nvPr/>
+        </p:nvPicPr>
+        <p:blipFill>
+          <a:blip r:embed="rId2"/>
+          <a:stretch>
+            <a:fillRect/>
+          </a:stretch>
+        </p:blipFill>
+        <p:spPr>
+          <a:xfrm>
+            <a:off x="1700012" y="1841679"/>
+            <a:ext cx="5086879" cy="4770746"/>
           </a:xfrm>
           <a:prstGeom prst="rect">
             <a:avLst/>
           </a:prstGeom>
         </p:spPr>
-        <p:txBody>
-          <a:bodyPr wrap="square">
-            <a:spAutoFit/>
-          </a:bodyPr>
-          <a:lstStyle/>
-          <a:p>
-            <a:r>
-              <a:rPr lang="pl-PL" sz="1400" b="1" dirty="0">
-                <a:solidFill>
-                  <a:srgbClr val="0000FF"/>
-                </a:solidFill>
-                <a:highlight>
-                  <a:srgbClr val="FFFFFF"/>
-                </a:highlight>
-              </a:rPr>
-              <a:t>public</a:t>
-            </a:r>
-            <a:r>
-              <a:rPr lang="pl-PL" sz="1400" dirty="0">
-                <a:solidFill>
-                  <a:srgbClr val="000000"/>
-                </a:solidFill>
-                <a:highlight>
-                  <a:srgbClr val="FFFFFF"/>
-                </a:highlight>
-              </a:rPr>
-              <a:t> </a:t>
-            </a:r>
-            <a:r>
-              <a:rPr lang="pl-PL" sz="1400" b="1" dirty="0" err="1">
-                <a:solidFill>
-                  <a:srgbClr val="0000FF"/>
-                </a:solidFill>
-                <a:highlight>
-                  <a:srgbClr val="FFFFFF"/>
-                </a:highlight>
-              </a:rPr>
-              <a:t>abstract</a:t>
-            </a:r>
-            <a:r>
-              <a:rPr lang="pl-PL" sz="1400" dirty="0">
-                <a:solidFill>
-                  <a:srgbClr val="000000"/>
-                </a:solidFill>
-                <a:highlight>
-                  <a:srgbClr val="FFFFFF"/>
-                </a:highlight>
-              </a:rPr>
-              <a:t> </a:t>
-            </a:r>
-            <a:r>
-              <a:rPr lang="pl-PL" sz="1400" dirty="0" err="1">
-                <a:solidFill>
-                  <a:srgbClr val="8000FF"/>
-                </a:solidFill>
-                <a:highlight>
-                  <a:srgbClr val="FFFFFF"/>
-                </a:highlight>
-              </a:rPr>
-              <a:t>class</a:t>
-            </a:r>
-            <a:r>
-              <a:rPr lang="pl-PL" sz="1400" dirty="0">
-                <a:solidFill>
-                  <a:srgbClr val="000000"/>
-                </a:solidFill>
-                <a:highlight>
-                  <a:srgbClr val="FFFFFF"/>
-                </a:highlight>
-              </a:rPr>
-              <a:t> </a:t>
-            </a:r>
-            <a:r>
-              <a:rPr lang="pl-PL" sz="1400" dirty="0" err="1">
-                <a:solidFill>
-                  <a:srgbClr val="000000"/>
-                </a:solidFill>
-                <a:highlight>
-                  <a:srgbClr val="FFFFFF"/>
-                </a:highlight>
-              </a:rPr>
-              <a:t>RepositoryBase</a:t>
-            </a:r>
-            <a:r>
-              <a:rPr lang="pl-PL" sz="1400" b="1" dirty="0">
-                <a:solidFill>
-                  <a:srgbClr val="000080"/>
-                </a:solidFill>
-                <a:highlight>
-                  <a:srgbClr val="FFFFFF"/>
-                </a:highlight>
-              </a:rPr>
-              <a:t>&lt;</a:t>
-            </a:r>
-            <a:r>
-              <a:rPr lang="pl-PL" sz="1400" dirty="0" err="1">
-                <a:solidFill>
-                  <a:srgbClr val="000000"/>
-                </a:solidFill>
-                <a:highlight>
-                  <a:srgbClr val="FFFFFF"/>
-                </a:highlight>
-              </a:rPr>
-              <a:t>TEntity</a:t>
-            </a:r>
-            <a:r>
-              <a:rPr lang="pl-PL" sz="1400" b="1" dirty="0">
-                <a:solidFill>
-                  <a:srgbClr val="000080"/>
-                </a:solidFill>
-                <a:highlight>
-                  <a:srgbClr val="FFFFFF"/>
-                </a:highlight>
-              </a:rPr>
-              <a:t>&gt;</a:t>
-            </a:r>
-            <a:r>
-              <a:rPr lang="pl-PL" sz="1400" dirty="0">
-                <a:solidFill>
-                  <a:srgbClr val="000000"/>
-                </a:solidFill>
-                <a:highlight>
-                  <a:srgbClr val="FFFFFF"/>
-                </a:highlight>
-              </a:rPr>
-              <a:t> </a:t>
-            </a:r>
-          </a:p>
-          <a:p>
-            <a:r>
-              <a:rPr lang="pl-PL" sz="1400" b="1" dirty="0">
-                <a:solidFill>
-                  <a:srgbClr val="000080"/>
-                </a:solidFill>
-                <a:highlight>
-                  <a:srgbClr val="FFFFFF"/>
-                </a:highlight>
-              </a:rPr>
-              <a:t>{</a:t>
-            </a:r>
-            <a:endParaRPr lang="pl-PL" sz="1400" dirty="0">
-              <a:solidFill>
-                <a:srgbClr val="000000"/>
-              </a:solidFill>
-              <a:highlight>
-                <a:srgbClr val="FFFFFF"/>
-              </a:highlight>
-            </a:endParaRPr>
-          </a:p>
-          <a:p>
-            <a:r>
-              <a:rPr lang="pl-PL" sz="1400" dirty="0">
-                <a:solidFill>
-                  <a:srgbClr val="000000"/>
-                </a:solidFill>
-                <a:highlight>
-                  <a:srgbClr val="FFFFFF"/>
-                </a:highlight>
-              </a:rPr>
-              <a:t>    </a:t>
-            </a:r>
-            <a:r>
-              <a:rPr lang="pl-PL" sz="1400" b="1" dirty="0" err="1">
-                <a:solidFill>
-                  <a:srgbClr val="0000FF"/>
-                </a:solidFill>
-                <a:highlight>
-                  <a:srgbClr val="FFFFFF"/>
-                </a:highlight>
-              </a:rPr>
-              <a:t>protected</a:t>
-            </a:r>
-            <a:r>
-              <a:rPr lang="pl-PL" sz="1400" dirty="0">
-                <a:solidFill>
-                  <a:srgbClr val="000000"/>
-                </a:solidFill>
-                <a:highlight>
-                  <a:srgbClr val="FFFFFF"/>
-                </a:highlight>
-              </a:rPr>
-              <a:t> </a:t>
-            </a:r>
-            <a:r>
-              <a:rPr lang="pl-PL" sz="1400" b="1" dirty="0" err="1">
-                <a:solidFill>
-                  <a:srgbClr val="0000FF"/>
-                </a:solidFill>
-                <a:highlight>
-                  <a:srgbClr val="FFFFFF"/>
-                </a:highlight>
-              </a:rPr>
-              <a:t>readonly</a:t>
-            </a:r>
-            <a:r>
-              <a:rPr lang="pl-PL" sz="1400" dirty="0">
-                <a:solidFill>
-                  <a:srgbClr val="000000"/>
-                </a:solidFill>
-                <a:highlight>
-                  <a:srgbClr val="FFFFFF"/>
-                </a:highlight>
-              </a:rPr>
-              <a:t> </a:t>
-            </a:r>
-            <a:r>
-              <a:rPr lang="pl-PL" sz="1400" dirty="0" err="1">
-                <a:solidFill>
-                  <a:srgbClr val="000000"/>
-                </a:solidFill>
-                <a:highlight>
-                  <a:srgbClr val="FFFFFF"/>
-                </a:highlight>
-              </a:rPr>
-              <a:t>IDbSet</a:t>
-            </a:r>
-            <a:r>
-              <a:rPr lang="pl-PL" sz="1400" b="1" dirty="0">
-                <a:solidFill>
-                  <a:srgbClr val="000080"/>
-                </a:solidFill>
-                <a:highlight>
-                  <a:srgbClr val="FFFFFF"/>
-                </a:highlight>
-              </a:rPr>
-              <a:t>&lt;</a:t>
-            </a:r>
-            <a:r>
-              <a:rPr lang="pl-PL" sz="1400" dirty="0" err="1">
-                <a:solidFill>
-                  <a:srgbClr val="000000"/>
-                </a:solidFill>
-                <a:highlight>
-                  <a:srgbClr val="FFFFFF"/>
-                </a:highlight>
-              </a:rPr>
-              <a:t>TEntity</a:t>
-            </a:r>
-            <a:r>
-              <a:rPr lang="pl-PL" sz="1400" b="1" dirty="0">
-                <a:solidFill>
-                  <a:srgbClr val="000080"/>
-                </a:solidFill>
-                <a:highlight>
-                  <a:srgbClr val="FFFFFF"/>
-                </a:highlight>
-              </a:rPr>
-              <a:t>&gt;</a:t>
-            </a:r>
-            <a:r>
-              <a:rPr lang="pl-PL" sz="1400" dirty="0">
-                <a:solidFill>
-                  <a:srgbClr val="000000"/>
-                </a:solidFill>
-                <a:highlight>
-                  <a:srgbClr val="FFFFFF"/>
-                </a:highlight>
-              </a:rPr>
-              <a:t> </a:t>
-            </a:r>
-            <a:r>
-              <a:rPr lang="pl-PL" sz="1400" dirty="0" err="1">
-                <a:solidFill>
-                  <a:srgbClr val="000000"/>
-                </a:solidFill>
-                <a:highlight>
-                  <a:srgbClr val="FFFFFF"/>
-                </a:highlight>
-              </a:rPr>
-              <a:t>DbSet</a:t>
-            </a:r>
-            <a:r>
-              <a:rPr lang="pl-PL" sz="1400" b="1" dirty="0">
-                <a:solidFill>
-                  <a:srgbClr val="000080"/>
-                </a:solidFill>
-                <a:highlight>
-                  <a:srgbClr val="FFFFFF"/>
-                </a:highlight>
-              </a:rPr>
-              <a:t>;</a:t>
-            </a:r>
-            <a:endParaRPr lang="pl-PL" sz="1400" dirty="0">
-              <a:solidFill>
-                <a:srgbClr val="000000"/>
-              </a:solidFill>
-              <a:highlight>
-                <a:srgbClr val="FFFFFF"/>
-              </a:highlight>
-            </a:endParaRPr>
-          </a:p>
-          <a:p>
-            <a:r>
-              <a:rPr lang="pl-PL" sz="1400" dirty="0">
-                <a:solidFill>
-                  <a:srgbClr val="000000"/>
-                </a:solidFill>
-                <a:highlight>
-                  <a:srgbClr val="FFFFFF"/>
-                </a:highlight>
-              </a:rPr>
-              <a:t>        </a:t>
-            </a:r>
-          </a:p>
-          <a:p>
-            <a:r>
-              <a:rPr lang="pl-PL" sz="1400" dirty="0">
-                <a:solidFill>
-                  <a:srgbClr val="000000"/>
-                </a:solidFill>
-                <a:highlight>
-                  <a:srgbClr val="FFFFFF"/>
-                </a:highlight>
-              </a:rPr>
-              <a:t>    </a:t>
-            </a:r>
-            <a:r>
-              <a:rPr lang="pl-PL" sz="1400" b="1" dirty="0">
-                <a:solidFill>
-                  <a:srgbClr val="0000FF"/>
-                </a:solidFill>
-                <a:highlight>
-                  <a:srgbClr val="FFFFFF"/>
-                </a:highlight>
-              </a:rPr>
-              <a:t>public</a:t>
-            </a:r>
-            <a:r>
-              <a:rPr lang="pl-PL" sz="1400" dirty="0">
-                <a:solidFill>
-                  <a:srgbClr val="000000"/>
-                </a:solidFill>
-                <a:highlight>
-                  <a:srgbClr val="FFFFFF"/>
-                </a:highlight>
-              </a:rPr>
-              <a:t> </a:t>
-            </a:r>
-            <a:r>
-              <a:rPr lang="pl-PL" sz="1400" b="1" dirty="0" err="1">
-                <a:solidFill>
-                  <a:srgbClr val="0000FF"/>
-                </a:solidFill>
-                <a:highlight>
-                  <a:srgbClr val="FFFFFF"/>
-                </a:highlight>
-              </a:rPr>
-              <a:t>virtual</a:t>
-            </a:r>
-            <a:r>
-              <a:rPr lang="pl-PL" sz="1400" dirty="0">
-                <a:solidFill>
-                  <a:srgbClr val="000000"/>
-                </a:solidFill>
-                <a:highlight>
-                  <a:srgbClr val="FFFFFF"/>
-                </a:highlight>
-              </a:rPr>
-              <a:t> </a:t>
-            </a:r>
-            <a:r>
-              <a:rPr lang="pl-PL" sz="1400" dirty="0" err="1">
-                <a:solidFill>
-                  <a:srgbClr val="000000"/>
-                </a:solidFill>
-                <a:highlight>
-                  <a:srgbClr val="FFFFFF"/>
-                </a:highlight>
-              </a:rPr>
-              <a:t>TEntity</a:t>
-            </a:r>
-            <a:r>
-              <a:rPr lang="pl-PL" sz="1400" dirty="0">
-                <a:solidFill>
-                  <a:srgbClr val="000000"/>
-                </a:solidFill>
-                <a:highlight>
-                  <a:srgbClr val="FFFFFF"/>
-                </a:highlight>
-              </a:rPr>
-              <a:t> </a:t>
-            </a:r>
-            <a:r>
-              <a:rPr lang="pl-PL" sz="1400" dirty="0" err="1">
-                <a:solidFill>
-                  <a:srgbClr val="000000"/>
-                </a:solidFill>
-                <a:highlight>
-                  <a:srgbClr val="FFFFFF"/>
-                </a:highlight>
-              </a:rPr>
-              <a:t>Add</a:t>
-            </a:r>
-            <a:r>
-              <a:rPr lang="pl-PL" sz="1400" b="1" dirty="0">
-                <a:solidFill>
-                  <a:srgbClr val="000080"/>
-                </a:solidFill>
-                <a:highlight>
-                  <a:srgbClr val="FFFFFF"/>
-                </a:highlight>
-              </a:rPr>
-              <a:t>(</a:t>
-            </a:r>
-            <a:r>
-              <a:rPr lang="pl-PL" sz="1400" dirty="0" err="1">
-                <a:solidFill>
-                  <a:srgbClr val="000000"/>
-                </a:solidFill>
-                <a:highlight>
-                  <a:srgbClr val="FFFFFF"/>
-                </a:highlight>
-              </a:rPr>
-              <a:t>TEntity</a:t>
-            </a:r>
-            <a:r>
-              <a:rPr lang="pl-PL" sz="1400" dirty="0">
-                <a:solidFill>
-                  <a:srgbClr val="000000"/>
-                </a:solidFill>
-                <a:highlight>
-                  <a:srgbClr val="FFFFFF"/>
-                </a:highlight>
-              </a:rPr>
-              <a:t> </a:t>
-            </a:r>
-            <a:r>
-              <a:rPr lang="pl-PL" sz="1400" dirty="0" err="1">
-                <a:solidFill>
-                  <a:srgbClr val="000000"/>
-                </a:solidFill>
-                <a:highlight>
-                  <a:srgbClr val="FFFFFF"/>
-                </a:highlight>
-              </a:rPr>
-              <a:t>entity</a:t>
-            </a:r>
-            <a:r>
-              <a:rPr lang="pl-PL" sz="1400" b="1" dirty="0">
-                <a:solidFill>
-                  <a:srgbClr val="000080"/>
-                </a:solidFill>
-                <a:highlight>
-                  <a:srgbClr val="FFFFFF"/>
-                </a:highlight>
-              </a:rPr>
-              <a:t>)</a:t>
-            </a:r>
-            <a:endParaRPr lang="pl-PL" sz="1400" dirty="0">
-              <a:solidFill>
-                <a:srgbClr val="000000"/>
-              </a:solidFill>
-              <a:highlight>
-                <a:srgbClr val="FFFFFF"/>
-              </a:highlight>
-            </a:endParaRPr>
-          </a:p>
-          <a:p>
-            <a:r>
-              <a:rPr lang="pl-PL" sz="1400" dirty="0">
-                <a:solidFill>
-                  <a:srgbClr val="000000"/>
-                </a:solidFill>
-                <a:highlight>
-                  <a:srgbClr val="FFFFFF"/>
-                </a:highlight>
-              </a:rPr>
-              <a:t>    </a:t>
-            </a:r>
-            <a:r>
-              <a:rPr lang="pl-PL" sz="1400" b="1" dirty="0">
-                <a:solidFill>
-                  <a:srgbClr val="000080"/>
-                </a:solidFill>
-                <a:highlight>
-                  <a:srgbClr val="FFFFFF"/>
-                </a:highlight>
-              </a:rPr>
-              <a:t>{</a:t>
-            </a:r>
-            <a:endParaRPr lang="pl-PL" sz="1400" dirty="0">
-              <a:solidFill>
-                <a:srgbClr val="000000"/>
-              </a:solidFill>
-              <a:highlight>
-                <a:srgbClr val="FFFFFF"/>
-              </a:highlight>
-            </a:endParaRPr>
-          </a:p>
-          <a:p>
-            <a:r>
-              <a:rPr lang="pl-PL" sz="1400" dirty="0">
-                <a:solidFill>
-                  <a:srgbClr val="000000"/>
-                </a:solidFill>
-                <a:highlight>
-                  <a:srgbClr val="FFFFFF"/>
-                </a:highlight>
-              </a:rPr>
-              <a:t>	</a:t>
-            </a:r>
-            <a:r>
-              <a:rPr lang="pl-PL" sz="1400" dirty="0" err="1" smtClean="0">
-                <a:solidFill>
-                  <a:srgbClr val="000000"/>
-                </a:solidFill>
-                <a:highlight>
-                  <a:srgbClr val="FFFFFF"/>
-                </a:highlight>
-              </a:rPr>
-              <a:t>var</a:t>
-            </a:r>
-            <a:r>
-              <a:rPr lang="pl-PL" sz="1400" dirty="0" smtClean="0">
-                <a:solidFill>
-                  <a:srgbClr val="000000"/>
-                </a:solidFill>
-                <a:highlight>
-                  <a:srgbClr val="FFFFFF"/>
-                </a:highlight>
-              </a:rPr>
-              <a:t> </a:t>
-            </a:r>
-            <a:r>
-              <a:rPr lang="pl-PL" sz="1400" dirty="0" err="1">
-                <a:solidFill>
-                  <a:srgbClr val="000000"/>
-                </a:solidFill>
-                <a:highlight>
-                  <a:srgbClr val="FFFFFF"/>
-                </a:highlight>
-              </a:rPr>
-              <a:t>result</a:t>
-            </a:r>
-            <a:r>
-              <a:rPr lang="pl-PL" sz="1400" dirty="0">
-                <a:solidFill>
-                  <a:srgbClr val="000000"/>
-                </a:solidFill>
-                <a:highlight>
-                  <a:srgbClr val="FFFFFF"/>
-                </a:highlight>
-              </a:rPr>
-              <a:t> </a:t>
-            </a:r>
-            <a:r>
-              <a:rPr lang="pl-PL" sz="1400" b="1" dirty="0">
-                <a:solidFill>
-                  <a:srgbClr val="000080"/>
-                </a:solidFill>
-                <a:highlight>
-                  <a:srgbClr val="FFFFFF"/>
-                </a:highlight>
-              </a:rPr>
-              <a:t>=</a:t>
-            </a:r>
-            <a:r>
-              <a:rPr lang="pl-PL" sz="1400" dirty="0">
-                <a:solidFill>
-                  <a:srgbClr val="000000"/>
-                </a:solidFill>
-                <a:highlight>
-                  <a:srgbClr val="FFFFFF"/>
-                </a:highlight>
-              </a:rPr>
-              <a:t> </a:t>
-            </a:r>
-            <a:r>
-              <a:rPr lang="pl-PL" sz="1400" dirty="0" err="1">
-                <a:solidFill>
-                  <a:srgbClr val="000000"/>
-                </a:solidFill>
-                <a:highlight>
-                  <a:srgbClr val="FFFFFF"/>
-                </a:highlight>
-              </a:rPr>
-              <a:t>DbSet</a:t>
-            </a:r>
-            <a:r>
-              <a:rPr lang="pl-PL" sz="1400" b="1" dirty="0" err="1">
-                <a:solidFill>
-                  <a:srgbClr val="000080"/>
-                </a:solidFill>
-                <a:highlight>
-                  <a:srgbClr val="FFFFFF"/>
-                </a:highlight>
-              </a:rPr>
-              <a:t>.</a:t>
-            </a:r>
-            <a:r>
-              <a:rPr lang="pl-PL" sz="1400" dirty="0" err="1">
-                <a:solidFill>
-                  <a:srgbClr val="000000"/>
-                </a:solidFill>
-                <a:highlight>
-                  <a:srgbClr val="FFFFFF"/>
-                </a:highlight>
-              </a:rPr>
-              <a:t>Add</a:t>
-            </a:r>
-            <a:r>
-              <a:rPr lang="pl-PL" sz="1400" b="1" dirty="0">
-                <a:solidFill>
-                  <a:srgbClr val="000080"/>
-                </a:solidFill>
-                <a:highlight>
-                  <a:srgbClr val="FFFFFF"/>
-                </a:highlight>
-              </a:rPr>
-              <a:t>(</a:t>
-            </a:r>
-            <a:r>
-              <a:rPr lang="pl-PL" sz="1400" dirty="0" err="1">
-                <a:solidFill>
-                  <a:srgbClr val="000000"/>
-                </a:solidFill>
-                <a:highlight>
-                  <a:srgbClr val="FFFFFF"/>
-                </a:highlight>
-              </a:rPr>
-              <a:t>entity</a:t>
-            </a:r>
-            <a:r>
-              <a:rPr lang="pl-PL" sz="1400" b="1" dirty="0">
-                <a:solidFill>
-                  <a:srgbClr val="000080"/>
-                </a:solidFill>
-                <a:highlight>
-                  <a:srgbClr val="FFFFFF"/>
-                </a:highlight>
-              </a:rPr>
-              <a:t>);</a:t>
-            </a:r>
-            <a:endParaRPr lang="pl-PL" sz="1400" dirty="0">
-              <a:solidFill>
-                <a:srgbClr val="000000"/>
-              </a:solidFill>
-              <a:highlight>
-                <a:srgbClr val="FFFFFF"/>
-              </a:highlight>
-            </a:endParaRPr>
-          </a:p>
-          <a:p>
-            <a:r>
-              <a:rPr lang="pl-PL" sz="1400" dirty="0">
-                <a:solidFill>
-                  <a:srgbClr val="000000"/>
-                </a:solidFill>
-                <a:highlight>
-                  <a:srgbClr val="FFFFFF"/>
-                </a:highlight>
-              </a:rPr>
-              <a:t>	</a:t>
-            </a:r>
-            <a:r>
-              <a:rPr lang="pl-PL" sz="1400" dirty="0" err="1" smtClean="0">
-                <a:solidFill>
-                  <a:srgbClr val="000000"/>
-                </a:solidFill>
-                <a:highlight>
-                  <a:srgbClr val="FFFFFF"/>
-                </a:highlight>
-              </a:rPr>
-              <a:t>SaveChanges</a:t>
-            </a:r>
-            <a:r>
-              <a:rPr lang="pl-PL" sz="1400" b="1" dirty="0">
-                <a:solidFill>
-                  <a:srgbClr val="000080"/>
-                </a:solidFill>
-                <a:highlight>
-                  <a:srgbClr val="FFFFFF"/>
-                </a:highlight>
-              </a:rPr>
-              <a:t>();</a:t>
-            </a:r>
-            <a:endParaRPr lang="pl-PL" sz="1400" dirty="0">
-              <a:solidFill>
-                <a:srgbClr val="000000"/>
-              </a:solidFill>
-              <a:highlight>
-                <a:srgbClr val="FFFFFF"/>
-              </a:highlight>
-            </a:endParaRPr>
-          </a:p>
-          <a:p>
-            <a:r>
-              <a:rPr lang="pl-PL" sz="1400" dirty="0">
-                <a:solidFill>
-                  <a:srgbClr val="000000"/>
-                </a:solidFill>
-                <a:highlight>
-                  <a:srgbClr val="FFFFFF"/>
-                </a:highlight>
-              </a:rPr>
-              <a:t>	</a:t>
-            </a:r>
-            <a:r>
-              <a:rPr lang="pl-PL" sz="1400" b="1" dirty="0" smtClean="0">
-                <a:solidFill>
-                  <a:srgbClr val="0000FF"/>
-                </a:solidFill>
-                <a:highlight>
-                  <a:srgbClr val="FFFFFF"/>
-                </a:highlight>
-              </a:rPr>
-              <a:t>return</a:t>
-            </a:r>
-            <a:r>
-              <a:rPr lang="pl-PL" sz="1400" dirty="0" smtClean="0">
-                <a:solidFill>
-                  <a:srgbClr val="000000"/>
-                </a:solidFill>
-                <a:highlight>
-                  <a:srgbClr val="FFFFFF"/>
-                </a:highlight>
-              </a:rPr>
-              <a:t> </a:t>
-            </a:r>
-            <a:r>
-              <a:rPr lang="pl-PL" sz="1400" dirty="0" err="1">
-                <a:solidFill>
-                  <a:srgbClr val="000000"/>
-                </a:solidFill>
-                <a:highlight>
-                  <a:srgbClr val="FFFFFF"/>
-                </a:highlight>
-              </a:rPr>
-              <a:t>result</a:t>
-            </a:r>
-            <a:r>
-              <a:rPr lang="pl-PL" sz="1400" b="1" dirty="0">
-                <a:solidFill>
-                  <a:srgbClr val="000080"/>
-                </a:solidFill>
-                <a:highlight>
-                  <a:srgbClr val="FFFFFF"/>
-                </a:highlight>
-              </a:rPr>
-              <a:t>;</a:t>
-            </a:r>
-            <a:endParaRPr lang="pl-PL" sz="1400" dirty="0">
-              <a:solidFill>
-                <a:srgbClr val="000000"/>
-              </a:solidFill>
-              <a:highlight>
-                <a:srgbClr val="FFFFFF"/>
-              </a:highlight>
-            </a:endParaRPr>
-          </a:p>
-          <a:p>
-            <a:r>
-              <a:rPr lang="pl-PL" sz="1400" dirty="0" smtClean="0">
-                <a:solidFill>
-                  <a:srgbClr val="000000"/>
-                </a:solidFill>
-                <a:highlight>
-                  <a:srgbClr val="FFFFFF"/>
-                </a:highlight>
-              </a:rPr>
-              <a:t>    </a:t>
-            </a:r>
-            <a:r>
-              <a:rPr lang="pl-PL" sz="1400" b="1" dirty="0" smtClean="0">
-                <a:solidFill>
-                  <a:srgbClr val="000080"/>
-                </a:solidFill>
-                <a:highlight>
-                  <a:srgbClr val="FFFFFF"/>
-                </a:highlight>
-              </a:rPr>
-              <a:t>}</a:t>
-            </a:r>
-            <a:endParaRPr lang="pl-PL" sz="1400" dirty="0">
-              <a:solidFill>
-                <a:srgbClr val="000000"/>
-              </a:solidFill>
-              <a:highlight>
-                <a:srgbClr val="FFFFFF"/>
-              </a:highlight>
-            </a:endParaRPr>
-          </a:p>
-          <a:p>
-            <a:r>
-              <a:rPr lang="pl-PL" sz="1400" b="1" dirty="0" smtClean="0">
-                <a:solidFill>
-                  <a:srgbClr val="0000FF"/>
-                </a:solidFill>
-                <a:highlight>
-                  <a:srgbClr val="FFFFFF"/>
-                </a:highlight>
-              </a:rPr>
-              <a:t>    public</a:t>
-            </a:r>
-            <a:r>
-              <a:rPr lang="pl-PL" sz="1400" dirty="0" smtClean="0">
-                <a:solidFill>
-                  <a:srgbClr val="000000"/>
-                </a:solidFill>
-                <a:highlight>
-                  <a:srgbClr val="FFFFFF"/>
-                </a:highlight>
-              </a:rPr>
-              <a:t> </a:t>
-            </a:r>
-            <a:r>
-              <a:rPr lang="pl-PL" sz="1400" b="1" dirty="0" err="1">
-                <a:solidFill>
-                  <a:srgbClr val="0000FF"/>
-                </a:solidFill>
-                <a:highlight>
-                  <a:srgbClr val="FFFFFF"/>
-                </a:highlight>
-              </a:rPr>
-              <a:t>virtual</a:t>
-            </a:r>
-            <a:r>
-              <a:rPr lang="pl-PL" sz="1400" dirty="0">
-                <a:solidFill>
-                  <a:srgbClr val="000000"/>
-                </a:solidFill>
-                <a:highlight>
-                  <a:srgbClr val="FFFFFF"/>
-                </a:highlight>
-              </a:rPr>
-              <a:t> </a:t>
-            </a:r>
-            <a:r>
-              <a:rPr lang="pl-PL" sz="1400" dirty="0" err="1">
-                <a:solidFill>
-                  <a:srgbClr val="000000"/>
-                </a:solidFill>
-                <a:highlight>
-                  <a:srgbClr val="FFFFFF"/>
-                </a:highlight>
-              </a:rPr>
-              <a:t>TEntity</a:t>
-            </a:r>
-            <a:r>
-              <a:rPr lang="pl-PL" sz="1400" dirty="0">
-                <a:solidFill>
-                  <a:srgbClr val="000000"/>
-                </a:solidFill>
-                <a:highlight>
-                  <a:srgbClr val="FFFFFF"/>
-                </a:highlight>
-              </a:rPr>
-              <a:t> Update</a:t>
-            </a:r>
-            <a:r>
-              <a:rPr lang="pl-PL" sz="1400" b="1" dirty="0">
-                <a:solidFill>
-                  <a:srgbClr val="000080"/>
-                </a:solidFill>
-                <a:highlight>
-                  <a:srgbClr val="FFFFFF"/>
-                </a:highlight>
-              </a:rPr>
-              <a:t>(</a:t>
-            </a:r>
-            <a:r>
-              <a:rPr lang="pl-PL" sz="1400" dirty="0" err="1">
-                <a:solidFill>
-                  <a:srgbClr val="000000"/>
-                </a:solidFill>
-                <a:highlight>
-                  <a:srgbClr val="FFFFFF"/>
-                </a:highlight>
-              </a:rPr>
-              <a:t>TEntity</a:t>
-            </a:r>
-            <a:r>
-              <a:rPr lang="pl-PL" sz="1400" dirty="0">
-                <a:solidFill>
-                  <a:srgbClr val="000000"/>
-                </a:solidFill>
-                <a:highlight>
-                  <a:srgbClr val="FFFFFF"/>
-                </a:highlight>
-              </a:rPr>
-              <a:t> </a:t>
-            </a:r>
-            <a:r>
-              <a:rPr lang="pl-PL" sz="1400" dirty="0" err="1">
-                <a:solidFill>
-                  <a:srgbClr val="000000"/>
-                </a:solidFill>
-                <a:highlight>
-                  <a:srgbClr val="FFFFFF"/>
-                </a:highlight>
-              </a:rPr>
-              <a:t>entity</a:t>
-            </a:r>
-            <a:r>
-              <a:rPr lang="pl-PL" sz="1400" b="1" dirty="0">
-                <a:solidFill>
-                  <a:srgbClr val="000080"/>
-                </a:solidFill>
-                <a:highlight>
-                  <a:srgbClr val="FFFFFF"/>
-                </a:highlight>
-              </a:rPr>
-              <a:t>)</a:t>
-            </a:r>
-            <a:endParaRPr lang="pl-PL" sz="1400" dirty="0">
-              <a:solidFill>
-                <a:srgbClr val="000000"/>
-              </a:solidFill>
-              <a:highlight>
-                <a:srgbClr val="FFFFFF"/>
-              </a:highlight>
-            </a:endParaRPr>
-          </a:p>
-          <a:p>
-            <a:r>
-              <a:rPr lang="pl-PL" sz="1400" dirty="0">
-                <a:solidFill>
-                  <a:srgbClr val="000000"/>
-                </a:solidFill>
-                <a:highlight>
-                  <a:srgbClr val="FFFFFF"/>
-                </a:highlight>
-              </a:rPr>
-              <a:t>    </a:t>
-            </a:r>
-            <a:r>
-              <a:rPr lang="pl-PL" sz="1400" b="1" dirty="0">
-                <a:solidFill>
-                  <a:srgbClr val="000080"/>
-                </a:solidFill>
-                <a:highlight>
-                  <a:srgbClr val="FFFFFF"/>
-                </a:highlight>
-              </a:rPr>
-              <a:t>{</a:t>
-            </a:r>
-            <a:endParaRPr lang="pl-PL" sz="1400" dirty="0">
-              <a:solidFill>
-                <a:srgbClr val="000000"/>
-              </a:solidFill>
-              <a:highlight>
-                <a:srgbClr val="FFFFFF"/>
-              </a:highlight>
-            </a:endParaRPr>
-          </a:p>
-          <a:p>
-            <a:r>
-              <a:rPr lang="pl-PL" sz="1400" dirty="0">
-                <a:solidFill>
-                  <a:srgbClr val="000000"/>
-                </a:solidFill>
-                <a:highlight>
-                  <a:srgbClr val="FFFFFF"/>
-                </a:highlight>
-              </a:rPr>
-              <a:t>        </a:t>
-            </a:r>
-            <a:r>
-              <a:rPr lang="pl-PL" sz="1400" dirty="0" smtClean="0">
-                <a:solidFill>
-                  <a:srgbClr val="000000"/>
-                </a:solidFill>
-                <a:highlight>
-                  <a:srgbClr val="FFFFFF"/>
-                </a:highlight>
-              </a:rPr>
-              <a:t>  </a:t>
-            </a:r>
-            <a:r>
-              <a:rPr lang="pl-PL" sz="1400" dirty="0" err="1" smtClean="0">
-                <a:solidFill>
-                  <a:srgbClr val="000000"/>
-                </a:solidFill>
-                <a:highlight>
-                  <a:srgbClr val="FFFFFF"/>
-                </a:highlight>
-              </a:rPr>
-              <a:t>var</a:t>
-            </a:r>
-            <a:r>
-              <a:rPr lang="pl-PL" sz="1400" dirty="0" smtClean="0">
-                <a:solidFill>
-                  <a:srgbClr val="000000"/>
-                </a:solidFill>
-                <a:highlight>
-                  <a:srgbClr val="FFFFFF"/>
-                </a:highlight>
-              </a:rPr>
-              <a:t> </a:t>
-            </a:r>
-            <a:r>
-              <a:rPr lang="pl-PL" sz="1400" dirty="0" err="1">
-                <a:solidFill>
-                  <a:srgbClr val="000000"/>
-                </a:solidFill>
-                <a:highlight>
-                  <a:srgbClr val="FFFFFF"/>
-                </a:highlight>
-              </a:rPr>
-              <a:t>oldEntity</a:t>
-            </a:r>
-            <a:r>
-              <a:rPr lang="pl-PL" sz="1400" dirty="0">
-                <a:solidFill>
-                  <a:srgbClr val="000000"/>
-                </a:solidFill>
-                <a:highlight>
-                  <a:srgbClr val="FFFFFF"/>
-                </a:highlight>
-              </a:rPr>
-              <a:t> </a:t>
-            </a:r>
-            <a:r>
-              <a:rPr lang="pl-PL" sz="1400" b="1" dirty="0">
-                <a:solidFill>
-                  <a:srgbClr val="000080"/>
-                </a:solidFill>
-                <a:highlight>
-                  <a:srgbClr val="FFFFFF"/>
-                </a:highlight>
-              </a:rPr>
-              <a:t>=</a:t>
-            </a:r>
-            <a:r>
-              <a:rPr lang="pl-PL" sz="1400" dirty="0">
-                <a:solidFill>
-                  <a:srgbClr val="000000"/>
-                </a:solidFill>
-                <a:highlight>
-                  <a:srgbClr val="FFFFFF"/>
-                </a:highlight>
-              </a:rPr>
-              <a:t> </a:t>
-            </a:r>
-            <a:r>
-              <a:rPr lang="pl-PL" sz="1400" dirty="0" err="1">
-                <a:solidFill>
-                  <a:srgbClr val="000000"/>
-                </a:solidFill>
-                <a:highlight>
-                  <a:srgbClr val="FFFFFF"/>
-                </a:highlight>
-              </a:rPr>
-              <a:t>Context</a:t>
-            </a:r>
-            <a:r>
-              <a:rPr lang="pl-PL" sz="1400" b="1" dirty="0" err="1">
-                <a:solidFill>
-                  <a:srgbClr val="000080"/>
-                </a:solidFill>
-                <a:highlight>
-                  <a:srgbClr val="FFFFFF"/>
-                </a:highlight>
-              </a:rPr>
-              <a:t>.</a:t>
-            </a:r>
-            <a:r>
-              <a:rPr lang="pl-PL" sz="1400" dirty="0" err="1">
-                <a:solidFill>
-                  <a:srgbClr val="000000"/>
-                </a:solidFill>
-                <a:highlight>
-                  <a:srgbClr val="FFFFFF"/>
-                </a:highlight>
-              </a:rPr>
-              <a:t>Entry</a:t>
-            </a:r>
-            <a:r>
-              <a:rPr lang="pl-PL" sz="1400" b="1" dirty="0">
-                <a:solidFill>
-                  <a:srgbClr val="000080"/>
-                </a:solidFill>
-                <a:highlight>
-                  <a:srgbClr val="FFFFFF"/>
-                </a:highlight>
-              </a:rPr>
-              <a:t>(</a:t>
-            </a:r>
-            <a:r>
-              <a:rPr lang="pl-PL" sz="1400" dirty="0" err="1">
-                <a:solidFill>
-                  <a:srgbClr val="000000"/>
-                </a:solidFill>
-                <a:highlight>
-                  <a:srgbClr val="FFFFFF"/>
-                </a:highlight>
-              </a:rPr>
-              <a:t>entity</a:t>
-            </a:r>
-            <a:r>
-              <a:rPr lang="pl-PL" sz="1400" b="1" dirty="0">
-                <a:solidFill>
-                  <a:srgbClr val="000080"/>
-                </a:solidFill>
-                <a:highlight>
-                  <a:srgbClr val="FFFFFF"/>
-                </a:highlight>
-              </a:rPr>
-              <a:t>);</a:t>
-            </a:r>
-            <a:endParaRPr lang="pl-PL" sz="1400" dirty="0">
-              <a:solidFill>
-                <a:srgbClr val="000000"/>
-              </a:solidFill>
-              <a:highlight>
-                <a:srgbClr val="FFFFFF"/>
-              </a:highlight>
-            </a:endParaRPr>
-          </a:p>
-          <a:p>
-            <a:r>
-              <a:rPr lang="pl-PL" sz="1400" dirty="0">
-                <a:solidFill>
-                  <a:srgbClr val="000000"/>
-                </a:solidFill>
-                <a:highlight>
-                  <a:srgbClr val="FFFFFF"/>
-                </a:highlight>
-              </a:rPr>
-              <a:t>        </a:t>
-            </a:r>
-            <a:r>
-              <a:rPr lang="pl-PL" sz="1400" dirty="0" smtClean="0">
-                <a:solidFill>
-                  <a:srgbClr val="000000"/>
-                </a:solidFill>
-                <a:highlight>
-                  <a:srgbClr val="FFFFFF"/>
-                </a:highlight>
-              </a:rPr>
-              <a:t>  </a:t>
-            </a:r>
-            <a:r>
-              <a:rPr lang="pl-PL" sz="1400" b="1" dirty="0" err="1" smtClean="0">
-                <a:solidFill>
-                  <a:srgbClr val="0000FF"/>
-                </a:solidFill>
-                <a:highlight>
-                  <a:srgbClr val="FFFFFF"/>
-                </a:highlight>
-              </a:rPr>
-              <a:t>if</a:t>
-            </a:r>
-            <a:r>
-              <a:rPr lang="pl-PL" sz="1400" dirty="0" smtClean="0">
-                <a:solidFill>
-                  <a:srgbClr val="000000"/>
-                </a:solidFill>
-                <a:highlight>
-                  <a:srgbClr val="FFFFFF"/>
-                </a:highlight>
-              </a:rPr>
-              <a:t> </a:t>
-            </a:r>
-            <a:r>
-              <a:rPr lang="pl-PL" sz="1400" b="1" dirty="0">
-                <a:solidFill>
-                  <a:srgbClr val="000080"/>
-                </a:solidFill>
-                <a:highlight>
-                  <a:srgbClr val="FFFFFF"/>
-                </a:highlight>
-              </a:rPr>
-              <a:t>(</a:t>
-            </a:r>
-            <a:r>
-              <a:rPr lang="pl-PL" sz="1400" dirty="0" err="1">
-                <a:solidFill>
-                  <a:srgbClr val="000000"/>
-                </a:solidFill>
-                <a:highlight>
-                  <a:srgbClr val="FFFFFF"/>
-                </a:highlight>
-              </a:rPr>
-              <a:t>oldEntity</a:t>
-            </a:r>
-            <a:r>
-              <a:rPr lang="pl-PL" sz="1400" b="1" dirty="0" err="1">
-                <a:solidFill>
-                  <a:srgbClr val="000080"/>
-                </a:solidFill>
-                <a:highlight>
-                  <a:srgbClr val="FFFFFF"/>
-                </a:highlight>
-              </a:rPr>
-              <a:t>.</a:t>
-            </a:r>
-            <a:r>
-              <a:rPr lang="pl-PL" sz="1400" dirty="0" err="1">
-                <a:solidFill>
-                  <a:srgbClr val="000000"/>
-                </a:solidFill>
-                <a:highlight>
-                  <a:srgbClr val="FFFFFF"/>
-                </a:highlight>
-              </a:rPr>
-              <a:t>State</a:t>
-            </a:r>
-            <a:r>
-              <a:rPr lang="pl-PL" sz="1400" dirty="0">
-                <a:solidFill>
-                  <a:srgbClr val="000000"/>
-                </a:solidFill>
-                <a:highlight>
-                  <a:srgbClr val="FFFFFF"/>
-                </a:highlight>
-              </a:rPr>
-              <a:t> </a:t>
-            </a:r>
-            <a:r>
-              <a:rPr lang="pl-PL" sz="1400" b="1" dirty="0">
-                <a:solidFill>
-                  <a:srgbClr val="000080"/>
-                </a:solidFill>
-                <a:highlight>
-                  <a:srgbClr val="FFFFFF"/>
-                </a:highlight>
-              </a:rPr>
-              <a:t>!=</a:t>
-            </a:r>
-            <a:r>
-              <a:rPr lang="pl-PL" sz="1400" dirty="0">
-                <a:solidFill>
-                  <a:srgbClr val="000000"/>
-                </a:solidFill>
-                <a:highlight>
-                  <a:srgbClr val="FFFFFF"/>
-                </a:highlight>
-              </a:rPr>
-              <a:t> </a:t>
-            </a:r>
-            <a:r>
-              <a:rPr lang="pl-PL" sz="1400" dirty="0" err="1">
-                <a:solidFill>
-                  <a:srgbClr val="000000"/>
-                </a:solidFill>
-                <a:highlight>
-                  <a:srgbClr val="FFFFFF"/>
-                </a:highlight>
-              </a:rPr>
-              <a:t>EntityState</a:t>
-            </a:r>
-            <a:r>
-              <a:rPr lang="pl-PL" sz="1400" b="1" dirty="0" err="1">
-                <a:solidFill>
-                  <a:srgbClr val="000080"/>
-                </a:solidFill>
-                <a:highlight>
-                  <a:srgbClr val="FFFFFF"/>
-                </a:highlight>
-              </a:rPr>
-              <a:t>.</a:t>
-            </a:r>
-            <a:r>
-              <a:rPr lang="pl-PL" sz="1400" dirty="0" err="1">
-                <a:solidFill>
-                  <a:srgbClr val="000000"/>
-                </a:solidFill>
-                <a:highlight>
-                  <a:srgbClr val="FFFFFF"/>
-                </a:highlight>
-              </a:rPr>
-              <a:t>Detached</a:t>
-            </a:r>
-            <a:r>
-              <a:rPr lang="pl-PL" sz="1400" b="1" dirty="0">
-                <a:solidFill>
-                  <a:srgbClr val="000080"/>
-                </a:solidFill>
-                <a:highlight>
-                  <a:srgbClr val="FFFFFF"/>
-                </a:highlight>
-              </a:rPr>
-              <a:t>)</a:t>
-            </a:r>
-            <a:endParaRPr lang="pl-PL" sz="1400" dirty="0">
-              <a:solidFill>
-                <a:srgbClr val="000000"/>
-              </a:solidFill>
-              <a:highlight>
-                <a:srgbClr val="FFFFFF"/>
-              </a:highlight>
-            </a:endParaRPr>
-          </a:p>
-          <a:p>
-            <a:r>
-              <a:rPr lang="pl-PL" sz="1400" dirty="0">
-                <a:solidFill>
-                  <a:srgbClr val="000000"/>
-                </a:solidFill>
-                <a:highlight>
-                  <a:srgbClr val="FFFFFF"/>
-                </a:highlight>
-              </a:rPr>
-              <a:t>          </a:t>
-            </a:r>
-            <a:r>
-              <a:rPr lang="pl-PL" sz="1400" dirty="0" smtClean="0">
-                <a:solidFill>
-                  <a:srgbClr val="000000"/>
-                </a:solidFill>
-                <a:highlight>
-                  <a:srgbClr val="FFFFFF"/>
-                </a:highlight>
-              </a:rPr>
-              <a:t>    </a:t>
-            </a:r>
-            <a:r>
-              <a:rPr lang="pl-PL" sz="1400" b="1" dirty="0">
-                <a:solidFill>
-                  <a:srgbClr val="0000FF"/>
-                </a:solidFill>
-                <a:highlight>
-                  <a:srgbClr val="FFFFFF"/>
-                </a:highlight>
-              </a:rPr>
-              <a:t>return</a:t>
-            </a:r>
-            <a:r>
-              <a:rPr lang="pl-PL" sz="1400" dirty="0">
-                <a:solidFill>
-                  <a:srgbClr val="000000"/>
-                </a:solidFill>
-                <a:highlight>
-                  <a:srgbClr val="FFFFFF"/>
-                </a:highlight>
-              </a:rPr>
-              <a:t> </a:t>
-            </a:r>
-            <a:r>
-              <a:rPr lang="pl-PL" sz="1400" dirty="0" err="1">
-                <a:solidFill>
-                  <a:srgbClr val="000000"/>
-                </a:solidFill>
-                <a:highlight>
-                  <a:srgbClr val="FFFFFF"/>
-                </a:highlight>
-              </a:rPr>
-              <a:t>oldEntity</a:t>
-            </a:r>
-            <a:r>
-              <a:rPr lang="pl-PL" sz="1400" b="1" dirty="0" err="1">
-                <a:solidFill>
-                  <a:srgbClr val="000080"/>
-                </a:solidFill>
-                <a:highlight>
-                  <a:srgbClr val="FFFFFF"/>
-                </a:highlight>
-              </a:rPr>
-              <a:t>.</a:t>
-            </a:r>
-            <a:r>
-              <a:rPr lang="pl-PL" sz="1400" dirty="0" err="1">
-                <a:solidFill>
-                  <a:srgbClr val="000000"/>
-                </a:solidFill>
-                <a:highlight>
-                  <a:srgbClr val="FFFFFF"/>
-                </a:highlight>
-              </a:rPr>
-              <a:t>Entity</a:t>
-            </a:r>
-            <a:r>
-              <a:rPr lang="pl-PL" sz="1400" b="1" dirty="0">
-                <a:solidFill>
-                  <a:srgbClr val="000080"/>
-                </a:solidFill>
-                <a:highlight>
-                  <a:srgbClr val="FFFFFF"/>
-                </a:highlight>
-              </a:rPr>
-              <a:t>;</a:t>
-            </a:r>
-            <a:endParaRPr lang="pl-PL" sz="1400" dirty="0">
-              <a:solidFill>
-                <a:srgbClr val="000000"/>
-              </a:solidFill>
-              <a:highlight>
-                <a:srgbClr val="FFFFFF"/>
-              </a:highlight>
-            </a:endParaRPr>
-          </a:p>
-          <a:p>
-            <a:r>
-              <a:rPr lang="pl-PL" sz="1400" dirty="0">
-                <a:solidFill>
-                  <a:srgbClr val="000000"/>
-                </a:solidFill>
-                <a:highlight>
-                  <a:srgbClr val="FFFFFF"/>
-                </a:highlight>
-              </a:rPr>
-              <a:t>        </a:t>
-            </a:r>
-            <a:r>
-              <a:rPr lang="pl-PL" sz="1400" dirty="0" smtClean="0">
-                <a:solidFill>
-                  <a:srgbClr val="000000"/>
-                </a:solidFill>
-                <a:highlight>
-                  <a:srgbClr val="FFFFFF"/>
-                </a:highlight>
-              </a:rPr>
-              <a:t>  </a:t>
-            </a:r>
-            <a:r>
-              <a:rPr lang="pl-PL" sz="1400" dirty="0" err="1" smtClean="0">
-                <a:solidFill>
-                  <a:srgbClr val="000000"/>
-                </a:solidFill>
-                <a:highlight>
-                  <a:srgbClr val="FFFFFF"/>
-                </a:highlight>
-              </a:rPr>
-              <a:t>oldEntity</a:t>
-            </a:r>
-            <a:r>
-              <a:rPr lang="pl-PL" sz="1400" b="1" dirty="0" err="1" smtClean="0">
-                <a:solidFill>
-                  <a:srgbClr val="000080"/>
-                </a:solidFill>
-                <a:highlight>
-                  <a:srgbClr val="FFFFFF"/>
-                </a:highlight>
-              </a:rPr>
-              <a:t>.</a:t>
-            </a:r>
-            <a:r>
-              <a:rPr lang="pl-PL" sz="1400" dirty="0" err="1" smtClean="0">
-                <a:solidFill>
-                  <a:srgbClr val="000000"/>
-                </a:solidFill>
-                <a:highlight>
-                  <a:srgbClr val="FFFFFF"/>
-                </a:highlight>
-              </a:rPr>
-              <a:t>State</a:t>
-            </a:r>
-            <a:r>
-              <a:rPr lang="pl-PL" sz="1400" dirty="0" smtClean="0">
-                <a:solidFill>
-                  <a:srgbClr val="000000"/>
-                </a:solidFill>
-                <a:highlight>
-                  <a:srgbClr val="FFFFFF"/>
-                </a:highlight>
-              </a:rPr>
-              <a:t> </a:t>
-            </a:r>
-            <a:r>
-              <a:rPr lang="pl-PL" sz="1400" b="1" dirty="0">
-                <a:solidFill>
-                  <a:srgbClr val="000080"/>
-                </a:solidFill>
-                <a:highlight>
-                  <a:srgbClr val="FFFFFF"/>
-                </a:highlight>
-              </a:rPr>
-              <a:t>=</a:t>
-            </a:r>
-            <a:r>
-              <a:rPr lang="pl-PL" sz="1400" dirty="0">
-                <a:solidFill>
-                  <a:srgbClr val="000000"/>
-                </a:solidFill>
-                <a:highlight>
-                  <a:srgbClr val="FFFFFF"/>
-                </a:highlight>
-              </a:rPr>
-              <a:t> </a:t>
-            </a:r>
-            <a:r>
-              <a:rPr lang="pl-PL" sz="1400" dirty="0" err="1">
-                <a:solidFill>
-                  <a:srgbClr val="000000"/>
-                </a:solidFill>
-                <a:highlight>
-                  <a:srgbClr val="FFFFFF"/>
-                </a:highlight>
-              </a:rPr>
-              <a:t>EntityState</a:t>
-            </a:r>
-            <a:r>
-              <a:rPr lang="pl-PL" sz="1400" b="1" dirty="0" err="1">
-                <a:solidFill>
-                  <a:srgbClr val="000080"/>
-                </a:solidFill>
-                <a:highlight>
-                  <a:srgbClr val="FFFFFF"/>
-                </a:highlight>
-              </a:rPr>
-              <a:t>.</a:t>
-            </a:r>
-            <a:r>
-              <a:rPr lang="pl-PL" sz="1400" dirty="0" err="1">
-                <a:solidFill>
-                  <a:srgbClr val="000000"/>
-                </a:solidFill>
-                <a:highlight>
-                  <a:srgbClr val="FFFFFF"/>
-                </a:highlight>
-              </a:rPr>
-              <a:t>Modified</a:t>
-            </a:r>
-            <a:r>
-              <a:rPr lang="pl-PL" sz="1400" b="1" dirty="0">
-                <a:solidFill>
-                  <a:srgbClr val="000080"/>
-                </a:solidFill>
-                <a:highlight>
-                  <a:srgbClr val="FFFFFF"/>
-                </a:highlight>
-              </a:rPr>
-              <a:t>;</a:t>
-            </a:r>
-            <a:endParaRPr lang="pl-PL" sz="1400" dirty="0">
-              <a:solidFill>
-                <a:srgbClr val="000000"/>
-              </a:solidFill>
-              <a:highlight>
-                <a:srgbClr val="FFFFFF"/>
-              </a:highlight>
-            </a:endParaRPr>
-          </a:p>
-          <a:p>
-            <a:r>
-              <a:rPr lang="pl-PL" sz="1400" dirty="0">
-                <a:solidFill>
-                  <a:srgbClr val="000000"/>
-                </a:solidFill>
-                <a:highlight>
-                  <a:srgbClr val="FFFFFF"/>
-                </a:highlight>
-              </a:rPr>
-              <a:t>        </a:t>
-            </a:r>
-            <a:r>
-              <a:rPr lang="pl-PL" sz="1400" dirty="0" smtClean="0">
-                <a:solidFill>
-                  <a:srgbClr val="000000"/>
-                </a:solidFill>
-                <a:highlight>
-                  <a:srgbClr val="FFFFFF"/>
-                </a:highlight>
-              </a:rPr>
-              <a:t>  </a:t>
-            </a:r>
-            <a:r>
-              <a:rPr lang="pl-PL" sz="1400" dirty="0" err="1" smtClean="0">
-                <a:solidFill>
-                  <a:srgbClr val="000000"/>
-                </a:solidFill>
-                <a:highlight>
-                  <a:srgbClr val="FFFFFF"/>
-                </a:highlight>
-              </a:rPr>
-              <a:t>SaveChanges</a:t>
-            </a:r>
-            <a:r>
-              <a:rPr lang="pl-PL" sz="1400" b="1" dirty="0">
-                <a:solidFill>
-                  <a:srgbClr val="000080"/>
-                </a:solidFill>
-                <a:highlight>
-                  <a:srgbClr val="FFFFFF"/>
-                </a:highlight>
-              </a:rPr>
-              <a:t>();</a:t>
-            </a:r>
-            <a:endParaRPr lang="pl-PL" sz="1400" dirty="0">
-              <a:solidFill>
-                <a:srgbClr val="000000"/>
-              </a:solidFill>
-              <a:highlight>
-                <a:srgbClr val="FFFFFF"/>
-              </a:highlight>
-            </a:endParaRPr>
-          </a:p>
-          <a:p>
-            <a:r>
-              <a:rPr lang="pl-PL" sz="1400" dirty="0">
-                <a:solidFill>
-                  <a:srgbClr val="000000"/>
-                </a:solidFill>
-                <a:highlight>
-                  <a:srgbClr val="FFFFFF"/>
-                </a:highlight>
-              </a:rPr>
-              <a:t>        </a:t>
-            </a:r>
-            <a:r>
-              <a:rPr lang="pl-PL" sz="1400" dirty="0" smtClean="0">
-                <a:solidFill>
-                  <a:srgbClr val="000000"/>
-                </a:solidFill>
-                <a:highlight>
-                  <a:srgbClr val="FFFFFF"/>
-                </a:highlight>
-              </a:rPr>
-              <a:t>  </a:t>
-            </a:r>
-            <a:r>
-              <a:rPr lang="pl-PL" sz="1400" b="1" dirty="0" smtClean="0">
-                <a:solidFill>
-                  <a:srgbClr val="0000FF"/>
-                </a:solidFill>
-                <a:highlight>
-                  <a:srgbClr val="FFFFFF"/>
-                </a:highlight>
-              </a:rPr>
-              <a:t>return</a:t>
-            </a:r>
-            <a:r>
-              <a:rPr lang="pl-PL" sz="1400" dirty="0" smtClean="0">
-                <a:solidFill>
-                  <a:srgbClr val="000000"/>
-                </a:solidFill>
-                <a:highlight>
-                  <a:srgbClr val="FFFFFF"/>
-                </a:highlight>
-              </a:rPr>
-              <a:t> </a:t>
-            </a:r>
-            <a:r>
-              <a:rPr lang="pl-PL" sz="1400" dirty="0" err="1">
-                <a:solidFill>
-                  <a:srgbClr val="000000"/>
-                </a:solidFill>
-                <a:highlight>
-                  <a:srgbClr val="FFFFFF"/>
-                </a:highlight>
-              </a:rPr>
-              <a:t>DbSet</a:t>
-            </a:r>
-            <a:r>
-              <a:rPr lang="pl-PL" sz="1400" b="1" dirty="0" err="1">
-                <a:solidFill>
-                  <a:srgbClr val="000080"/>
-                </a:solidFill>
-                <a:highlight>
-                  <a:srgbClr val="FFFFFF"/>
-                </a:highlight>
-              </a:rPr>
-              <a:t>.</a:t>
-            </a:r>
-            <a:r>
-              <a:rPr lang="pl-PL" sz="1400" dirty="0" err="1">
-                <a:solidFill>
-                  <a:srgbClr val="000000"/>
-                </a:solidFill>
-                <a:highlight>
-                  <a:srgbClr val="FFFFFF"/>
-                </a:highlight>
-              </a:rPr>
-              <a:t>Attach</a:t>
-            </a:r>
-            <a:r>
-              <a:rPr lang="pl-PL" sz="1400" b="1" dirty="0">
-                <a:solidFill>
-                  <a:srgbClr val="000080"/>
-                </a:solidFill>
-                <a:highlight>
-                  <a:srgbClr val="FFFFFF"/>
-                </a:highlight>
-              </a:rPr>
-              <a:t>(</a:t>
-            </a:r>
-            <a:r>
-              <a:rPr lang="pl-PL" sz="1400" dirty="0" err="1">
-                <a:solidFill>
-                  <a:srgbClr val="000000"/>
-                </a:solidFill>
-                <a:highlight>
-                  <a:srgbClr val="FFFFFF"/>
-                </a:highlight>
-              </a:rPr>
-              <a:t>entity</a:t>
-            </a:r>
-            <a:r>
-              <a:rPr lang="pl-PL" sz="1400" b="1" dirty="0">
-                <a:solidFill>
-                  <a:srgbClr val="000080"/>
-                </a:solidFill>
-                <a:highlight>
-                  <a:srgbClr val="FFFFFF"/>
-                </a:highlight>
-              </a:rPr>
-              <a:t>);</a:t>
-            </a:r>
-            <a:endParaRPr lang="pl-PL" sz="1400" dirty="0">
-              <a:solidFill>
-                <a:srgbClr val="000000"/>
-              </a:solidFill>
-              <a:highlight>
-                <a:srgbClr val="FFFFFF"/>
-              </a:highlight>
-            </a:endParaRPr>
-          </a:p>
-          <a:p>
-            <a:r>
-              <a:rPr lang="pl-PL" sz="1400" b="1" dirty="0" smtClean="0">
-                <a:solidFill>
-                  <a:srgbClr val="000080"/>
-                </a:solidFill>
-                <a:highlight>
-                  <a:srgbClr val="FFFFFF"/>
-                </a:highlight>
-              </a:rPr>
-              <a:t>    }</a:t>
-            </a:r>
-            <a:endParaRPr lang="pl-PL" sz="1400" dirty="0">
-              <a:solidFill>
-                <a:srgbClr val="000000"/>
-              </a:solidFill>
-              <a:highlight>
-                <a:srgbClr val="FFFFFF"/>
-              </a:highlight>
-            </a:endParaRPr>
-          </a:p>
-          <a:p>
-            <a:r>
-              <a:rPr lang="pl-PL" sz="1400" dirty="0" smtClean="0">
-                <a:solidFill>
-                  <a:srgbClr val="000000"/>
-                </a:solidFill>
-                <a:highlight>
-                  <a:srgbClr val="FFFFFF"/>
-                </a:highlight>
-              </a:rPr>
-              <a:t>   </a:t>
-            </a:r>
-            <a:r>
-              <a:rPr lang="pl-PL" sz="1400" b="1" dirty="0" smtClean="0">
-                <a:solidFill>
-                  <a:srgbClr val="000080"/>
-                </a:solidFill>
-                <a:highlight>
-                  <a:srgbClr val="FFFFFF"/>
-                </a:highlight>
-              </a:rPr>
-              <a:t>(...)</a:t>
-            </a:r>
-            <a:endParaRPr lang="pl-PL" sz="1400" dirty="0">
-              <a:solidFill>
-                <a:srgbClr val="000000"/>
-              </a:solidFill>
-              <a:highlight>
-                <a:srgbClr val="FFFFFF"/>
-              </a:highlight>
-            </a:endParaRPr>
-          </a:p>
-          <a:p>
-            <a:r>
-              <a:rPr lang="pl-PL" sz="1400" b="1" dirty="0">
-                <a:solidFill>
-                  <a:srgbClr val="000080"/>
-                </a:solidFill>
-                <a:highlight>
-                  <a:srgbClr val="FFFFFF"/>
-                </a:highlight>
-              </a:rPr>
-              <a:t>}</a:t>
-            </a:r>
-            <a:endParaRPr lang="pl-PL" sz="1400" dirty="0"/>
-          </a:p>
-        </p:txBody>
-      </p:sp>
+      </p:pic>
     </p:spTree>
     <p:extLst>
       <p:ext uri="{BB962C8B-B14F-4D97-AF65-F5344CB8AC3E}">

</xml_diff>